<commit_message>
- Finished MSc thesis presentation
</commit_message>
<xml_diff>
--- a/doc/prezentacija_master_e1-12_2020.pptx
+++ b/doc/prezentacija_master_e1-12_2020.pptx
@@ -37,7 +37,7 @@
     <p:sldId id="284" r:id="rId31"/>
     <p:sldId id="285" r:id="rId32"/>
     <p:sldId id="286" r:id="rId33"/>
-    <p:sldId id="287" r:id="rId34"/>
+    <p:sldId id="295" r:id="rId34"/>
     <p:sldId id="294" r:id="rId35"/>
   </p:sldIdLst>
   <p:sldSz cx="12192000" cy="6858000"/>
@@ -137,6 +137,11 @@
       </a:defRPr>
     </a:lvl9pPr>
   </p:defaultTextStyle>
+  <p:extLst>
+    <p:ext uri="{EFAFB233-063F-42B5-8137-9DF3F51BA10A}">
+      <p15:sldGuideLst xmlns:p15="http://schemas.microsoft.com/office/powerpoint/2012/main"/>
+    </p:ext>
+  </p:extLst>
 </p:presentation>
 </file>
 
@@ -642,7 +647,7 @@
           <a:p>
             <a:fld id="{315B5E2C-74AD-4522-9FD7-378DE79797FC}" type="datetimeFigureOut">
               <a:rPr lang="en-US" smtClean="0"/>
-              <a:t>10/31/2021</a:t>
+              <a:t>11/1/2021</a:t>
             </a:fld>
             <a:endParaRPr lang="en-US"/>
           </a:p>
@@ -938,7 +943,7 @@
           <a:p>
             <a:fld id="{315B5E2C-74AD-4522-9FD7-378DE79797FC}" type="datetimeFigureOut">
               <a:rPr lang="en-US" smtClean="0"/>
-              <a:t>10/31/2021</a:t>
+              <a:t>11/1/2021</a:t>
             </a:fld>
             <a:endParaRPr lang="en-US"/>
           </a:p>
@@ -1186,7 +1191,7 @@
           <a:p>
             <a:fld id="{315B5E2C-74AD-4522-9FD7-378DE79797FC}" type="datetimeFigureOut">
               <a:rPr lang="en-US" smtClean="0"/>
-              <a:t>10/31/2021</a:t>
+              <a:t>11/1/2021</a:t>
             </a:fld>
             <a:endParaRPr lang="en-US"/>
           </a:p>
@@ -1726,7 +1731,7 @@
           <a:p>
             <a:fld id="{315B5E2C-74AD-4522-9FD7-378DE79797FC}" type="datetimeFigureOut">
               <a:rPr lang="en-US" smtClean="0"/>
-              <a:t>10/31/2021</a:t>
+              <a:t>11/1/2021</a:t>
             </a:fld>
             <a:endParaRPr lang="en-US"/>
           </a:p>
@@ -1974,7 +1979,7 @@
           <a:p>
             <a:fld id="{315B5E2C-74AD-4522-9FD7-378DE79797FC}" type="datetimeFigureOut">
               <a:rPr lang="en-US" smtClean="0"/>
-              <a:t>10/31/2021</a:t>
+              <a:t>11/1/2021</a:t>
             </a:fld>
             <a:endParaRPr lang="en-US"/>
           </a:p>
@@ -2506,7 +2511,7 @@
           <a:p>
             <a:fld id="{315B5E2C-74AD-4522-9FD7-378DE79797FC}" type="datetimeFigureOut">
               <a:rPr lang="en-US" smtClean="0"/>
-              <a:t>10/31/2021</a:t>
+              <a:t>11/1/2021</a:t>
             </a:fld>
             <a:endParaRPr lang="en-US"/>
           </a:p>
@@ -2803,7 +2808,7 @@
           <a:p>
             <a:fld id="{315B5E2C-74AD-4522-9FD7-378DE79797FC}" type="datetimeFigureOut">
               <a:rPr lang="en-US" smtClean="0"/>
-              <a:t>10/31/2021</a:t>
+              <a:t>11/1/2021</a:t>
             </a:fld>
             <a:endParaRPr lang="en-US"/>
           </a:p>
@@ -2977,7 +2982,7 @@
           <a:p>
             <a:fld id="{315B5E2C-74AD-4522-9FD7-378DE79797FC}" type="datetimeFigureOut">
               <a:rPr lang="en-US" smtClean="0"/>
-              <a:t>10/31/2021</a:t>
+              <a:t>11/1/2021</a:t>
             </a:fld>
             <a:endParaRPr lang="en-US"/>
           </a:p>
@@ -3157,7 +3162,7 @@
           <a:p>
             <a:fld id="{315B5E2C-74AD-4522-9FD7-378DE79797FC}" type="datetimeFigureOut">
               <a:rPr lang="en-US" smtClean="0"/>
-              <a:t>10/31/2021</a:t>
+              <a:t>11/1/2021</a:t>
             </a:fld>
             <a:endParaRPr lang="en-US"/>
           </a:p>
@@ -3720,7 +3725,7 @@
           <a:p>
             <a:fld id="{315B5E2C-74AD-4522-9FD7-378DE79797FC}" type="datetimeFigureOut">
               <a:rPr lang="en-US" smtClean="0"/>
-              <a:t>10/31/2021</a:t>
+              <a:t>11/1/2021</a:t>
             </a:fld>
             <a:endParaRPr lang="en-US"/>
           </a:p>
@@ -3936,7 +3941,7 @@
           <a:p>
             <a:fld id="{315B5E2C-74AD-4522-9FD7-378DE79797FC}" type="datetimeFigureOut">
               <a:rPr lang="en-US" smtClean="0"/>
-              <a:t>10/31/2021</a:t>
+              <a:t>11/1/2021</a:t>
             </a:fld>
             <a:endParaRPr lang="en-US"/>
           </a:p>
@@ -4111,7 +4116,7 @@
           <a:p>
             <a:fld id="{315B5E2C-74AD-4522-9FD7-378DE79797FC}" type="datetimeFigureOut">
               <a:rPr lang="en-US" smtClean="0"/>
-              <a:t>10/31/2021</a:t>
+              <a:t>11/1/2021</a:t>
             </a:fld>
             <a:endParaRPr lang="en-US"/>
           </a:p>
@@ -4362,7 +4367,7 @@
           <a:p>
             <a:fld id="{315B5E2C-74AD-4522-9FD7-378DE79797FC}" type="datetimeFigureOut">
               <a:rPr lang="en-US" smtClean="0"/>
-              <a:t>10/31/2021</a:t>
+              <a:t>11/1/2021</a:t>
             </a:fld>
             <a:endParaRPr lang="en-US"/>
           </a:p>
@@ -4709,7 +4714,7 @@
           <a:p>
             <a:fld id="{315B5E2C-74AD-4522-9FD7-378DE79797FC}" type="datetimeFigureOut">
               <a:rPr lang="en-US" smtClean="0"/>
-              <a:t>10/31/2021</a:t>
+              <a:t>11/1/2021</a:t>
             </a:fld>
             <a:endParaRPr lang="en-US"/>
           </a:p>
@@ -5201,7 +5206,7 @@
           <a:p>
             <a:fld id="{315B5E2C-74AD-4522-9FD7-378DE79797FC}" type="datetimeFigureOut">
               <a:rPr lang="en-US" smtClean="0"/>
-              <a:t>10/31/2021</a:t>
+              <a:t>11/1/2021</a:t>
             </a:fld>
             <a:endParaRPr lang="en-US"/>
           </a:p>
@@ -5319,7 +5324,7 @@
           <a:p>
             <a:fld id="{315B5E2C-74AD-4522-9FD7-378DE79797FC}" type="datetimeFigureOut">
               <a:rPr lang="en-US" smtClean="0"/>
-              <a:t>10/31/2021</a:t>
+              <a:t>11/1/2021</a:t>
             </a:fld>
             <a:endParaRPr lang="en-US"/>
           </a:p>
@@ -5414,7 +5419,7 @@
           <a:p>
             <a:fld id="{315B5E2C-74AD-4522-9FD7-378DE79797FC}" type="datetimeFigureOut">
               <a:rPr lang="en-US" smtClean="0"/>
-              <a:t>10/31/2021</a:t>
+              <a:t>11/1/2021</a:t>
             </a:fld>
             <a:endParaRPr lang="en-US"/>
           </a:p>
@@ -5697,7 +5702,7 @@
           <a:p>
             <a:fld id="{315B5E2C-74AD-4522-9FD7-378DE79797FC}" type="datetimeFigureOut">
               <a:rPr lang="en-US" smtClean="0"/>
-              <a:t>10/31/2021</a:t>
+              <a:t>11/1/2021</a:t>
             </a:fld>
             <a:endParaRPr lang="en-US"/>
           </a:p>
@@ -5988,7 +5993,7 @@
           <a:p>
             <a:fld id="{315B5E2C-74AD-4522-9FD7-378DE79797FC}" type="datetimeFigureOut">
               <a:rPr lang="en-US" smtClean="0"/>
-              <a:t>10/31/2021</a:t>
+              <a:t>11/1/2021</a:t>
             </a:fld>
             <a:endParaRPr lang="en-US"/>
           </a:p>
@@ -6279,7 +6284,7 @@
           <a:p>
             <a:fld id="{315B5E2C-74AD-4522-9FD7-378DE79797FC}" type="datetimeFigureOut">
               <a:rPr lang="en-US" smtClean="0"/>
-              <a:t>10/31/2021</a:t>
+              <a:t>11/1/2021</a:t>
             </a:fld>
             <a:endParaRPr lang="en-US"/>
           </a:p>
@@ -6527,7 +6532,7 @@
           <a:p>
             <a:fld id="{315B5E2C-74AD-4522-9FD7-378DE79797FC}" type="datetimeFigureOut">
               <a:rPr lang="en-US" smtClean="0"/>
-              <a:t>10/31/2021</a:t>
+              <a:t>11/1/2021</a:t>
             </a:fld>
             <a:endParaRPr lang="en-US"/>
           </a:p>
@@ -7067,7 +7072,7 @@
           <a:p>
             <a:fld id="{315B5E2C-74AD-4522-9FD7-378DE79797FC}" type="datetimeFigureOut">
               <a:rPr lang="en-US" smtClean="0"/>
-              <a:t>10/31/2021</a:t>
+              <a:t>11/1/2021</a:t>
             </a:fld>
             <a:endParaRPr lang="en-US"/>
           </a:p>
@@ -7313,7 +7318,7 @@
           <a:p>
             <a:fld id="{315B5E2C-74AD-4522-9FD7-378DE79797FC}" type="datetimeFigureOut">
               <a:rPr lang="en-US" smtClean="0"/>
-              <a:t>10/31/2021</a:t>
+              <a:t>11/1/2021</a:t>
             </a:fld>
             <a:endParaRPr lang="en-US"/>
           </a:p>
@@ -7561,7 +7566,7 @@
           <a:p>
             <a:fld id="{315B5E2C-74AD-4522-9FD7-378DE79797FC}" type="datetimeFigureOut">
               <a:rPr lang="en-US" smtClean="0"/>
-              <a:t>10/31/2021</a:t>
+              <a:t>11/1/2021</a:t>
             </a:fld>
             <a:endParaRPr lang="en-US"/>
           </a:p>
@@ -8093,7 +8098,7 @@
           <a:p>
             <a:fld id="{315B5E2C-74AD-4522-9FD7-378DE79797FC}" type="datetimeFigureOut">
               <a:rPr lang="en-US" smtClean="0"/>
-              <a:t>10/31/2021</a:t>
+              <a:t>11/1/2021</a:t>
             </a:fld>
             <a:endParaRPr lang="en-US"/>
           </a:p>
@@ -8390,7 +8395,7 @@
           <a:p>
             <a:fld id="{315B5E2C-74AD-4522-9FD7-378DE79797FC}" type="datetimeFigureOut">
               <a:rPr lang="en-US" smtClean="0"/>
-              <a:t>10/31/2021</a:t>
+              <a:t>11/1/2021</a:t>
             </a:fld>
             <a:endParaRPr lang="en-US"/>
           </a:p>
@@ -8564,7 +8569,7 @@
           <a:p>
             <a:fld id="{315B5E2C-74AD-4522-9FD7-378DE79797FC}" type="datetimeFigureOut">
               <a:rPr lang="en-US" smtClean="0"/>
-              <a:t>10/31/2021</a:t>
+              <a:t>11/1/2021</a:t>
             </a:fld>
             <a:endParaRPr lang="en-US"/>
           </a:p>
@@ -8744,7 +8749,7 @@
           <a:p>
             <a:fld id="{315B5E2C-74AD-4522-9FD7-378DE79797FC}" type="datetimeFigureOut">
               <a:rPr lang="en-US" smtClean="0"/>
-              <a:t>10/31/2021</a:t>
+              <a:t>11/1/2021</a:t>
             </a:fld>
             <a:endParaRPr lang="en-US"/>
           </a:p>
@@ -9307,7 +9312,7 @@
           <a:p>
             <a:fld id="{315B5E2C-74AD-4522-9FD7-378DE79797FC}" type="datetimeFigureOut">
               <a:rPr lang="en-US" smtClean="0"/>
-              <a:t>10/31/2021</a:t>
+              <a:t>11/1/2021</a:t>
             </a:fld>
             <a:endParaRPr lang="en-US"/>
           </a:p>
@@ -9482,7 +9487,7 @@
           <a:p>
             <a:fld id="{315B5E2C-74AD-4522-9FD7-378DE79797FC}" type="datetimeFigureOut">
               <a:rPr lang="en-US" smtClean="0"/>
-              <a:t>10/31/2021</a:t>
+              <a:t>11/1/2021</a:t>
             </a:fld>
             <a:endParaRPr lang="en-US"/>
           </a:p>
@@ -9733,7 +9738,7 @@
           <a:p>
             <a:fld id="{315B5E2C-74AD-4522-9FD7-378DE79797FC}" type="datetimeFigureOut">
               <a:rPr lang="en-US" smtClean="0"/>
-              <a:t>10/31/2021</a:t>
+              <a:t>11/1/2021</a:t>
             </a:fld>
             <a:endParaRPr lang="en-US"/>
           </a:p>
@@ -10030,7 +10035,7 @@
           <a:p>
             <a:fld id="{315B5E2C-74AD-4522-9FD7-378DE79797FC}" type="datetimeFigureOut">
               <a:rPr lang="en-US" smtClean="0"/>
-              <a:t>10/31/2021</a:t>
+              <a:t>11/1/2021</a:t>
             </a:fld>
             <a:endParaRPr lang="en-US"/>
           </a:p>
@@ -10472,7 +10477,7 @@
           <a:p>
             <a:fld id="{315B5E2C-74AD-4522-9FD7-378DE79797FC}" type="datetimeFigureOut">
               <a:rPr lang="en-US" smtClean="0"/>
-              <a:t>10/31/2021</a:t>
+              <a:t>11/1/2021</a:t>
             </a:fld>
             <a:endParaRPr lang="en-US"/>
           </a:p>
@@ -10769,7 +10774,7 @@
           <a:p>
             <a:fld id="{315B5E2C-74AD-4522-9FD7-378DE79797FC}" type="datetimeFigureOut">
               <a:rPr lang="en-US" smtClean="0"/>
-              <a:t>10/31/2021</a:t>
+              <a:t>11/1/2021</a:t>
             </a:fld>
             <a:endParaRPr lang="en-US"/>
           </a:p>
@@ -10887,7 +10892,7 @@
           <a:p>
             <a:fld id="{315B5E2C-74AD-4522-9FD7-378DE79797FC}" type="datetimeFigureOut">
               <a:rPr lang="en-US" smtClean="0"/>
-              <a:t>10/31/2021</a:t>
+              <a:t>11/1/2021</a:t>
             </a:fld>
             <a:endParaRPr lang="en-US"/>
           </a:p>
@@ -10982,7 +10987,7 @@
           <a:p>
             <a:fld id="{315B5E2C-74AD-4522-9FD7-378DE79797FC}" type="datetimeFigureOut">
               <a:rPr lang="en-US" smtClean="0"/>
-              <a:t>10/31/2021</a:t>
+              <a:t>11/1/2021</a:t>
             </a:fld>
             <a:endParaRPr lang="en-US"/>
           </a:p>
@@ -11265,7 +11270,7 @@
           <a:p>
             <a:fld id="{315B5E2C-74AD-4522-9FD7-378DE79797FC}" type="datetimeFigureOut">
               <a:rPr lang="en-US" smtClean="0"/>
-              <a:t>10/31/2021</a:t>
+              <a:t>11/1/2021</a:t>
             </a:fld>
             <a:endParaRPr lang="en-US"/>
           </a:p>
@@ -11556,7 +11561,7 @@
           <a:p>
             <a:fld id="{315B5E2C-74AD-4522-9FD7-378DE79797FC}" type="datetimeFigureOut">
               <a:rPr lang="en-US" smtClean="0"/>
-              <a:t>10/31/2021</a:t>
+              <a:t>11/1/2021</a:t>
             </a:fld>
             <a:endParaRPr lang="en-US"/>
           </a:p>
@@ -11847,7 +11852,7 @@
           <a:p>
             <a:fld id="{315B5E2C-74AD-4522-9FD7-378DE79797FC}" type="datetimeFigureOut">
               <a:rPr lang="en-US" smtClean="0"/>
-              <a:t>10/31/2021</a:t>
+              <a:t>11/1/2021</a:t>
             </a:fld>
             <a:endParaRPr lang="en-US"/>
           </a:p>
@@ -12095,7 +12100,7 @@
           <a:p>
             <a:fld id="{315B5E2C-74AD-4522-9FD7-378DE79797FC}" type="datetimeFigureOut">
               <a:rPr lang="en-US" smtClean="0"/>
-              <a:t>10/31/2021</a:t>
+              <a:t>11/1/2021</a:t>
             </a:fld>
             <a:endParaRPr lang="en-US"/>
           </a:p>
@@ -12635,7 +12640,7 @@
           <a:p>
             <a:fld id="{315B5E2C-74AD-4522-9FD7-378DE79797FC}" type="datetimeFigureOut">
               <a:rPr lang="en-US" smtClean="0"/>
-              <a:t>10/31/2021</a:t>
+              <a:t>11/1/2021</a:t>
             </a:fld>
             <a:endParaRPr lang="en-US"/>
           </a:p>
@@ -12883,7 +12888,7 @@
           <a:p>
             <a:fld id="{315B5E2C-74AD-4522-9FD7-378DE79797FC}" type="datetimeFigureOut">
               <a:rPr lang="en-US" smtClean="0"/>
-              <a:t>10/31/2021</a:t>
+              <a:t>11/1/2021</a:t>
             </a:fld>
             <a:endParaRPr lang="en-US"/>
           </a:p>
@@ -13415,7 +13420,7 @@
           <a:p>
             <a:fld id="{315B5E2C-74AD-4522-9FD7-378DE79797FC}" type="datetimeFigureOut">
               <a:rPr lang="en-US" smtClean="0"/>
-              <a:t>10/31/2021</a:t>
+              <a:t>11/1/2021</a:t>
             </a:fld>
             <a:endParaRPr lang="en-US"/>
           </a:p>
@@ -13712,7 +13717,7 @@
           <a:p>
             <a:fld id="{315B5E2C-74AD-4522-9FD7-378DE79797FC}" type="datetimeFigureOut">
               <a:rPr lang="en-US" smtClean="0"/>
-              <a:t>10/31/2021</a:t>
+              <a:t>11/1/2021</a:t>
             </a:fld>
             <a:endParaRPr lang="en-US"/>
           </a:p>
@@ -14154,7 +14159,7 @@
           <a:p>
             <a:fld id="{315B5E2C-74AD-4522-9FD7-378DE79797FC}" type="datetimeFigureOut">
               <a:rPr lang="en-US" smtClean="0"/>
-              <a:t>10/31/2021</a:t>
+              <a:t>11/1/2021</a:t>
             </a:fld>
             <a:endParaRPr lang="en-US"/>
           </a:p>
@@ -14328,7 +14333,7 @@
           <a:p>
             <a:fld id="{315B5E2C-74AD-4522-9FD7-378DE79797FC}" type="datetimeFigureOut">
               <a:rPr lang="en-US" smtClean="0"/>
-              <a:t>10/31/2021</a:t>
+              <a:t>11/1/2021</a:t>
             </a:fld>
             <a:endParaRPr lang="en-US"/>
           </a:p>
@@ -14508,7 +14513,7 @@
           <a:p>
             <a:fld id="{315B5E2C-74AD-4522-9FD7-378DE79797FC}" type="datetimeFigureOut">
               <a:rPr lang="en-US" smtClean="0"/>
-              <a:t>10/31/2021</a:t>
+              <a:t>11/1/2021</a:t>
             </a:fld>
             <a:endParaRPr lang="en-US"/>
           </a:p>
@@ -15071,7 +15076,7 @@
           <a:p>
             <a:fld id="{315B5E2C-74AD-4522-9FD7-378DE79797FC}" type="datetimeFigureOut">
               <a:rPr lang="en-US" smtClean="0"/>
-              <a:t>10/31/2021</a:t>
+              <a:t>11/1/2021</a:t>
             </a:fld>
             <a:endParaRPr lang="en-US"/>
           </a:p>
@@ -15246,7 +15251,7 @@
           <a:p>
             <a:fld id="{315B5E2C-74AD-4522-9FD7-378DE79797FC}" type="datetimeFigureOut">
               <a:rPr lang="en-US" smtClean="0"/>
-              <a:t>10/31/2021</a:t>
+              <a:t>11/1/2021</a:t>
             </a:fld>
             <a:endParaRPr lang="en-US"/>
           </a:p>
@@ -15497,7 +15502,7 @@
           <a:p>
             <a:fld id="{315B5E2C-74AD-4522-9FD7-378DE79797FC}" type="datetimeFigureOut">
               <a:rPr lang="en-US" smtClean="0"/>
-              <a:t>10/31/2021</a:t>
+              <a:t>11/1/2021</a:t>
             </a:fld>
             <a:endParaRPr lang="en-US"/>
           </a:p>
@@ -15794,7 +15799,7 @@
           <a:p>
             <a:fld id="{315B5E2C-74AD-4522-9FD7-378DE79797FC}" type="datetimeFigureOut">
               <a:rPr lang="en-US" smtClean="0"/>
-              <a:t>10/31/2021</a:t>
+              <a:t>11/1/2021</a:t>
             </a:fld>
             <a:endParaRPr lang="en-US"/>
           </a:p>
@@ -16236,7 +16241,7 @@
           <a:p>
             <a:fld id="{315B5E2C-74AD-4522-9FD7-378DE79797FC}" type="datetimeFigureOut">
               <a:rPr lang="en-US" smtClean="0"/>
-              <a:t>10/31/2021</a:t>
+              <a:t>11/1/2021</a:t>
             </a:fld>
             <a:endParaRPr lang="en-US"/>
           </a:p>
@@ -16354,7 +16359,7 @@
           <a:p>
             <a:fld id="{315B5E2C-74AD-4522-9FD7-378DE79797FC}" type="datetimeFigureOut">
               <a:rPr lang="en-US" smtClean="0"/>
-              <a:t>10/31/2021</a:t>
+              <a:t>11/1/2021</a:t>
             </a:fld>
             <a:endParaRPr lang="en-US"/>
           </a:p>
@@ -16449,7 +16454,7 @@
           <a:p>
             <a:fld id="{315B5E2C-74AD-4522-9FD7-378DE79797FC}" type="datetimeFigureOut">
               <a:rPr lang="en-US" smtClean="0"/>
-              <a:t>10/31/2021</a:t>
+              <a:t>11/1/2021</a:t>
             </a:fld>
             <a:endParaRPr lang="en-US"/>
           </a:p>
@@ -16732,7 +16737,7 @@
           <a:p>
             <a:fld id="{315B5E2C-74AD-4522-9FD7-378DE79797FC}" type="datetimeFigureOut">
               <a:rPr lang="en-US" smtClean="0"/>
-              <a:t>10/31/2021</a:t>
+              <a:t>11/1/2021</a:t>
             </a:fld>
             <a:endParaRPr lang="en-US"/>
           </a:p>
@@ -16850,7 +16855,7 @@
           <a:p>
             <a:fld id="{315B5E2C-74AD-4522-9FD7-378DE79797FC}" type="datetimeFigureOut">
               <a:rPr lang="en-US" smtClean="0"/>
-              <a:t>10/31/2021</a:t>
+              <a:t>11/1/2021</a:t>
             </a:fld>
             <a:endParaRPr lang="en-US"/>
           </a:p>
@@ -17141,7 +17146,7 @@
           <a:p>
             <a:fld id="{315B5E2C-74AD-4522-9FD7-378DE79797FC}" type="datetimeFigureOut">
               <a:rPr lang="en-US" smtClean="0"/>
-              <a:t>10/31/2021</a:t>
+              <a:t>11/1/2021</a:t>
             </a:fld>
             <a:endParaRPr lang="en-US"/>
           </a:p>
@@ -17432,7 +17437,7 @@
           <a:p>
             <a:fld id="{315B5E2C-74AD-4522-9FD7-378DE79797FC}" type="datetimeFigureOut">
               <a:rPr lang="en-US" smtClean="0"/>
-              <a:t>10/31/2021</a:t>
+              <a:t>11/1/2021</a:t>
             </a:fld>
             <a:endParaRPr lang="en-US"/>
           </a:p>
@@ -17680,7 +17685,7 @@
           <a:p>
             <a:fld id="{315B5E2C-74AD-4522-9FD7-378DE79797FC}" type="datetimeFigureOut">
               <a:rPr lang="en-US" smtClean="0"/>
-              <a:t>10/31/2021</a:t>
+              <a:t>11/1/2021</a:t>
             </a:fld>
             <a:endParaRPr lang="en-US"/>
           </a:p>
@@ -18220,7 +18225,7 @@
           <a:p>
             <a:fld id="{315B5E2C-74AD-4522-9FD7-378DE79797FC}" type="datetimeFigureOut">
               <a:rPr lang="en-US" smtClean="0"/>
-              <a:t>10/31/2021</a:t>
+              <a:t>11/1/2021</a:t>
             </a:fld>
             <a:endParaRPr lang="en-US"/>
           </a:p>
@@ -18468,7 +18473,7 @@
           <a:p>
             <a:fld id="{315B5E2C-74AD-4522-9FD7-378DE79797FC}" type="datetimeFigureOut">
               <a:rPr lang="en-US" smtClean="0"/>
-              <a:t>10/31/2021</a:t>
+              <a:t>11/1/2021</a:t>
             </a:fld>
             <a:endParaRPr lang="en-US"/>
           </a:p>
@@ -19000,7 +19005,7 @@
           <a:p>
             <a:fld id="{315B5E2C-74AD-4522-9FD7-378DE79797FC}" type="datetimeFigureOut">
               <a:rPr lang="en-US" smtClean="0"/>
-              <a:t>10/31/2021</a:t>
+              <a:t>11/1/2021</a:t>
             </a:fld>
             <a:endParaRPr lang="en-US"/>
           </a:p>
@@ -19297,7 +19302,7 @@
           <a:p>
             <a:fld id="{315B5E2C-74AD-4522-9FD7-378DE79797FC}" type="datetimeFigureOut">
               <a:rPr lang="en-US" smtClean="0"/>
-              <a:t>10/31/2021</a:t>
+              <a:t>11/1/2021</a:t>
             </a:fld>
             <a:endParaRPr lang="en-US"/>
           </a:p>
@@ -19471,7 +19476,7 @@
           <a:p>
             <a:fld id="{315B5E2C-74AD-4522-9FD7-378DE79797FC}" type="datetimeFigureOut">
               <a:rPr lang="en-US" smtClean="0"/>
-              <a:t>10/31/2021</a:t>
+              <a:t>11/1/2021</a:t>
             </a:fld>
             <a:endParaRPr lang="en-US"/>
           </a:p>
@@ -19651,7 +19656,7 @@
           <a:p>
             <a:fld id="{315B5E2C-74AD-4522-9FD7-378DE79797FC}" type="datetimeFigureOut">
               <a:rPr lang="en-US" smtClean="0"/>
-              <a:t>10/31/2021</a:t>
+              <a:t>11/1/2021</a:t>
             </a:fld>
             <a:endParaRPr lang="en-US"/>
           </a:p>
@@ -19746,7 +19751,7 @@
           <a:p>
             <a:fld id="{315B5E2C-74AD-4522-9FD7-378DE79797FC}" type="datetimeFigureOut">
               <a:rPr lang="en-US" smtClean="0"/>
-              <a:t>10/31/2021</a:t>
+              <a:t>11/1/2021</a:t>
             </a:fld>
             <a:endParaRPr lang="en-US"/>
           </a:p>
@@ -20029,7 +20034,7 @@
           <a:p>
             <a:fld id="{315B5E2C-74AD-4522-9FD7-378DE79797FC}" type="datetimeFigureOut">
               <a:rPr lang="en-US" smtClean="0"/>
-              <a:t>10/31/2021</a:t>
+              <a:t>11/1/2021</a:t>
             </a:fld>
             <a:endParaRPr lang="en-US"/>
           </a:p>
@@ -20320,7 +20325,7 @@
           <a:p>
             <a:fld id="{315B5E2C-74AD-4522-9FD7-378DE79797FC}" type="datetimeFigureOut">
               <a:rPr lang="en-US" smtClean="0"/>
-              <a:t>10/31/2021</a:t>
+              <a:t>11/1/2021</a:t>
             </a:fld>
             <a:endParaRPr lang="en-US"/>
           </a:p>
@@ -20850,7 +20855,7 @@
           <a:p>
             <a:fld id="{315B5E2C-74AD-4522-9FD7-378DE79797FC}" type="datetimeFigureOut">
               <a:rPr lang="en-US" smtClean="0"/>
-              <a:t>10/31/2021</a:t>
+              <a:t>11/1/2021</a:t>
             </a:fld>
             <a:endParaRPr lang="en-US"/>
           </a:p>
@@ -21833,7 +21838,7 @@
           <a:p>
             <a:fld id="{315B5E2C-74AD-4522-9FD7-378DE79797FC}" type="datetimeFigureOut">
               <a:rPr lang="en-US" smtClean="0"/>
-              <a:t>10/31/2021</a:t>
+              <a:t>11/1/2021</a:t>
             </a:fld>
             <a:endParaRPr lang="en-US"/>
           </a:p>
@@ -22816,7 +22821,7 @@
           <a:p>
             <a:fld id="{315B5E2C-74AD-4522-9FD7-378DE79797FC}" type="datetimeFigureOut">
               <a:rPr lang="en-US" smtClean="0"/>
-              <a:t>10/31/2021</a:t>
+              <a:t>11/1/2021</a:t>
             </a:fld>
             <a:endParaRPr lang="en-US"/>
           </a:p>
@@ -23799,7 +23804,7 @@
           <a:p>
             <a:fld id="{315B5E2C-74AD-4522-9FD7-378DE79797FC}" type="datetimeFigureOut">
               <a:rPr lang="en-US" smtClean="0"/>
-              <a:t>10/31/2021</a:t>
+              <a:t>11/1/2021</a:t>
             </a:fld>
             <a:endParaRPr lang="en-US"/>
           </a:p>
@@ -26529,7 +26534,7 @@
           <a:p>
             <a:r>
               <a:rPr lang="sr-Cyrl-RS" dirty="0"/>
-              <a:t>Комуникација се дели у два режима: иницијални и устаљени</a:t>
+              <a:t>Дели се у два режима: иницијални и устаљени</a:t>
             </a:r>
           </a:p>
           <a:p>
@@ -26541,7 +26546,19 @@
           <a:p>
             <a:r>
               <a:rPr lang="sr-Cyrl-RS" dirty="0"/>
-              <a:t>Устаљени режим: провера доступности видео преноса по захтеву и благовремено ажурирање листе активних видео преноса</a:t>
+              <a:t>Устаљени режим: провера доступности </a:t>
+            </a:r>
+            <a:r>
+              <a:rPr lang="en-US" i="1" dirty="0"/>
+              <a:t>On-Demand</a:t>
+            </a:r>
+            <a:r>
+              <a:rPr lang="en-US" dirty="0"/>
+              <a:t> </a:t>
+            </a:r>
+            <a:r>
+              <a:rPr lang="sr-Cyrl-RS" dirty="0"/>
+              <a:t>преноса и благовремено ажурирање листе активних видео преноса</a:t>
             </a:r>
           </a:p>
         </p:txBody>
@@ -26661,7 +26678,57 @@
           </a:bodyPr>
           <a:lstStyle/>
           <a:p>
-            <a:endParaRPr lang="sr-Cyrl-RS" dirty="0"/>
+            <a:r>
+              <a:rPr lang="en-US" i="1" dirty="0"/>
+              <a:t>MySQL</a:t>
+            </a:r>
+          </a:p>
+          <a:p>
+            <a:r>
+              <a:rPr lang="sr-Cyrl-RS" dirty="0"/>
+              <a:t>Мрежни менаџер користи </a:t>
+            </a:r>
+            <a:r>
+              <a:rPr lang="en-US" i="1" dirty="0"/>
+              <a:t>MySQL</a:t>
+            </a:r>
+            <a:r>
+              <a:rPr lang="sr-Cyrl-RS" i="1" dirty="0"/>
+              <a:t> </a:t>
+            </a:r>
+            <a:r>
+              <a:rPr lang="en-US" i="1" dirty="0"/>
+              <a:t>C API</a:t>
+            </a:r>
+            <a:r>
+              <a:rPr lang="sr-Cyrl-RS" dirty="0"/>
+              <a:t> за управљање</a:t>
+            </a:r>
+          </a:p>
+          <a:p>
+            <a:r>
+              <a:rPr lang="sr-Cyrl-RS" dirty="0"/>
+              <a:t>Администраторски креденцијали</a:t>
+            </a:r>
+          </a:p>
+          <a:p>
+            <a:r>
+              <a:rPr lang="sr-Cyrl-RS" dirty="0"/>
+              <a:t>Захтев који се шаље је у форми команде коју администратор може унети преко терминала</a:t>
+            </a:r>
+          </a:p>
+          <a:p>
+            <a:r>
+              <a:rPr lang="sr-Cyrl-RS" dirty="0"/>
+              <a:t>Пријава – читање са базе на основу упита</a:t>
+            </a:r>
+          </a:p>
+          <a:p>
+            <a:r>
+              <a:rPr lang="sr-Cyrl-RS" dirty="0"/>
+              <a:t>Регистрација – читање са базе на основу упита + унос нових података</a:t>
+            </a:r>
+            <a:endParaRPr lang="en-US" dirty="0"/>
           </a:p>
         </p:txBody>
       </p:sp>
@@ -26780,7 +26847,53 @@
           </a:bodyPr>
           <a:lstStyle/>
           <a:p>
-            <a:endParaRPr lang="sr-Cyrl-RS" dirty="0"/>
+            <a:r>
+              <a:rPr lang="sr-Cyrl-RS" dirty="0"/>
+              <a:t>Извршава се уз помоћ </a:t>
+            </a:r>
+            <a:r>
+              <a:rPr lang="en-US" i="1" dirty="0"/>
+              <a:t>Crypto++ </a:t>
+            </a:r>
+            <a:r>
+              <a:rPr lang="sr-Cyrl-RS" dirty="0"/>
+              <a:t>библиотеке</a:t>
+            </a:r>
+          </a:p>
+          <a:p>
+            <a:r>
+              <a:rPr lang="sr-Cyrl-RS" dirty="0"/>
+              <a:t>Користи се симетрична енкрипција – </a:t>
+            </a:r>
+            <a:r>
+              <a:rPr lang="en-US" i="1" dirty="0"/>
+              <a:t>AES</a:t>
+            </a:r>
+            <a:r>
+              <a:rPr lang="sr-Cyrl-RS" i="1" dirty="0"/>
+              <a:t> </a:t>
+            </a:r>
+            <a:r>
+              <a:rPr lang="sr-Cyrl-RS" dirty="0"/>
+              <a:t>– </a:t>
+            </a:r>
+            <a:r>
+              <a:rPr lang="en-US" i="1" dirty="0"/>
+              <a:t>Advanced Encryption System</a:t>
+            </a:r>
+            <a:endParaRPr lang="en-US" dirty="0"/>
+          </a:p>
+          <a:p>
+            <a:r>
+              <a:rPr lang="sr-Cyrl-RS" dirty="0"/>
+              <a:t>Двосмерна енкрипција – криптују се и клијентске и серверске поруке</a:t>
+            </a:r>
+          </a:p>
+          <a:p>
+            <a:r>
+              <a:rPr lang="sr-Cyrl-RS" dirty="0"/>
+              <a:t>Обе стране унапред знају јавни кључ и вектор иницијализације, који су неопходни за декрипцију порука</a:t>
+            </a:r>
           </a:p>
         </p:txBody>
       </p:sp>
@@ -27130,7 +27243,97 @@
           </a:bodyPr>
           <a:lstStyle/>
           <a:p>
-            <a:endParaRPr lang="sr-Cyrl-RS" dirty="0"/>
+            <a:r>
+              <a:rPr lang="sr-Cyrl-RS" dirty="0"/>
+              <a:t>Задужен за комуникацију са сервером и одабир преноса</a:t>
+            </a:r>
+          </a:p>
+          <a:p>
+            <a:r>
+              <a:rPr lang="sr-Cyrl-RS" dirty="0"/>
+              <a:t>Припрема терен за </a:t>
+            </a:r>
+            <a:r>
+              <a:rPr lang="en-US" i="1" dirty="0"/>
+              <a:t>RTP</a:t>
+            </a:r>
+            <a:r>
+              <a:rPr lang="sr-Cyrl-RS" i="1" dirty="0"/>
+              <a:t> </a:t>
+            </a:r>
+            <a:r>
+              <a:rPr lang="sr-Cyrl-RS" dirty="0"/>
+              <a:t>клијента</a:t>
+            </a:r>
+          </a:p>
+          <a:p>
+            <a:r>
+              <a:rPr lang="sr-Cyrl-RS" dirty="0"/>
+              <a:t>Започиње рад двоструким кликом на један од понуђених преноса</a:t>
+            </a:r>
+          </a:p>
+          <a:p>
+            <a:r>
+              <a:rPr lang="sr-Cyrl-RS" dirty="0"/>
+              <a:t>Захтеви које шаље: </a:t>
+            </a:r>
+          </a:p>
+          <a:p>
+            <a:pPr lvl="1"/>
+            <a:r>
+              <a:rPr lang="en-US" sz="2400" i="1" dirty="0"/>
+              <a:t>Options</a:t>
+            </a:r>
+            <a:r>
+              <a:rPr lang="en-US" sz="2400" dirty="0"/>
+              <a:t>, </a:t>
+            </a:r>
+            <a:r>
+              <a:rPr lang="en-US" sz="2400" i="1" dirty="0"/>
+              <a:t>Describe, Setup </a:t>
+            </a:r>
+            <a:r>
+              <a:rPr lang="sr-Cyrl-RS" sz="2400" dirty="0"/>
+              <a:t>и</a:t>
+            </a:r>
+            <a:r>
+              <a:rPr lang="en-US" sz="2400" dirty="0"/>
+              <a:t> </a:t>
+            </a:r>
+            <a:r>
+              <a:rPr lang="en-US" sz="2400" i="1" dirty="0"/>
+              <a:t>Play</a:t>
+            </a:r>
+            <a:r>
+              <a:rPr lang="sr-Cyrl-RS" sz="2400" i="1" dirty="0"/>
+              <a:t> </a:t>
+            </a:r>
+            <a:r>
+              <a:rPr lang="sr-Cyrl-RS" sz="2400" dirty="0"/>
+              <a:t>за успоставу видео преноса</a:t>
+            </a:r>
+          </a:p>
+          <a:p>
+            <a:pPr lvl="1"/>
+            <a:r>
+              <a:rPr lang="en-US" sz="2400" i="1" dirty="0"/>
+              <a:t>Teardown</a:t>
+            </a:r>
+            <a:r>
+              <a:rPr lang="en-US" sz="2400" dirty="0"/>
+              <a:t> </a:t>
+            </a:r>
+            <a:r>
+              <a:rPr lang="sr-Cyrl-RS" sz="2400" dirty="0"/>
+              <a:t>за прекид видео преноса</a:t>
+            </a:r>
+            <a:endParaRPr lang="sr-Cyrl-RS" sz="2400" i="1" dirty="0"/>
+          </a:p>
+          <a:p>
+            <a:r>
+              <a:rPr lang="sr-Cyrl-RS" dirty="0"/>
+              <a:t>Након потврдног одговора за послате захтеве поседује све информације неопходне за приказ видео преноса</a:t>
+            </a:r>
           </a:p>
         </p:txBody>
       </p:sp>
@@ -27237,7 +27440,72 @@
           </a:bodyPr>
           <a:lstStyle/>
           <a:p>
-            <a:endParaRPr lang="sr-Cyrl-RS" dirty="0"/>
+            <a:r>
+              <a:rPr lang="sr-Cyrl-RS" dirty="0"/>
+              <a:t>Рад у позадинској нити</a:t>
+            </a:r>
+          </a:p>
+          <a:p>
+            <a:r>
+              <a:rPr lang="sr-Cyrl-RS" dirty="0"/>
+              <a:t>Пријем, колекцију и композицију послатих </a:t>
+            </a:r>
+            <a:r>
+              <a:rPr lang="en-US" i="1" dirty="0"/>
+              <a:t>RTP</a:t>
+            </a:r>
+            <a:r>
+              <a:rPr lang="sr-Cyrl-RS" i="1" dirty="0"/>
+              <a:t> </a:t>
+            </a:r>
+            <a:r>
+              <a:rPr lang="sr-Cyrl-RS" dirty="0"/>
+              <a:t>пакета</a:t>
+            </a:r>
+          </a:p>
+          <a:p>
+            <a:r>
+              <a:rPr lang="en-US" i="1" dirty="0"/>
+              <a:t>H.264 </a:t>
+            </a:r>
+            <a:r>
+              <a:rPr lang="sr-Cyrl-RS" dirty="0"/>
+              <a:t>декомпресија</a:t>
+            </a:r>
+            <a:endParaRPr lang="en-US" dirty="0"/>
+          </a:p>
+          <a:p>
+            <a:r>
+              <a:rPr lang="sr-Cyrl-RS" dirty="0"/>
+              <a:t>Приказивање фрејмова на главном прозору</a:t>
+            </a:r>
+            <a:endParaRPr lang="sr-Cyrl-RS" i="1" dirty="0"/>
+          </a:p>
+          <a:p>
+            <a:r>
+              <a:rPr lang="sr-Cyrl-RS" dirty="0"/>
+              <a:t>Исти принцип рада и за </a:t>
+            </a:r>
+            <a:r>
+              <a:rPr lang="en-US" i="1" dirty="0"/>
+              <a:t>On-Demand </a:t>
+            </a:r>
+            <a:r>
+              <a:rPr lang="sr-Cyrl-RS" dirty="0"/>
+              <a:t>и за </a:t>
+            </a:r>
+            <a:r>
+              <a:rPr lang="en-US" i="1" dirty="0"/>
+              <a:t>Live Streaming</a:t>
+            </a:r>
+            <a:r>
+              <a:rPr lang="sr-Cyrl-RS" i="1" dirty="0"/>
+              <a:t> </a:t>
+            </a:r>
+            <a:r>
+              <a:rPr lang="sr-Cyrl-RS" dirty="0"/>
+              <a:t>– другачије конфигурисање клијента</a:t>
+            </a:r>
           </a:p>
         </p:txBody>
       </p:sp>
@@ -27454,7 +27722,58 @@
           </a:bodyPr>
           <a:lstStyle/>
           <a:p>
-            <a:endParaRPr lang="sr-Cyrl-RS" dirty="0"/>
+            <a:r>
+              <a:rPr lang="sr-Cyrl-RS" dirty="0"/>
+              <a:t>Модул који први започиње са радом у оквиру </a:t>
+            </a:r>
+          </a:p>
+          <a:p>
+            <a:r>
+              <a:rPr lang="sr-Cyrl-RS" dirty="0"/>
+              <a:t>Комуникација са мрежним менаџером</a:t>
+            </a:r>
+          </a:p>
+          <a:p>
+            <a:r>
+              <a:rPr lang="sr-Cyrl-RS" dirty="0"/>
+              <a:t>Акције регистрације и/или пријаве корисника – </a:t>
+            </a:r>
+            <a:r>
+              <a:rPr lang="en-US" i="1" dirty="0"/>
+              <a:t>Dialog</a:t>
+            </a:r>
+            <a:r>
+              <a:rPr lang="sr-Cyrl-RS" i="1" dirty="0"/>
+              <a:t> </a:t>
+            </a:r>
+            <a:r>
+              <a:rPr lang="sr-Cyrl-RS" dirty="0"/>
+              <a:t>прозор</a:t>
+            </a:r>
+          </a:p>
+          <a:p>
+            <a:r>
+              <a:rPr lang="sr-Cyrl-RS" dirty="0"/>
+              <a:t>Добављање активних видео преноса и провера заузетости</a:t>
+            </a:r>
+            <a:r>
+              <a:rPr lang="en-US" dirty="0"/>
+              <a:t> </a:t>
+            </a:r>
+            <a:r>
+              <a:rPr lang="en-US" i="1" dirty="0"/>
+              <a:t>On-Demand</a:t>
+            </a:r>
+            <a:r>
+              <a:rPr lang="sr-Cyrl-RS" dirty="0"/>
+              <a:t> преноса</a:t>
+            </a:r>
+          </a:p>
+          <a:p>
+            <a:r>
+              <a:rPr lang="sr-Cyrl-RS" dirty="0"/>
+              <a:t>Енкрипција послатих и декрипција примљених порука</a:t>
+            </a:r>
           </a:p>
         </p:txBody>
       </p:sp>
@@ -27806,267 +28125,148 @@
       </p:sp>
       <p:sp>
         <p:nvSpPr>
-          <p:cNvPr id="5" name="Content Placeholder 2">
+          <p:cNvPr id="3" name="Content Placeholder 2">
             <a:extLst>
               <a:ext uri="{FF2B5EF4-FFF2-40B4-BE49-F238E27FC236}">
-                <a16:creationId xmlns:a16="http://schemas.microsoft.com/office/drawing/2014/main" id="{F67504AE-6953-4E4E-BD58-4A47027627DD}"/>
+                <a16:creationId xmlns:a16="http://schemas.microsoft.com/office/drawing/2014/main" id="{B926073A-16BE-4E3A-B0E0-F005707F5EC4}"/>
               </a:ext>
             </a:extLst>
           </p:cNvPr>
-          <p:cNvSpPr txBox="1">
-            <a:spLocks/>
-          </p:cNvSpPr>
-          <p:nvPr/>
+          <p:cNvSpPr>
+            <a:spLocks noGrp="1"/>
+          </p:cNvSpPr>
+          <p:nvPr>
+            <p:ph idx="1"/>
+          </p:nvPr>
         </p:nvSpPr>
         <p:spPr>
           <a:xfrm>
-            <a:off x="1769877" y="1683799"/>
-            <a:ext cx="9877626" cy="4350057"/>
+            <a:off x="1216240" y="1167415"/>
+            <a:ext cx="10839635" cy="4691847"/>
           </a:xfrm>
-          <a:prstGeom prst="rect">
-            <a:avLst/>
-          </a:prstGeom>
         </p:spPr>
         <p:txBody>
-          <a:bodyPr vert="horz" lIns="91440" tIns="45720" rIns="91440" bIns="45720" rtlCol="0" anchor="ctr">
+          <a:bodyPr>
             <a:normAutofit/>
           </a:bodyPr>
-          <a:lstStyle>
-            <a:lvl1pPr marL="285750" indent="-285750" algn="l" defTabSz="457200" rtl="0" eaLnBrk="1" latinLnBrk="0" hangingPunct="1">
-              <a:spcBef>
-                <a:spcPct val="20000"/>
-              </a:spcBef>
-              <a:spcAft>
-                <a:spcPts val="600"/>
-              </a:spcAft>
-              <a:buClr>
-                <a:schemeClr val="accent1">
-                  <a:lumMod val="75000"/>
-                </a:schemeClr>
-              </a:buClr>
-              <a:buSzPct val="145000"/>
-              <a:buFont typeface="Arial"/>
-              <a:buChar char="•"/>
-              <a:defRPr sz="2400" kern="1200" cap="none">
-                <a:solidFill>
-                  <a:schemeClr val="tx1"/>
-                </a:solidFill>
-                <a:effectLst/>
-                <a:latin typeface="+mn-lt"/>
-                <a:ea typeface="+mn-ea"/>
-                <a:cs typeface="+mn-cs"/>
-              </a:defRPr>
-            </a:lvl1pPr>
-            <a:lvl2pPr marL="742950" indent="-285750" algn="l" defTabSz="457200" rtl="0" eaLnBrk="1" latinLnBrk="0" hangingPunct="1">
-              <a:spcBef>
-                <a:spcPct val="20000"/>
-              </a:spcBef>
-              <a:spcAft>
-                <a:spcPts val="600"/>
-              </a:spcAft>
-              <a:buClr>
-                <a:schemeClr val="accent1">
-                  <a:lumMod val="75000"/>
-                </a:schemeClr>
-              </a:buClr>
-              <a:buSzPct val="145000"/>
-              <a:buFont typeface="Arial"/>
-              <a:buChar char="•"/>
-              <a:defRPr sz="2000" kern="1200" cap="none">
-                <a:solidFill>
-                  <a:schemeClr val="tx1"/>
-                </a:solidFill>
-                <a:effectLst/>
-                <a:latin typeface="+mn-lt"/>
-                <a:ea typeface="+mn-ea"/>
-                <a:cs typeface="+mn-cs"/>
-              </a:defRPr>
-            </a:lvl2pPr>
-            <a:lvl3pPr marL="1200150" indent="-285750" algn="l" defTabSz="457200" rtl="0" eaLnBrk="1" latinLnBrk="0" hangingPunct="1">
-              <a:spcBef>
-                <a:spcPct val="20000"/>
-              </a:spcBef>
-              <a:spcAft>
-                <a:spcPts val="600"/>
-              </a:spcAft>
-              <a:buClr>
-                <a:schemeClr val="accent1">
-                  <a:lumMod val="75000"/>
-                </a:schemeClr>
-              </a:buClr>
-              <a:buSzPct val="145000"/>
-              <a:buFont typeface="Arial"/>
-              <a:buChar char="•"/>
-              <a:defRPr sz="1800" kern="1200" cap="none">
-                <a:solidFill>
-                  <a:schemeClr val="tx1"/>
-                </a:solidFill>
-                <a:effectLst/>
-                <a:latin typeface="+mn-lt"/>
-                <a:ea typeface="+mn-ea"/>
-                <a:cs typeface="+mn-cs"/>
-              </a:defRPr>
-            </a:lvl3pPr>
-            <a:lvl4pPr marL="1543050" indent="-171450" algn="l" defTabSz="457200" rtl="0" eaLnBrk="1" latinLnBrk="0" hangingPunct="1">
-              <a:spcBef>
-                <a:spcPct val="20000"/>
-              </a:spcBef>
-              <a:spcAft>
-                <a:spcPts val="600"/>
-              </a:spcAft>
-              <a:buClr>
-                <a:schemeClr val="accent1">
-                  <a:lumMod val="75000"/>
-                </a:schemeClr>
-              </a:buClr>
-              <a:buSzPct val="145000"/>
-              <a:buFont typeface="Arial"/>
-              <a:buChar char="•"/>
-              <a:defRPr sz="1600" kern="1200" cap="none">
-                <a:solidFill>
-                  <a:schemeClr val="tx1"/>
-                </a:solidFill>
-                <a:effectLst/>
-                <a:latin typeface="+mn-lt"/>
-                <a:ea typeface="+mn-ea"/>
-                <a:cs typeface="+mn-cs"/>
-              </a:defRPr>
-            </a:lvl4pPr>
-            <a:lvl5pPr marL="2000250" indent="-171450" algn="l" defTabSz="457200" rtl="0" eaLnBrk="1" latinLnBrk="0" hangingPunct="1">
-              <a:spcBef>
-                <a:spcPct val="20000"/>
-              </a:spcBef>
-              <a:spcAft>
-                <a:spcPts val="600"/>
-              </a:spcAft>
-              <a:buClr>
-                <a:schemeClr val="accent1">
-                  <a:lumMod val="75000"/>
-                </a:schemeClr>
-              </a:buClr>
-              <a:buSzPct val="145000"/>
-              <a:buFont typeface="Arial"/>
-              <a:buChar char="•"/>
-              <a:defRPr sz="1400" kern="1200" cap="none">
-                <a:solidFill>
-                  <a:schemeClr val="tx1"/>
-                </a:solidFill>
-                <a:effectLst/>
-                <a:latin typeface="+mn-lt"/>
-                <a:ea typeface="+mn-ea"/>
-                <a:cs typeface="+mn-cs"/>
-              </a:defRPr>
-            </a:lvl5pPr>
-            <a:lvl6pPr marL="2514600" indent="-228600" algn="l" defTabSz="457200" rtl="0" eaLnBrk="1" latinLnBrk="0" hangingPunct="1">
-              <a:spcBef>
-                <a:spcPct val="20000"/>
-              </a:spcBef>
-              <a:spcAft>
-                <a:spcPts val="600"/>
-              </a:spcAft>
-              <a:buClr>
-                <a:schemeClr val="accent1">
-                  <a:lumMod val="75000"/>
-                </a:schemeClr>
-              </a:buClr>
-              <a:buSzPct val="145000"/>
-              <a:buFont typeface="Arial"/>
-              <a:buChar char="•"/>
-              <a:defRPr sz="1400" kern="1200" cap="none">
-                <a:solidFill>
-                  <a:schemeClr val="tx1"/>
-                </a:solidFill>
-                <a:effectLst/>
-                <a:latin typeface="+mn-lt"/>
-                <a:ea typeface="+mn-ea"/>
-                <a:cs typeface="+mn-cs"/>
-              </a:defRPr>
-            </a:lvl6pPr>
-            <a:lvl7pPr marL="2971800" indent="-228600" algn="l" defTabSz="457200" rtl="0" eaLnBrk="1" latinLnBrk="0" hangingPunct="1">
-              <a:spcBef>
-                <a:spcPct val="20000"/>
-              </a:spcBef>
-              <a:spcAft>
-                <a:spcPts val="600"/>
-              </a:spcAft>
-              <a:buClr>
-                <a:schemeClr val="accent1">
-                  <a:lumMod val="75000"/>
-                </a:schemeClr>
-              </a:buClr>
-              <a:buSzPct val="145000"/>
-              <a:buFont typeface="Arial"/>
-              <a:buChar char="•"/>
-              <a:defRPr sz="1400" kern="1200" cap="none">
-                <a:solidFill>
-                  <a:schemeClr val="tx1"/>
-                </a:solidFill>
-                <a:effectLst/>
-                <a:latin typeface="+mn-lt"/>
-                <a:ea typeface="+mn-ea"/>
-                <a:cs typeface="+mn-cs"/>
-              </a:defRPr>
-            </a:lvl7pPr>
-            <a:lvl8pPr marL="3429000" indent="-228600" algn="l" defTabSz="457200" rtl="0" eaLnBrk="1" latinLnBrk="0" hangingPunct="1">
-              <a:spcBef>
-                <a:spcPct val="20000"/>
-              </a:spcBef>
-              <a:spcAft>
-                <a:spcPts val="600"/>
-              </a:spcAft>
-              <a:buClr>
-                <a:schemeClr val="accent1">
-                  <a:lumMod val="75000"/>
-                </a:schemeClr>
-              </a:buClr>
-              <a:buSzPct val="145000"/>
-              <a:buFont typeface="Arial"/>
-              <a:buChar char="•"/>
-              <a:defRPr sz="1400" kern="1200" cap="none">
-                <a:solidFill>
-                  <a:schemeClr val="tx1"/>
-                </a:solidFill>
-                <a:effectLst/>
-                <a:latin typeface="+mn-lt"/>
-                <a:ea typeface="+mn-ea"/>
-                <a:cs typeface="+mn-cs"/>
-              </a:defRPr>
-            </a:lvl8pPr>
-            <a:lvl9pPr marL="3886200" indent="-228600" algn="l" defTabSz="457200" rtl="0" eaLnBrk="1" latinLnBrk="0" hangingPunct="1">
-              <a:spcBef>
-                <a:spcPct val="20000"/>
-              </a:spcBef>
-              <a:spcAft>
-                <a:spcPts val="600"/>
-              </a:spcAft>
-              <a:buClr>
-                <a:schemeClr val="accent1">
-                  <a:lumMod val="75000"/>
-                </a:schemeClr>
-              </a:buClr>
-              <a:buSzPct val="145000"/>
-              <a:buFont typeface="Arial"/>
-              <a:buChar char="•"/>
-              <a:defRPr sz="1400" kern="1200" cap="none">
-                <a:solidFill>
-                  <a:schemeClr val="tx1"/>
-                </a:solidFill>
-                <a:effectLst/>
-                <a:latin typeface="+mn-lt"/>
-                <a:ea typeface="+mn-ea"/>
-                <a:cs typeface="+mn-cs"/>
-              </a:defRPr>
-            </a:lvl9pPr>
-          </a:lstStyle>
-          <a:p>
-            <a:endParaRPr lang="sr-Cyrl-RS" dirty="0"/>
+          <a:lstStyle/>
+          <a:p>
+            <a:r>
+              <a:rPr lang="sr-Cyrl-RS" dirty="0"/>
+              <a:t>Коначно тестирање показало је да су сви модули система успешно интегрисани и успешно обављају захтеване функционалности</a:t>
+            </a:r>
+          </a:p>
+          <a:p>
+            <a:r>
+              <a:rPr lang="sr-Cyrl-RS" dirty="0"/>
+              <a:t>Предлози за побољшање система:</a:t>
+            </a:r>
+          </a:p>
+          <a:p>
+            <a:pPr lvl="1"/>
+            <a:r>
+              <a:rPr lang="sr-Cyrl-RS" dirty="0"/>
+              <a:t>Подржати паузирање </a:t>
+            </a:r>
+            <a:r>
+              <a:rPr lang="en-US" i="1" dirty="0"/>
+              <a:t>On-Demand</a:t>
+            </a:r>
+            <a:r>
+              <a:rPr lang="sr-Cyrl-RS" i="1" dirty="0"/>
+              <a:t> </a:t>
+            </a:r>
+            <a:r>
+              <a:rPr lang="sr-Cyrl-RS" dirty="0"/>
+              <a:t>преноса и пуштање насумичних делова снимка</a:t>
+            </a:r>
+          </a:p>
+          <a:p>
+            <a:pPr lvl="1"/>
+            <a:r>
+              <a:rPr lang="sr-Cyrl-RS" dirty="0"/>
+              <a:t>Раздвојити модуле серверске апликације у више нодова:</a:t>
+            </a:r>
+          </a:p>
+          <a:p>
+            <a:pPr marL="1371600" lvl="2" indent="-457200">
+              <a:buFont typeface="+mj-lt"/>
+              <a:buAutoNum type="arabicPeriod"/>
+            </a:pPr>
+            <a:r>
+              <a:rPr lang="sr-Cyrl-RS" dirty="0"/>
+              <a:t>Апликација која пласира живи пренос и врши видео записивање</a:t>
+            </a:r>
+          </a:p>
+          <a:p>
+            <a:pPr marL="1371600" lvl="2" indent="-457200">
+              <a:buFont typeface="+mj-lt"/>
+              <a:buAutoNum type="arabicPeriod"/>
+            </a:pPr>
+            <a:r>
+              <a:rPr lang="sr-Cyrl-RS" dirty="0"/>
+              <a:t>Апликација која је задужена за </a:t>
+            </a:r>
+            <a:r>
+              <a:rPr lang="en-US" i="1" dirty="0"/>
+              <a:t>On-Demand</a:t>
+            </a:r>
+            <a:r>
+              <a:rPr lang="sr-Cyrl-RS" i="1" dirty="0"/>
+              <a:t> </a:t>
+            </a:r>
+            <a:r>
+              <a:rPr lang="sr-Cyrl-RS" dirty="0"/>
+              <a:t>пренос </a:t>
+            </a:r>
+          </a:p>
+          <a:p>
+            <a:pPr marL="1371600" lvl="2" indent="-457200">
+              <a:buFont typeface="+mj-lt"/>
+              <a:buAutoNum type="arabicPeriod"/>
+            </a:pPr>
+            <a:r>
+              <a:rPr lang="sr-Cyrl-RS" dirty="0"/>
+              <a:t>Апликација која је задужена за евиденцију корисника, управљање базом и преусмеравање на видео пренос</a:t>
+            </a:r>
+          </a:p>
+          <a:p>
+            <a:pPr lvl="1"/>
+            <a:r>
+              <a:rPr lang="sr-Cyrl-RS" dirty="0"/>
+              <a:t>Имплементирати </a:t>
+            </a:r>
+            <a:r>
+              <a:rPr lang="en-US" i="1" dirty="0"/>
+              <a:t>Watchdog</a:t>
+            </a:r>
+            <a:r>
+              <a:rPr lang="sr-Cyrl-RS" dirty="0"/>
+              <a:t> сервис, који би поновно покретао неактивне делове систем</a:t>
+            </a:r>
+          </a:p>
+          <a:p>
+            <a:pPr lvl="1"/>
+            <a:r>
+              <a:rPr lang="en-US" i="1" dirty="0"/>
+              <a:t>Web</a:t>
+            </a:r>
+            <a:r>
+              <a:rPr lang="sr-Cyrl-RS" i="1" dirty="0"/>
+              <a:t> </a:t>
+            </a:r>
+            <a:r>
+              <a:rPr lang="sr-Cyrl-RS" dirty="0"/>
+              <a:t>подршка</a:t>
+            </a:r>
+            <a:endParaRPr lang="sr-Cyrl-RS" i="1" dirty="0"/>
           </a:p>
         </p:txBody>
       </p:sp>
     </p:spTree>
     <p:extLst>
       <p:ext uri="{BB962C8B-B14F-4D97-AF65-F5344CB8AC3E}">
-        <p14:creationId xmlns:p14="http://schemas.microsoft.com/office/powerpoint/2010/main" val="1727385729"/>
+        <p14:creationId xmlns:p14="http://schemas.microsoft.com/office/powerpoint/2010/main" val="2565390846"/>
       </p:ext>
     </p:extLst>
   </p:cSld>

</xml_diff>

<commit_message>
- Finished MSc documentation & presentation
</commit_message>
<xml_diff>
--- a/doc/prezentacija_master_e1-12_2020.pptx
+++ b/doc/prezentacija_master_e1-12_2020.pptx
@@ -10,35 +10,34 @@
   <p:sldIdLst>
     <p:sldId id="256" r:id="rId5"/>
     <p:sldId id="257" r:id="rId6"/>
-    <p:sldId id="259" r:id="rId7"/>
-    <p:sldId id="260" r:id="rId8"/>
-    <p:sldId id="261" r:id="rId9"/>
-    <p:sldId id="263" r:id="rId10"/>
-    <p:sldId id="262" r:id="rId11"/>
-    <p:sldId id="264" r:id="rId12"/>
-    <p:sldId id="265" r:id="rId13"/>
-    <p:sldId id="266" r:id="rId14"/>
-    <p:sldId id="280" r:id="rId15"/>
-    <p:sldId id="267" r:id="rId16"/>
-    <p:sldId id="288" r:id="rId17"/>
-    <p:sldId id="270" r:id="rId18"/>
-    <p:sldId id="289" r:id="rId19"/>
-    <p:sldId id="272" r:id="rId20"/>
-    <p:sldId id="290" r:id="rId21"/>
-    <p:sldId id="274" r:id="rId22"/>
-    <p:sldId id="291" r:id="rId23"/>
-    <p:sldId id="276" r:id="rId24"/>
-    <p:sldId id="292" r:id="rId25"/>
-    <p:sldId id="293" r:id="rId26"/>
-    <p:sldId id="279" r:id="rId27"/>
-    <p:sldId id="281" r:id="rId28"/>
-    <p:sldId id="282" r:id="rId29"/>
-    <p:sldId id="283" r:id="rId30"/>
-    <p:sldId id="284" r:id="rId31"/>
-    <p:sldId id="285" r:id="rId32"/>
-    <p:sldId id="286" r:id="rId33"/>
-    <p:sldId id="295" r:id="rId34"/>
-    <p:sldId id="294" r:id="rId35"/>
+    <p:sldId id="296" r:id="rId7"/>
+    <p:sldId id="261" r:id="rId8"/>
+    <p:sldId id="263" r:id="rId9"/>
+    <p:sldId id="262" r:id="rId10"/>
+    <p:sldId id="264" r:id="rId11"/>
+    <p:sldId id="265" r:id="rId12"/>
+    <p:sldId id="266" r:id="rId13"/>
+    <p:sldId id="280" r:id="rId14"/>
+    <p:sldId id="267" r:id="rId15"/>
+    <p:sldId id="288" r:id="rId16"/>
+    <p:sldId id="270" r:id="rId17"/>
+    <p:sldId id="289" r:id="rId18"/>
+    <p:sldId id="272" r:id="rId19"/>
+    <p:sldId id="290" r:id="rId20"/>
+    <p:sldId id="274" r:id="rId21"/>
+    <p:sldId id="291" r:id="rId22"/>
+    <p:sldId id="276" r:id="rId23"/>
+    <p:sldId id="292" r:id="rId24"/>
+    <p:sldId id="293" r:id="rId25"/>
+    <p:sldId id="279" r:id="rId26"/>
+    <p:sldId id="281" r:id="rId27"/>
+    <p:sldId id="282" r:id="rId28"/>
+    <p:sldId id="283" r:id="rId29"/>
+    <p:sldId id="284" r:id="rId30"/>
+    <p:sldId id="285" r:id="rId31"/>
+    <p:sldId id="286" r:id="rId32"/>
+    <p:sldId id="295" r:id="rId33"/>
+    <p:sldId id="294" r:id="rId34"/>
   </p:sldIdLst>
   <p:sldSz cx="12192000" cy="6858000"/>
   <p:notesSz cx="6858000" cy="9144000"/>
@@ -647,7 +646,7 @@
           <a:p>
             <a:fld id="{315B5E2C-74AD-4522-9FD7-378DE79797FC}" type="datetimeFigureOut">
               <a:rPr lang="en-US" smtClean="0"/>
-              <a:t>11/1/2021</a:t>
+              <a:t>11/2/2021</a:t>
             </a:fld>
             <a:endParaRPr lang="en-US"/>
           </a:p>
@@ -943,7 +942,7 @@
           <a:p>
             <a:fld id="{315B5E2C-74AD-4522-9FD7-378DE79797FC}" type="datetimeFigureOut">
               <a:rPr lang="en-US" smtClean="0"/>
-              <a:t>11/1/2021</a:t>
+              <a:t>11/2/2021</a:t>
             </a:fld>
             <a:endParaRPr lang="en-US"/>
           </a:p>
@@ -1191,7 +1190,7 @@
           <a:p>
             <a:fld id="{315B5E2C-74AD-4522-9FD7-378DE79797FC}" type="datetimeFigureOut">
               <a:rPr lang="en-US" smtClean="0"/>
-              <a:t>11/1/2021</a:t>
+              <a:t>11/2/2021</a:t>
             </a:fld>
             <a:endParaRPr lang="en-US"/>
           </a:p>
@@ -1731,7 +1730,7 @@
           <a:p>
             <a:fld id="{315B5E2C-74AD-4522-9FD7-378DE79797FC}" type="datetimeFigureOut">
               <a:rPr lang="en-US" smtClean="0"/>
-              <a:t>11/1/2021</a:t>
+              <a:t>11/2/2021</a:t>
             </a:fld>
             <a:endParaRPr lang="en-US"/>
           </a:p>
@@ -1979,7 +1978,7 @@
           <a:p>
             <a:fld id="{315B5E2C-74AD-4522-9FD7-378DE79797FC}" type="datetimeFigureOut">
               <a:rPr lang="en-US" smtClean="0"/>
-              <a:t>11/1/2021</a:t>
+              <a:t>11/2/2021</a:t>
             </a:fld>
             <a:endParaRPr lang="en-US"/>
           </a:p>
@@ -2511,7 +2510,7 @@
           <a:p>
             <a:fld id="{315B5E2C-74AD-4522-9FD7-378DE79797FC}" type="datetimeFigureOut">
               <a:rPr lang="en-US" smtClean="0"/>
-              <a:t>11/1/2021</a:t>
+              <a:t>11/2/2021</a:t>
             </a:fld>
             <a:endParaRPr lang="en-US"/>
           </a:p>
@@ -2808,7 +2807,7 @@
           <a:p>
             <a:fld id="{315B5E2C-74AD-4522-9FD7-378DE79797FC}" type="datetimeFigureOut">
               <a:rPr lang="en-US" smtClean="0"/>
-              <a:t>11/1/2021</a:t>
+              <a:t>11/2/2021</a:t>
             </a:fld>
             <a:endParaRPr lang="en-US"/>
           </a:p>
@@ -2982,7 +2981,7 @@
           <a:p>
             <a:fld id="{315B5E2C-74AD-4522-9FD7-378DE79797FC}" type="datetimeFigureOut">
               <a:rPr lang="en-US" smtClean="0"/>
-              <a:t>11/1/2021</a:t>
+              <a:t>11/2/2021</a:t>
             </a:fld>
             <a:endParaRPr lang="en-US"/>
           </a:p>
@@ -3162,7 +3161,7 @@
           <a:p>
             <a:fld id="{315B5E2C-74AD-4522-9FD7-378DE79797FC}" type="datetimeFigureOut">
               <a:rPr lang="en-US" smtClean="0"/>
-              <a:t>11/1/2021</a:t>
+              <a:t>11/2/2021</a:t>
             </a:fld>
             <a:endParaRPr lang="en-US"/>
           </a:p>
@@ -3725,7 +3724,7 @@
           <a:p>
             <a:fld id="{315B5E2C-74AD-4522-9FD7-378DE79797FC}" type="datetimeFigureOut">
               <a:rPr lang="en-US" smtClean="0"/>
-              <a:t>11/1/2021</a:t>
+              <a:t>11/2/2021</a:t>
             </a:fld>
             <a:endParaRPr lang="en-US"/>
           </a:p>
@@ -3941,7 +3940,7 @@
           <a:p>
             <a:fld id="{315B5E2C-74AD-4522-9FD7-378DE79797FC}" type="datetimeFigureOut">
               <a:rPr lang="en-US" smtClean="0"/>
-              <a:t>11/1/2021</a:t>
+              <a:t>11/2/2021</a:t>
             </a:fld>
             <a:endParaRPr lang="en-US"/>
           </a:p>
@@ -4116,7 +4115,7 @@
           <a:p>
             <a:fld id="{315B5E2C-74AD-4522-9FD7-378DE79797FC}" type="datetimeFigureOut">
               <a:rPr lang="en-US" smtClean="0"/>
-              <a:t>11/1/2021</a:t>
+              <a:t>11/2/2021</a:t>
             </a:fld>
             <a:endParaRPr lang="en-US"/>
           </a:p>
@@ -4367,7 +4366,7 @@
           <a:p>
             <a:fld id="{315B5E2C-74AD-4522-9FD7-378DE79797FC}" type="datetimeFigureOut">
               <a:rPr lang="en-US" smtClean="0"/>
-              <a:t>11/1/2021</a:t>
+              <a:t>11/2/2021</a:t>
             </a:fld>
             <a:endParaRPr lang="en-US"/>
           </a:p>
@@ -4714,7 +4713,7 @@
           <a:p>
             <a:fld id="{315B5E2C-74AD-4522-9FD7-378DE79797FC}" type="datetimeFigureOut">
               <a:rPr lang="en-US" smtClean="0"/>
-              <a:t>11/1/2021</a:t>
+              <a:t>11/2/2021</a:t>
             </a:fld>
             <a:endParaRPr lang="en-US"/>
           </a:p>
@@ -5206,7 +5205,7 @@
           <a:p>
             <a:fld id="{315B5E2C-74AD-4522-9FD7-378DE79797FC}" type="datetimeFigureOut">
               <a:rPr lang="en-US" smtClean="0"/>
-              <a:t>11/1/2021</a:t>
+              <a:t>11/2/2021</a:t>
             </a:fld>
             <a:endParaRPr lang="en-US"/>
           </a:p>
@@ -5324,7 +5323,7 @@
           <a:p>
             <a:fld id="{315B5E2C-74AD-4522-9FD7-378DE79797FC}" type="datetimeFigureOut">
               <a:rPr lang="en-US" smtClean="0"/>
-              <a:t>11/1/2021</a:t>
+              <a:t>11/2/2021</a:t>
             </a:fld>
             <a:endParaRPr lang="en-US"/>
           </a:p>
@@ -5419,7 +5418,7 @@
           <a:p>
             <a:fld id="{315B5E2C-74AD-4522-9FD7-378DE79797FC}" type="datetimeFigureOut">
               <a:rPr lang="en-US" smtClean="0"/>
-              <a:t>11/1/2021</a:t>
+              <a:t>11/2/2021</a:t>
             </a:fld>
             <a:endParaRPr lang="en-US"/>
           </a:p>
@@ -5702,7 +5701,7 @@
           <a:p>
             <a:fld id="{315B5E2C-74AD-4522-9FD7-378DE79797FC}" type="datetimeFigureOut">
               <a:rPr lang="en-US" smtClean="0"/>
-              <a:t>11/1/2021</a:t>
+              <a:t>11/2/2021</a:t>
             </a:fld>
             <a:endParaRPr lang="en-US"/>
           </a:p>
@@ -5993,7 +5992,7 @@
           <a:p>
             <a:fld id="{315B5E2C-74AD-4522-9FD7-378DE79797FC}" type="datetimeFigureOut">
               <a:rPr lang="en-US" smtClean="0"/>
-              <a:t>11/1/2021</a:t>
+              <a:t>11/2/2021</a:t>
             </a:fld>
             <a:endParaRPr lang="en-US"/>
           </a:p>
@@ -6284,7 +6283,7 @@
           <a:p>
             <a:fld id="{315B5E2C-74AD-4522-9FD7-378DE79797FC}" type="datetimeFigureOut">
               <a:rPr lang="en-US" smtClean="0"/>
-              <a:t>11/1/2021</a:t>
+              <a:t>11/2/2021</a:t>
             </a:fld>
             <a:endParaRPr lang="en-US"/>
           </a:p>
@@ -6532,7 +6531,7 @@
           <a:p>
             <a:fld id="{315B5E2C-74AD-4522-9FD7-378DE79797FC}" type="datetimeFigureOut">
               <a:rPr lang="en-US" smtClean="0"/>
-              <a:t>11/1/2021</a:t>
+              <a:t>11/2/2021</a:t>
             </a:fld>
             <a:endParaRPr lang="en-US"/>
           </a:p>
@@ -7072,7 +7071,7 @@
           <a:p>
             <a:fld id="{315B5E2C-74AD-4522-9FD7-378DE79797FC}" type="datetimeFigureOut">
               <a:rPr lang="en-US" smtClean="0"/>
-              <a:t>11/1/2021</a:t>
+              <a:t>11/2/2021</a:t>
             </a:fld>
             <a:endParaRPr lang="en-US"/>
           </a:p>
@@ -7318,7 +7317,7 @@
           <a:p>
             <a:fld id="{315B5E2C-74AD-4522-9FD7-378DE79797FC}" type="datetimeFigureOut">
               <a:rPr lang="en-US" smtClean="0"/>
-              <a:t>11/1/2021</a:t>
+              <a:t>11/2/2021</a:t>
             </a:fld>
             <a:endParaRPr lang="en-US"/>
           </a:p>
@@ -7566,7 +7565,7 @@
           <a:p>
             <a:fld id="{315B5E2C-74AD-4522-9FD7-378DE79797FC}" type="datetimeFigureOut">
               <a:rPr lang="en-US" smtClean="0"/>
-              <a:t>11/1/2021</a:t>
+              <a:t>11/2/2021</a:t>
             </a:fld>
             <a:endParaRPr lang="en-US"/>
           </a:p>
@@ -8098,7 +8097,7 @@
           <a:p>
             <a:fld id="{315B5E2C-74AD-4522-9FD7-378DE79797FC}" type="datetimeFigureOut">
               <a:rPr lang="en-US" smtClean="0"/>
-              <a:t>11/1/2021</a:t>
+              <a:t>11/2/2021</a:t>
             </a:fld>
             <a:endParaRPr lang="en-US"/>
           </a:p>
@@ -8395,7 +8394,7 @@
           <a:p>
             <a:fld id="{315B5E2C-74AD-4522-9FD7-378DE79797FC}" type="datetimeFigureOut">
               <a:rPr lang="en-US" smtClean="0"/>
-              <a:t>11/1/2021</a:t>
+              <a:t>11/2/2021</a:t>
             </a:fld>
             <a:endParaRPr lang="en-US"/>
           </a:p>
@@ -8569,7 +8568,7 @@
           <a:p>
             <a:fld id="{315B5E2C-74AD-4522-9FD7-378DE79797FC}" type="datetimeFigureOut">
               <a:rPr lang="en-US" smtClean="0"/>
-              <a:t>11/1/2021</a:t>
+              <a:t>11/2/2021</a:t>
             </a:fld>
             <a:endParaRPr lang="en-US"/>
           </a:p>
@@ -8749,7 +8748,7 @@
           <a:p>
             <a:fld id="{315B5E2C-74AD-4522-9FD7-378DE79797FC}" type="datetimeFigureOut">
               <a:rPr lang="en-US" smtClean="0"/>
-              <a:t>11/1/2021</a:t>
+              <a:t>11/2/2021</a:t>
             </a:fld>
             <a:endParaRPr lang="en-US"/>
           </a:p>
@@ -9312,7 +9311,7 @@
           <a:p>
             <a:fld id="{315B5E2C-74AD-4522-9FD7-378DE79797FC}" type="datetimeFigureOut">
               <a:rPr lang="en-US" smtClean="0"/>
-              <a:t>11/1/2021</a:t>
+              <a:t>11/2/2021</a:t>
             </a:fld>
             <a:endParaRPr lang="en-US"/>
           </a:p>
@@ -9487,7 +9486,7 @@
           <a:p>
             <a:fld id="{315B5E2C-74AD-4522-9FD7-378DE79797FC}" type="datetimeFigureOut">
               <a:rPr lang="en-US" smtClean="0"/>
-              <a:t>11/1/2021</a:t>
+              <a:t>11/2/2021</a:t>
             </a:fld>
             <a:endParaRPr lang="en-US"/>
           </a:p>
@@ -9738,7 +9737,7 @@
           <a:p>
             <a:fld id="{315B5E2C-74AD-4522-9FD7-378DE79797FC}" type="datetimeFigureOut">
               <a:rPr lang="en-US" smtClean="0"/>
-              <a:t>11/1/2021</a:t>
+              <a:t>11/2/2021</a:t>
             </a:fld>
             <a:endParaRPr lang="en-US"/>
           </a:p>
@@ -10035,7 +10034,7 @@
           <a:p>
             <a:fld id="{315B5E2C-74AD-4522-9FD7-378DE79797FC}" type="datetimeFigureOut">
               <a:rPr lang="en-US" smtClean="0"/>
-              <a:t>11/1/2021</a:t>
+              <a:t>11/2/2021</a:t>
             </a:fld>
             <a:endParaRPr lang="en-US"/>
           </a:p>
@@ -10477,7 +10476,7 @@
           <a:p>
             <a:fld id="{315B5E2C-74AD-4522-9FD7-378DE79797FC}" type="datetimeFigureOut">
               <a:rPr lang="en-US" smtClean="0"/>
-              <a:t>11/1/2021</a:t>
+              <a:t>11/2/2021</a:t>
             </a:fld>
             <a:endParaRPr lang="en-US"/>
           </a:p>
@@ -10774,7 +10773,7 @@
           <a:p>
             <a:fld id="{315B5E2C-74AD-4522-9FD7-378DE79797FC}" type="datetimeFigureOut">
               <a:rPr lang="en-US" smtClean="0"/>
-              <a:t>11/1/2021</a:t>
+              <a:t>11/2/2021</a:t>
             </a:fld>
             <a:endParaRPr lang="en-US"/>
           </a:p>
@@ -10892,7 +10891,7 @@
           <a:p>
             <a:fld id="{315B5E2C-74AD-4522-9FD7-378DE79797FC}" type="datetimeFigureOut">
               <a:rPr lang="en-US" smtClean="0"/>
-              <a:t>11/1/2021</a:t>
+              <a:t>11/2/2021</a:t>
             </a:fld>
             <a:endParaRPr lang="en-US"/>
           </a:p>
@@ -10987,7 +10986,7 @@
           <a:p>
             <a:fld id="{315B5E2C-74AD-4522-9FD7-378DE79797FC}" type="datetimeFigureOut">
               <a:rPr lang="en-US" smtClean="0"/>
-              <a:t>11/1/2021</a:t>
+              <a:t>11/2/2021</a:t>
             </a:fld>
             <a:endParaRPr lang="en-US"/>
           </a:p>
@@ -11270,7 +11269,7 @@
           <a:p>
             <a:fld id="{315B5E2C-74AD-4522-9FD7-378DE79797FC}" type="datetimeFigureOut">
               <a:rPr lang="en-US" smtClean="0"/>
-              <a:t>11/1/2021</a:t>
+              <a:t>11/2/2021</a:t>
             </a:fld>
             <a:endParaRPr lang="en-US"/>
           </a:p>
@@ -11561,7 +11560,7 @@
           <a:p>
             <a:fld id="{315B5E2C-74AD-4522-9FD7-378DE79797FC}" type="datetimeFigureOut">
               <a:rPr lang="en-US" smtClean="0"/>
-              <a:t>11/1/2021</a:t>
+              <a:t>11/2/2021</a:t>
             </a:fld>
             <a:endParaRPr lang="en-US"/>
           </a:p>
@@ -11852,7 +11851,7 @@
           <a:p>
             <a:fld id="{315B5E2C-74AD-4522-9FD7-378DE79797FC}" type="datetimeFigureOut">
               <a:rPr lang="en-US" smtClean="0"/>
-              <a:t>11/1/2021</a:t>
+              <a:t>11/2/2021</a:t>
             </a:fld>
             <a:endParaRPr lang="en-US"/>
           </a:p>
@@ -12100,7 +12099,7 @@
           <a:p>
             <a:fld id="{315B5E2C-74AD-4522-9FD7-378DE79797FC}" type="datetimeFigureOut">
               <a:rPr lang="en-US" smtClean="0"/>
-              <a:t>11/1/2021</a:t>
+              <a:t>11/2/2021</a:t>
             </a:fld>
             <a:endParaRPr lang="en-US"/>
           </a:p>
@@ -12640,7 +12639,7 @@
           <a:p>
             <a:fld id="{315B5E2C-74AD-4522-9FD7-378DE79797FC}" type="datetimeFigureOut">
               <a:rPr lang="en-US" smtClean="0"/>
-              <a:t>11/1/2021</a:t>
+              <a:t>11/2/2021</a:t>
             </a:fld>
             <a:endParaRPr lang="en-US"/>
           </a:p>
@@ -12888,7 +12887,7 @@
           <a:p>
             <a:fld id="{315B5E2C-74AD-4522-9FD7-378DE79797FC}" type="datetimeFigureOut">
               <a:rPr lang="en-US" smtClean="0"/>
-              <a:t>11/1/2021</a:t>
+              <a:t>11/2/2021</a:t>
             </a:fld>
             <a:endParaRPr lang="en-US"/>
           </a:p>
@@ -13420,7 +13419,7 @@
           <a:p>
             <a:fld id="{315B5E2C-74AD-4522-9FD7-378DE79797FC}" type="datetimeFigureOut">
               <a:rPr lang="en-US" smtClean="0"/>
-              <a:t>11/1/2021</a:t>
+              <a:t>11/2/2021</a:t>
             </a:fld>
             <a:endParaRPr lang="en-US"/>
           </a:p>
@@ -13717,7 +13716,7 @@
           <a:p>
             <a:fld id="{315B5E2C-74AD-4522-9FD7-378DE79797FC}" type="datetimeFigureOut">
               <a:rPr lang="en-US" smtClean="0"/>
-              <a:t>11/1/2021</a:t>
+              <a:t>11/2/2021</a:t>
             </a:fld>
             <a:endParaRPr lang="en-US"/>
           </a:p>
@@ -14159,7 +14158,7 @@
           <a:p>
             <a:fld id="{315B5E2C-74AD-4522-9FD7-378DE79797FC}" type="datetimeFigureOut">
               <a:rPr lang="en-US" smtClean="0"/>
-              <a:t>11/1/2021</a:t>
+              <a:t>11/2/2021</a:t>
             </a:fld>
             <a:endParaRPr lang="en-US"/>
           </a:p>
@@ -14333,7 +14332,7 @@
           <a:p>
             <a:fld id="{315B5E2C-74AD-4522-9FD7-378DE79797FC}" type="datetimeFigureOut">
               <a:rPr lang="en-US" smtClean="0"/>
-              <a:t>11/1/2021</a:t>
+              <a:t>11/2/2021</a:t>
             </a:fld>
             <a:endParaRPr lang="en-US"/>
           </a:p>
@@ -14513,7 +14512,7 @@
           <a:p>
             <a:fld id="{315B5E2C-74AD-4522-9FD7-378DE79797FC}" type="datetimeFigureOut">
               <a:rPr lang="en-US" smtClean="0"/>
-              <a:t>11/1/2021</a:t>
+              <a:t>11/2/2021</a:t>
             </a:fld>
             <a:endParaRPr lang="en-US"/>
           </a:p>
@@ -15076,7 +15075,7 @@
           <a:p>
             <a:fld id="{315B5E2C-74AD-4522-9FD7-378DE79797FC}" type="datetimeFigureOut">
               <a:rPr lang="en-US" smtClean="0"/>
-              <a:t>11/1/2021</a:t>
+              <a:t>11/2/2021</a:t>
             </a:fld>
             <a:endParaRPr lang="en-US"/>
           </a:p>
@@ -15251,7 +15250,7 @@
           <a:p>
             <a:fld id="{315B5E2C-74AD-4522-9FD7-378DE79797FC}" type="datetimeFigureOut">
               <a:rPr lang="en-US" smtClean="0"/>
-              <a:t>11/1/2021</a:t>
+              <a:t>11/2/2021</a:t>
             </a:fld>
             <a:endParaRPr lang="en-US"/>
           </a:p>
@@ -15502,7 +15501,7 @@
           <a:p>
             <a:fld id="{315B5E2C-74AD-4522-9FD7-378DE79797FC}" type="datetimeFigureOut">
               <a:rPr lang="en-US" smtClean="0"/>
-              <a:t>11/1/2021</a:t>
+              <a:t>11/2/2021</a:t>
             </a:fld>
             <a:endParaRPr lang="en-US"/>
           </a:p>
@@ -15799,7 +15798,7 @@
           <a:p>
             <a:fld id="{315B5E2C-74AD-4522-9FD7-378DE79797FC}" type="datetimeFigureOut">
               <a:rPr lang="en-US" smtClean="0"/>
-              <a:t>11/1/2021</a:t>
+              <a:t>11/2/2021</a:t>
             </a:fld>
             <a:endParaRPr lang="en-US"/>
           </a:p>
@@ -16241,7 +16240,7 @@
           <a:p>
             <a:fld id="{315B5E2C-74AD-4522-9FD7-378DE79797FC}" type="datetimeFigureOut">
               <a:rPr lang="en-US" smtClean="0"/>
-              <a:t>11/1/2021</a:t>
+              <a:t>11/2/2021</a:t>
             </a:fld>
             <a:endParaRPr lang="en-US"/>
           </a:p>
@@ -16359,7 +16358,7 @@
           <a:p>
             <a:fld id="{315B5E2C-74AD-4522-9FD7-378DE79797FC}" type="datetimeFigureOut">
               <a:rPr lang="en-US" smtClean="0"/>
-              <a:t>11/1/2021</a:t>
+              <a:t>11/2/2021</a:t>
             </a:fld>
             <a:endParaRPr lang="en-US"/>
           </a:p>
@@ -16454,7 +16453,7 @@
           <a:p>
             <a:fld id="{315B5E2C-74AD-4522-9FD7-378DE79797FC}" type="datetimeFigureOut">
               <a:rPr lang="en-US" smtClean="0"/>
-              <a:t>11/1/2021</a:t>
+              <a:t>11/2/2021</a:t>
             </a:fld>
             <a:endParaRPr lang="en-US"/>
           </a:p>
@@ -16737,7 +16736,7 @@
           <a:p>
             <a:fld id="{315B5E2C-74AD-4522-9FD7-378DE79797FC}" type="datetimeFigureOut">
               <a:rPr lang="en-US" smtClean="0"/>
-              <a:t>11/1/2021</a:t>
+              <a:t>11/2/2021</a:t>
             </a:fld>
             <a:endParaRPr lang="en-US"/>
           </a:p>
@@ -16855,7 +16854,7 @@
           <a:p>
             <a:fld id="{315B5E2C-74AD-4522-9FD7-378DE79797FC}" type="datetimeFigureOut">
               <a:rPr lang="en-US" smtClean="0"/>
-              <a:t>11/1/2021</a:t>
+              <a:t>11/2/2021</a:t>
             </a:fld>
             <a:endParaRPr lang="en-US"/>
           </a:p>
@@ -17146,7 +17145,7 @@
           <a:p>
             <a:fld id="{315B5E2C-74AD-4522-9FD7-378DE79797FC}" type="datetimeFigureOut">
               <a:rPr lang="en-US" smtClean="0"/>
-              <a:t>11/1/2021</a:t>
+              <a:t>11/2/2021</a:t>
             </a:fld>
             <a:endParaRPr lang="en-US"/>
           </a:p>
@@ -17437,7 +17436,7 @@
           <a:p>
             <a:fld id="{315B5E2C-74AD-4522-9FD7-378DE79797FC}" type="datetimeFigureOut">
               <a:rPr lang="en-US" smtClean="0"/>
-              <a:t>11/1/2021</a:t>
+              <a:t>11/2/2021</a:t>
             </a:fld>
             <a:endParaRPr lang="en-US"/>
           </a:p>
@@ -17685,7 +17684,7 @@
           <a:p>
             <a:fld id="{315B5E2C-74AD-4522-9FD7-378DE79797FC}" type="datetimeFigureOut">
               <a:rPr lang="en-US" smtClean="0"/>
-              <a:t>11/1/2021</a:t>
+              <a:t>11/2/2021</a:t>
             </a:fld>
             <a:endParaRPr lang="en-US"/>
           </a:p>
@@ -18225,7 +18224,7 @@
           <a:p>
             <a:fld id="{315B5E2C-74AD-4522-9FD7-378DE79797FC}" type="datetimeFigureOut">
               <a:rPr lang="en-US" smtClean="0"/>
-              <a:t>11/1/2021</a:t>
+              <a:t>11/2/2021</a:t>
             </a:fld>
             <a:endParaRPr lang="en-US"/>
           </a:p>
@@ -18473,7 +18472,7 @@
           <a:p>
             <a:fld id="{315B5E2C-74AD-4522-9FD7-378DE79797FC}" type="datetimeFigureOut">
               <a:rPr lang="en-US" smtClean="0"/>
-              <a:t>11/1/2021</a:t>
+              <a:t>11/2/2021</a:t>
             </a:fld>
             <a:endParaRPr lang="en-US"/>
           </a:p>
@@ -19005,7 +19004,7 @@
           <a:p>
             <a:fld id="{315B5E2C-74AD-4522-9FD7-378DE79797FC}" type="datetimeFigureOut">
               <a:rPr lang="en-US" smtClean="0"/>
-              <a:t>11/1/2021</a:t>
+              <a:t>11/2/2021</a:t>
             </a:fld>
             <a:endParaRPr lang="en-US"/>
           </a:p>
@@ -19302,7 +19301,7 @@
           <a:p>
             <a:fld id="{315B5E2C-74AD-4522-9FD7-378DE79797FC}" type="datetimeFigureOut">
               <a:rPr lang="en-US" smtClean="0"/>
-              <a:t>11/1/2021</a:t>
+              <a:t>11/2/2021</a:t>
             </a:fld>
             <a:endParaRPr lang="en-US"/>
           </a:p>
@@ -19476,7 +19475,7 @@
           <a:p>
             <a:fld id="{315B5E2C-74AD-4522-9FD7-378DE79797FC}" type="datetimeFigureOut">
               <a:rPr lang="en-US" smtClean="0"/>
-              <a:t>11/1/2021</a:t>
+              <a:t>11/2/2021</a:t>
             </a:fld>
             <a:endParaRPr lang="en-US"/>
           </a:p>
@@ -19656,7 +19655,7 @@
           <a:p>
             <a:fld id="{315B5E2C-74AD-4522-9FD7-378DE79797FC}" type="datetimeFigureOut">
               <a:rPr lang="en-US" smtClean="0"/>
-              <a:t>11/1/2021</a:t>
+              <a:t>11/2/2021</a:t>
             </a:fld>
             <a:endParaRPr lang="en-US"/>
           </a:p>
@@ -19751,7 +19750,7 @@
           <a:p>
             <a:fld id="{315B5E2C-74AD-4522-9FD7-378DE79797FC}" type="datetimeFigureOut">
               <a:rPr lang="en-US" smtClean="0"/>
-              <a:t>11/1/2021</a:t>
+              <a:t>11/2/2021</a:t>
             </a:fld>
             <a:endParaRPr lang="en-US"/>
           </a:p>
@@ -20034,7 +20033,7 @@
           <a:p>
             <a:fld id="{315B5E2C-74AD-4522-9FD7-378DE79797FC}" type="datetimeFigureOut">
               <a:rPr lang="en-US" smtClean="0"/>
-              <a:t>11/1/2021</a:t>
+              <a:t>11/2/2021</a:t>
             </a:fld>
             <a:endParaRPr lang="en-US"/>
           </a:p>
@@ -20325,7 +20324,7 @@
           <a:p>
             <a:fld id="{315B5E2C-74AD-4522-9FD7-378DE79797FC}" type="datetimeFigureOut">
               <a:rPr lang="en-US" smtClean="0"/>
-              <a:t>11/1/2021</a:t>
+              <a:t>11/2/2021</a:t>
             </a:fld>
             <a:endParaRPr lang="en-US"/>
           </a:p>
@@ -20855,7 +20854,7 @@
           <a:p>
             <a:fld id="{315B5E2C-74AD-4522-9FD7-378DE79797FC}" type="datetimeFigureOut">
               <a:rPr lang="en-US" smtClean="0"/>
-              <a:t>11/1/2021</a:t>
+              <a:t>11/2/2021</a:t>
             </a:fld>
             <a:endParaRPr lang="en-US"/>
           </a:p>
@@ -21838,7 +21837,7 @@
           <a:p>
             <a:fld id="{315B5E2C-74AD-4522-9FD7-378DE79797FC}" type="datetimeFigureOut">
               <a:rPr lang="en-US" smtClean="0"/>
-              <a:t>11/1/2021</a:t>
+              <a:t>11/2/2021</a:t>
             </a:fld>
             <a:endParaRPr lang="en-US"/>
           </a:p>
@@ -22821,7 +22820,7 @@
           <a:p>
             <a:fld id="{315B5E2C-74AD-4522-9FD7-378DE79797FC}" type="datetimeFigureOut">
               <a:rPr lang="en-US" smtClean="0"/>
-              <a:t>11/1/2021</a:t>
+              <a:t>11/2/2021</a:t>
             </a:fld>
             <a:endParaRPr lang="en-US"/>
           </a:p>
@@ -23804,7 +23803,7 @@
           <a:p>
             <a:fld id="{315B5E2C-74AD-4522-9FD7-378DE79797FC}" type="datetimeFigureOut">
               <a:rPr lang="en-US" smtClean="0"/>
-              <a:t>11/1/2021</a:t>
+              <a:t>11/2/2021</a:t>
             </a:fld>
             <a:endParaRPr lang="en-US"/>
           </a:p>
@@ -24532,7 +24531,7 @@
           <p:cNvPr id="2" name="Title 1">
             <a:extLst>
               <a:ext uri="{FF2B5EF4-FFF2-40B4-BE49-F238E27FC236}">
-                <a16:creationId xmlns:a16="http://schemas.microsoft.com/office/drawing/2014/main" id="{7E156979-D1B6-479E-A38E-A2566E693406}"/>
+                <a16:creationId xmlns:a16="http://schemas.microsoft.com/office/drawing/2014/main" id="{E2E57030-59F4-4AC2-A837-3D6B5C17DBD8}"/>
               </a:ext>
             </a:extLst>
           </p:cNvPr>
@@ -24545,72 +24544,69 @@
         </p:nvSpPr>
         <p:spPr>
           <a:xfrm>
-            <a:off x="1617476" y="312938"/>
-            <a:ext cx="6842943" cy="1258410"/>
+            <a:off x="1489203" y="2769833"/>
+            <a:ext cx="9634517" cy="738042"/>
           </a:xfrm>
         </p:spPr>
         <p:txBody>
-          <a:bodyPr>
-            <a:normAutofit fontScale="90000"/>
-          </a:bodyPr>
+          <a:bodyPr/>
           <a:lstStyle/>
           <a:p>
             <a:pPr algn="l"/>
             <a:r>
               <a:rPr lang="sr-Cyrl-RS" dirty="0"/>
-              <a:t>Архитектура и функционалност клијентске апликације</a:t>
+              <a:t>Програмско решење серверске апликације</a:t>
             </a:r>
             <a:endParaRPr lang="en-US" dirty="0"/>
           </a:p>
         </p:txBody>
       </p:sp>
-      <p:pic>
-        <p:nvPicPr>
-          <p:cNvPr id="4" name="Content Placeholder 3">
+      <p:sp>
+        <p:nvSpPr>
+          <p:cNvPr id="3" name="Text Placeholder 2">
             <a:extLst>
               <a:ext uri="{FF2B5EF4-FFF2-40B4-BE49-F238E27FC236}">
-                <a16:creationId xmlns:a16="http://schemas.microsoft.com/office/drawing/2014/main" id="{EB4D9B77-6A5B-4FD2-856F-19DE1C6A8A3C}"/>
+                <a16:creationId xmlns:a16="http://schemas.microsoft.com/office/drawing/2014/main" id="{50B82528-4326-47FD-8257-4AED300ED99B}"/>
               </a:ext>
             </a:extLst>
           </p:cNvPr>
-          <p:cNvPicPr>
-            <a:picLocks noGrp="1" noChangeAspect="1"/>
-          </p:cNvPicPr>
-          <p:nvPr>
-            <p:ph idx="1"/>
-          </p:nvPr>
-        </p:nvPicPr>
-        <p:blipFill>
-          <a:blip r:embed="rId2">
-            <a:extLst>
-              <a:ext uri="{28A0092B-C50C-407E-A947-70E740481C1C}">
-                <a14:useLocalDpi xmlns:a14="http://schemas.microsoft.com/office/drawing/2010/main" val="0"/>
-              </a:ext>
-            </a:extLst>
-          </a:blip>
-          <a:srcRect/>
-          <a:stretch>
-            <a:fillRect/>
-          </a:stretch>
-        </p:blipFill>
-        <p:spPr bwMode="auto">
+          <p:cNvSpPr>
+            <a:spLocks noGrp="1"/>
+          </p:cNvSpPr>
+          <p:nvPr>
+            <p:ph type="body" idx="1"/>
+          </p:nvPr>
+        </p:nvSpPr>
+        <p:spPr>
           <a:xfrm>
-            <a:off x="3139621" y="1571348"/>
-            <a:ext cx="5912758" cy="5184282"/>
+            <a:off x="1489202" y="3604334"/>
+            <a:ext cx="9634517" cy="958788"/>
           </a:xfrm>
-          <a:prstGeom prst="rect">
-            <a:avLst/>
-          </a:prstGeom>
-          <a:noFill/>
-          <a:ln>
-            <a:noFill/>
-          </a:ln>
         </p:spPr>
-      </p:pic>
+        <p:txBody>
+          <a:bodyPr/>
+          <a:lstStyle/>
+          <a:p>
+            <a:pPr algn="l"/>
+            <a:r>
+              <a:rPr lang="sr-Cyrl-RS" dirty="0"/>
+              <a:t>Сервер за видео пренос</a:t>
+            </a:r>
+          </a:p>
+          <a:p>
+            <a:pPr algn="l"/>
+            <a:r>
+              <a:rPr lang="sr-Cyrl-RS" dirty="0"/>
+              <a:t>Мрежни менаџер</a:t>
+            </a:r>
+            <a:endParaRPr lang="en-US" dirty="0"/>
+          </a:p>
+        </p:txBody>
+      </p:sp>
     </p:spTree>
     <p:extLst>
       <p:ext uri="{BB962C8B-B14F-4D97-AF65-F5344CB8AC3E}">
-        <p14:creationId xmlns:p14="http://schemas.microsoft.com/office/powerpoint/2010/main" val="2817887620"/>
+        <p14:creationId xmlns:p14="http://schemas.microsoft.com/office/powerpoint/2010/main" val="1096535297"/>
       </p:ext>
     </p:extLst>
   </p:cSld>
@@ -24642,113 +24638,6 @@
           <p:cNvPr id="2" name="Title 1">
             <a:extLst>
               <a:ext uri="{FF2B5EF4-FFF2-40B4-BE49-F238E27FC236}">
-                <a16:creationId xmlns:a16="http://schemas.microsoft.com/office/drawing/2014/main" id="{E2E57030-59F4-4AC2-A837-3D6B5C17DBD8}"/>
-              </a:ext>
-            </a:extLst>
-          </p:cNvPr>
-          <p:cNvSpPr>
-            <a:spLocks noGrp="1"/>
-          </p:cNvSpPr>
-          <p:nvPr>
-            <p:ph type="title"/>
-          </p:nvPr>
-        </p:nvSpPr>
-        <p:spPr>
-          <a:xfrm>
-            <a:off x="1489203" y="2769833"/>
-            <a:ext cx="9634517" cy="738042"/>
-          </a:xfrm>
-        </p:spPr>
-        <p:txBody>
-          <a:bodyPr/>
-          <a:lstStyle/>
-          <a:p>
-            <a:pPr algn="l"/>
-            <a:r>
-              <a:rPr lang="sr-Cyrl-RS" dirty="0"/>
-              <a:t>Програмско решење серверске апликације</a:t>
-            </a:r>
-            <a:endParaRPr lang="en-US" dirty="0"/>
-          </a:p>
-        </p:txBody>
-      </p:sp>
-      <p:sp>
-        <p:nvSpPr>
-          <p:cNvPr id="3" name="Text Placeholder 2">
-            <a:extLst>
-              <a:ext uri="{FF2B5EF4-FFF2-40B4-BE49-F238E27FC236}">
-                <a16:creationId xmlns:a16="http://schemas.microsoft.com/office/drawing/2014/main" id="{50B82528-4326-47FD-8257-4AED300ED99B}"/>
-              </a:ext>
-            </a:extLst>
-          </p:cNvPr>
-          <p:cNvSpPr>
-            <a:spLocks noGrp="1"/>
-          </p:cNvSpPr>
-          <p:nvPr>
-            <p:ph type="body" idx="1"/>
-          </p:nvPr>
-        </p:nvSpPr>
-        <p:spPr>
-          <a:xfrm>
-            <a:off x="1489202" y="3604334"/>
-            <a:ext cx="9634517" cy="958788"/>
-          </a:xfrm>
-        </p:spPr>
-        <p:txBody>
-          <a:bodyPr/>
-          <a:lstStyle/>
-          <a:p>
-            <a:pPr algn="l"/>
-            <a:r>
-              <a:rPr lang="sr-Cyrl-RS" dirty="0"/>
-              <a:t>Сервер за видео пренос</a:t>
-            </a:r>
-          </a:p>
-          <a:p>
-            <a:pPr algn="l"/>
-            <a:r>
-              <a:rPr lang="sr-Cyrl-RS" dirty="0"/>
-              <a:t>Мрежни менаџер</a:t>
-            </a:r>
-            <a:endParaRPr lang="en-US" dirty="0"/>
-          </a:p>
-        </p:txBody>
-      </p:sp>
-    </p:spTree>
-    <p:extLst>
-      <p:ext uri="{BB962C8B-B14F-4D97-AF65-F5344CB8AC3E}">
-        <p14:creationId xmlns:p14="http://schemas.microsoft.com/office/powerpoint/2010/main" val="1096535297"/>
-      </p:ext>
-    </p:extLst>
-  </p:cSld>
-  <p:clrMapOvr>
-    <a:masterClrMapping/>
-  </p:clrMapOvr>
-</p:sld>
-</file>
-
-<file path=ppt/slides/slide12.xml><?xml version="1.0" encoding="utf-8"?>
-<p:sld xmlns:a="http://schemas.openxmlformats.org/drawingml/2006/main" xmlns:r="http://schemas.openxmlformats.org/officeDocument/2006/relationships" xmlns:p="http://schemas.openxmlformats.org/presentationml/2006/main">
-  <p:cSld>
-    <p:spTree>
-      <p:nvGrpSpPr>
-        <p:cNvPr id="1" name=""/>
-        <p:cNvGrpSpPr/>
-        <p:nvPr/>
-      </p:nvGrpSpPr>
-      <p:grpSpPr>
-        <a:xfrm>
-          <a:off x="0" y="0"/>
-          <a:ext cx="0" cy="0"/>
-          <a:chOff x="0" y="0"/>
-          <a:chExt cx="0" cy="0"/>
-        </a:xfrm>
-      </p:grpSpPr>
-      <p:sp>
-        <p:nvSpPr>
-          <p:cNvPr id="2" name="Title 1">
-            <a:extLst>
-              <a:ext uri="{FF2B5EF4-FFF2-40B4-BE49-F238E27FC236}">
                 <a16:creationId xmlns:a16="http://schemas.microsoft.com/office/drawing/2014/main" id="{7E156979-D1B6-479E-A38E-A2566E693406}"/>
               </a:ext>
             </a:extLst>
@@ -24987,7 +24876,7 @@
 </p:sld>
 </file>
 
-<file path=ppt/slides/slide13.xml><?xml version="1.0" encoding="utf-8"?>
+<file path=ppt/slides/slide12.xml><?xml version="1.0" encoding="utf-8"?>
 <p:sld xmlns:a="http://schemas.openxmlformats.org/drawingml/2006/main" xmlns:r="http://schemas.openxmlformats.org/officeDocument/2006/relationships" xmlns:p="http://schemas.openxmlformats.org/presentationml/2006/main">
   <p:cSld>
     <p:spTree>
@@ -25104,7 +24993,7 @@
 </p:sld>
 </file>
 
-<file path=ppt/slides/slide14.xml><?xml version="1.0" encoding="utf-8"?>
+<file path=ppt/slides/slide13.xml><?xml version="1.0" encoding="utf-8"?>
 <p:sld xmlns:a="http://schemas.openxmlformats.org/drawingml/2006/main" xmlns:r="http://schemas.openxmlformats.org/officeDocument/2006/relationships" xmlns:p="http://schemas.openxmlformats.org/presentationml/2006/main">
   <p:cSld>
     <p:spTree>
@@ -25274,7 +25163,7 @@
 </p:sld>
 </file>
 
-<file path=ppt/slides/slide15.xml><?xml version="1.0" encoding="utf-8"?>
+<file path=ppt/slides/slide14.xml><?xml version="1.0" encoding="utf-8"?>
 <p:sld xmlns:a="http://schemas.openxmlformats.org/drawingml/2006/main" xmlns:r="http://schemas.openxmlformats.org/officeDocument/2006/relationships" xmlns:p="http://schemas.openxmlformats.org/presentationml/2006/main">
   <p:cSld>
     <p:spTree>
@@ -25418,7 +25307,7 @@
 </p:sld>
 </file>
 
-<file path=ppt/slides/slide16.xml><?xml version="1.0" encoding="utf-8"?>
+<file path=ppt/slides/slide15.xml><?xml version="1.0" encoding="utf-8"?>
 <p:sld xmlns:a="http://schemas.openxmlformats.org/drawingml/2006/main" xmlns:r="http://schemas.openxmlformats.org/officeDocument/2006/relationships" xmlns:p="http://schemas.openxmlformats.org/presentationml/2006/main">
   <p:cSld>
     <p:spTree>
@@ -25687,7 +25576,7 @@
 </p:sld>
 </file>
 
-<file path=ppt/slides/slide17.xml><?xml version="1.0" encoding="utf-8"?>
+<file path=ppt/slides/slide16.xml><?xml version="1.0" encoding="utf-8"?>
 <p:sld xmlns:a="http://schemas.openxmlformats.org/drawingml/2006/main" xmlns:r="http://schemas.openxmlformats.org/officeDocument/2006/relationships" xmlns:p="http://schemas.openxmlformats.org/presentationml/2006/main">
   <p:cSld>
     <p:spTree>
@@ -25829,7 +25718,7 @@
 </p:sld>
 </file>
 
-<file path=ppt/slides/slide18.xml><?xml version="1.0" encoding="utf-8"?>
+<file path=ppt/slides/slide17.xml><?xml version="1.0" encoding="utf-8"?>
 <p:sld xmlns:a="http://schemas.openxmlformats.org/drawingml/2006/main" xmlns:r="http://schemas.openxmlformats.org/officeDocument/2006/relationships" xmlns:p="http://schemas.openxmlformats.org/presentationml/2006/main">
   <p:cSld>
     <p:spTree>
@@ -26001,19 +25890,7 @@
           <a:p>
             <a:r>
               <a:rPr lang="sr-Cyrl-RS" dirty="0"/>
-              <a:t>Слање пакета функционише као код живог преноса – паковање у </a:t>
-            </a:r>
-            <a:r>
-              <a:rPr lang="en-US" i="1" dirty="0"/>
-              <a:t>RTP</a:t>
-            </a:r>
-            <a:r>
-              <a:rPr lang="sr-Cyrl-RS" i="1" dirty="0"/>
-              <a:t> </a:t>
-            </a:r>
-            <a:r>
-              <a:rPr lang="sr-Cyrl-RS" dirty="0"/>
-              <a:t>формату</a:t>
+              <a:t>Слање пакета функционише као код живог преноса</a:t>
             </a:r>
           </a:p>
         </p:txBody>
@@ -26031,7 +25908,7 @@
 </p:sld>
 </file>
 
-<file path=ppt/slides/slide19.xml><?xml version="1.0" encoding="utf-8"?>
+<file path=ppt/slides/slide18.xml><?xml version="1.0" encoding="utf-8"?>
 <p:sld xmlns:a="http://schemas.openxmlformats.org/drawingml/2006/main" xmlns:r="http://schemas.openxmlformats.org/officeDocument/2006/relationships" xmlns:p="http://schemas.openxmlformats.org/presentationml/2006/main">
   <p:cSld>
     <p:spTree>
@@ -26173,6 +26050,171 @@
 </p:sld>
 </file>
 
+<file path=ppt/slides/slide19.xml><?xml version="1.0" encoding="utf-8"?>
+<p:sld xmlns:a="http://schemas.openxmlformats.org/drawingml/2006/main" xmlns:r="http://schemas.openxmlformats.org/officeDocument/2006/relationships" xmlns:p="http://schemas.openxmlformats.org/presentationml/2006/main">
+  <p:cSld>
+    <p:spTree>
+      <p:nvGrpSpPr>
+        <p:cNvPr id="1" name=""/>
+        <p:cNvGrpSpPr/>
+        <p:nvPr/>
+      </p:nvGrpSpPr>
+      <p:grpSpPr>
+        <a:xfrm>
+          <a:off x="0" y="0"/>
+          <a:ext cx="0" cy="0"/>
+          <a:chOff x="0" y="0"/>
+          <a:chExt cx="0" cy="0"/>
+        </a:xfrm>
+      </p:grpSpPr>
+      <p:sp>
+        <p:nvSpPr>
+          <p:cNvPr id="2" name="Title 1">
+            <a:extLst>
+              <a:ext uri="{FF2B5EF4-FFF2-40B4-BE49-F238E27FC236}">
+                <a16:creationId xmlns:a16="http://schemas.microsoft.com/office/drawing/2014/main" id="{7E156979-D1B6-479E-A38E-A2566E693406}"/>
+              </a:ext>
+            </a:extLst>
+          </p:cNvPr>
+          <p:cNvSpPr>
+            <a:spLocks noGrp="1"/>
+          </p:cNvSpPr>
+          <p:nvPr>
+            <p:ph type="title"/>
+          </p:nvPr>
+        </p:nvSpPr>
+        <p:spPr>
+          <a:xfrm>
+            <a:off x="1617475" y="312938"/>
+            <a:ext cx="9488489" cy="1032030"/>
+          </a:xfrm>
+        </p:spPr>
+        <p:txBody>
+          <a:bodyPr>
+            <a:normAutofit/>
+          </a:bodyPr>
+          <a:lstStyle/>
+          <a:p>
+            <a:pPr algn="l"/>
+            <a:r>
+              <a:rPr lang="sr-Cyrl-RS" dirty="0"/>
+              <a:t>Комуникација са мрежним корисницима</a:t>
+            </a:r>
+            <a:br>
+              <a:rPr lang="sr-Cyrl-RS" dirty="0"/>
+            </a:br>
+            <a:r>
+              <a:rPr kumimoji="0" lang="sr-Cyrl-RS" sz="2000" b="0" i="1" u="none" strike="noStrike" kern="1200" cap="none" spc="0" normalizeH="0" baseline="0" noProof="0" dirty="0">
+                <a:ln w="3175" cmpd="sng">
+                  <a:noFill/>
+                </a:ln>
+                <a:solidFill>
+                  <a:prstClr val="black"/>
+                </a:solidFill>
+                <a:effectLst/>
+                <a:uLnTx/>
+                <a:uFillTx/>
+                <a:latin typeface="Corbel" panose="020B0503020204020204"/>
+                <a:ea typeface="+mj-ea"/>
+                <a:cs typeface="+mj-cs"/>
+              </a:rPr>
+              <a:t>Мрежни менаџер</a:t>
+            </a:r>
+            <a:endParaRPr lang="en-US" dirty="0"/>
+          </a:p>
+        </p:txBody>
+      </p:sp>
+      <p:sp>
+        <p:nvSpPr>
+          <p:cNvPr id="3" name="Content Placeholder 2">
+            <a:extLst>
+              <a:ext uri="{FF2B5EF4-FFF2-40B4-BE49-F238E27FC236}">
+                <a16:creationId xmlns:a16="http://schemas.microsoft.com/office/drawing/2014/main" id="{B926073A-16BE-4E3A-B0E0-F005707F5EC4}"/>
+              </a:ext>
+            </a:extLst>
+          </p:cNvPr>
+          <p:cNvSpPr>
+            <a:spLocks noGrp="1"/>
+          </p:cNvSpPr>
+          <p:nvPr>
+            <p:ph idx="1"/>
+          </p:nvPr>
+        </p:nvSpPr>
+        <p:spPr>
+          <a:xfrm>
+            <a:off x="1617476" y="1531399"/>
+            <a:ext cx="10402889" cy="4350057"/>
+          </a:xfrm>
+        </p:spPr>
+        <p:txBody>
+          <a:bodyPr>
+            <a:normAutofit/>
+          </a:bodyPr>
+          <a:lstStyle/>
+          <a:p>
+            <a:r>
+              <a:rPr lang="sr-Cyrl-RS" dirty="0"/>
+              <a:t>Слична </a:t>
+            </a:r>
+            <a:r>
+              <a:rPr lang="en-US" i="1" dirty="0"/>
+              <a:t>RTSP</a:t>
+            </a:r>
+            <a:r>
+              <a:rPr lang="en-US" dirty="0"/>
+              <a:t> </a:t>
+            </a:r>
+            <a:r>
+              <a:rPr lang="sr-Cyrl-RS" dirty="0"/>
+              <a:t>комуникацији</a:t>
+            </a:r>
+            <a:endParaRPr lang="sr-Cyrl-RS" i="1" dirty="0"/>
+          </a:p>
+          <a:p>
+            <a:r>
+              <a:rPr lang="sr-Cyrl-RS" dirty="0"/>
+              <a:t>Дели се у два режима: иницијални и устаљени</a:t>
+            </a:r>
+          </a:p>
+          <a:p>
+            <a:r>
+              <a:rPr lang="sr-Cyrl-RS" dirty="0"/>
+              <a:t>Иницијални режим: регистрација и пријављивање</a:t>
+            </a:r>
+          </a:p>
+          <a:p>
+            <a:r>
+              <a:rPr lang="sr-Cyrl-RS" dirty="0"/>
+              <a:t>Устаљени режим: провера доступности </a:t>
+            </a:r>
+            <a:r>
+              <a:rPr lang="en-US" i="1" dirty="0"/>
+              <a:t>On-Demand</a:t>
+            </a:r>
+            <a:r>
+              <a:rPr lang="en-US" dirty="0"/>
+              <a:t> </a:t>
+            </a:r>
+            <a:r>
+              <a:rPr lang="sr-Cyrl-RS" dirty="0"/>
+              <a:t>преноса и благовремено ажурирање листе активних видео преноса</a:t>
+            </a:r>
+          </a:p>
+        </p:txBody>
+      </p:sp>
+    </p:spTree>
+    <p:extLst>
+      <p:ext uri="{BB962C8B-B14F-4D97-AF65-F5344CB8AC3E}">
+        <p14:creationId xmlns:p14="http://schemas.microsoft.com/office/powerpoint/2010/main" val="607711869"/>
+      </p:ext>
+    </p:extLst>
+  </p:cSld>
+  <p:clrMapOvr>
+    <a:masterClrMapping/>
+  </p:clrMapOvr>
+</p:sld>
+</file>
+
 <file path=ppt/slides/slide2.xml><?xml version="1.0" encoding="utf-8"?>
 <p:sld xmlns:a="http://schemas.openxmlformats.org/drawingml/2006/main" xmlns:r="http://schemas.openxmlformats.org/officeDocument/2006/relationships" xmlns:p="http://schemas.openxmlformats.org/presentationml/2006/main">
   <p:cSld>
@@ -26254,28 +26296,16 @@
           <a:lstStyle/>
           <a:p>
             <a:r>
-              <a:rPr lang="sr-Cyrl-RS" dirty="0"/>
-              <a:t>Задатак рада јесте реализација </a:t>
-            </a:r>
-            <a:r>
               <a:rPr lang="en-US" i="1" dirty="0"/>
               <a:t>Streaming</a:t>
             </a:r>
             <a:r>
-              <a:rPr lang="sr-Cyrl-RS" dirty="0"/>
-              <a:t> платформе – серверске и клијентске стране </a:t>
-            </a:r>
-            <a:r>
-              <a:rPr lang="en-US" i="1" dirty="0"/>
-              <a:t>Streaming</a:t>
-            </a:r>
-            <a:r>
               <a:rPr lang="sr-Cyrl-RS" i="1" dirty="0"/>
               <a:t> </a:t>
             </a:r>
             <a:r>
               <a:rPr lang="sr-Cyrl-RS" dirty="0"/>
-              <a:t>сервиса базираног на </a:t>
+              <a:t>сервис базиран на </a:t>
             </a:r>
             <a:r>
               <a:rPr lang="en-US" i="1" dirty="0"/>
@@ -26295,7 +26325,7 @@
           <a:p>
             <a:r>
               <a:rPr lang="sr-Cyrl-RS" dirty="0"/>
-              <a:t>Постоје два типа видео преноса: </a:t>
+              <a:t>Два типа видео преноса: </a:t>
             </a:r>
             <a:r>
               <a:rPr lang="en-US" i="1" dirty="0"/>
@@ -26446,8 +26476,8 @@
         </p:nvSpPr>
         <p:spPr>
           <a:xfrm>
-            <a:off x="1617475" y="312938"/>
-            <a:ext cx="9488489" cy="1032030"/>
+            <a:off x="1617476" y="312938"/>
+            <a:ext cx="8387658" cy="1032030"/>
           </a:xfrm>
         </p:spPr>
         <p:txBody>
@@ -26459,7 +26489,7 @@
             <a:pPr algn="l"/>
             <a:r>
               <a:rPr lang="sr-Cyrl-RS" dirty="0"/>
-              <a:t>Комуникација са мрежним корисницима</a:t>
+              <a:t>Управљање базом података</a:t>
             </a:r>
             <a:br>
               <a:rPr lang="sr-Cyrl-RS" dirty="0"/>
@@ -26514,59 +26544,63 @@
           <a:lstStyle/>
           <a:p>
             <a:r>
+              <a:rPr lang="en-US" i="1" dirty="0"/>
+              <a:t>MySQL</a:t>
+            </a:r>
+          </a:p>
+          <a:p>
+            <a:r>
               <a:rPr lang="sr-Cyrl-RS" dirty="0"/>
-              <a:t>Слична </a:t>
+              <a:t>Мрежни менаџер користи </a:t>
             </a:r>
             <a:r>
               <a:rPr lang="en-US" i="1" dirty="0"/>
-              <a:t>RTSP</a:t>
-            </a:r>
-            <a:r>
-              <a:rPr lang="en-US" dirty="0"/>
+              <a:t>MySQL</a:t>
+            </a:r>
+            <a:r>
+              <a:rPr lang="sr-Cyrl-RS" i="1" dirty="0"/>
               <a:t> </a:t>
             </a:r>
             <a:r>
+              <a:rPr lang="en-US" i="1" dirty="0"/>
+              <a:t>C API</a:t>
+            </a:r>
+            <a:r>
               <a:rPr lang="sr-Cyrl-RS" dirty="0"/>
-              <a:t>комуникацији</a:t>
-            </a:r>
-            <a:endParaRPr lang="sr-Cyrl-RS" i="1" dirty="0"/>
+              <a:t> за управљање</a:t>
+            </a:r>
           </a:p>
           <a:p>
             <a:r>
               <a:rPr lang="sr-Cyrl-RS" dirty="0"/>
-              <a:t>Дели се у два режима: иницијални и устаљени</a:t>
+              <a:t>Администраторски креденцијали</a:t>
             </a:r>
           </a:p>
           <a:p>
             <a:r>
               <a:rPr lang="sr-Cyrl-RS" dirty="0"/>
-              <a:t>Иницијални режим: регистрација и пријављивање</a:t>
+              <a:t>Захтев који се шаље је у форми команде коју администратор може унети преко терминала</a:t>
             </a:r>
           </a:p>
           <a:p>
             <a:r>
               <a:rPr lang="sr-Cyrl-RS" dirty="0"/>
-              <a:t>Устаљени режим: провера доступности </a:t>
-            </a:r>
-            <a:r>
-              <a:rPr lang="en-US" i="1" dirty="0"/>
-              <a:t>On-Demand</a:t>
-            </a:r>
-            <a:r>
-              <a:rPr lang="en-US" dirty="0"/>
-              <a:t> </a:t>
-            </a:r>
+              <a:t>Пријава – читање са базе на основу упита</a:t>
+            </a:r>
+          </a:p>
+          <a:p>
             <a:r>
               <a:rPr lang="sr-Cyrl-RS" dirty="0"/>
-              <a:t>преноса и благовремено ажурирање листе активних видео преноса</a:t>
-            </a:r>
+              <a:t>Регистрација – читање са базе на основу упита + унос нових података</a:t>
+            </a:r>
+            <a:endParaRPr lang="en-US" dirty="0"/>
           </a:p>
         </p:txBody>
       </p:sp>
     </p:spTree>
     <p:extLst>
       <p:ext uri="{BB962C8B-B14F-4D97-AF65-F5344CB8AC3E}">
-        <p14:creationId xmlns:p14="http://schemas.microsoft.com/office/powerpoint/2010/main" val="607711869"/>
+        <p14:creationId xmlns:p14="http://schemas.microsoft.com/office/powerpoint/2010/main" val="1617124522"/>
       </p:ext>
     </p:extLst>
   </p:cSld>
@@ -26624,7 +26658,7 @@
             <a:pPr algn="l"/>
             <a:r>
               <a:rPr lang="sr-Cyrl-RS" dirty="0"/>
-              <a:t>Управљање базом података</a:t>
+              <a:t>Криптовање порука</a:t>
             </a:r>
             <a:br>
               <a:rPr lang="sr-Cyrl-RS" dirty="0"/>
@@ -26679,207 +26713,38 @@
           <a:lstStyle/>
           <a:p>
             <a:r>
+              <a:rPr lang="sr-Cyrl-RS" dirty="0"/>
+              <a:t>Извршава се уз помоћ </a:t>
+            </a:r>
+            <a:r>
               <a:rPr lang="en-US" i="1" dirty="0"/>
-              <a:t>MySQL</a:t>
-            </a:r>
-          </a:p>
-          <a:p>
+              <a:t>Crypto++ </a:t>
+            </a:r>
             <a:r>
               <a:rPr lang="sr-Cyrl-RS" dirty="0"/>
-              <a:t>Мрежни менаџер користи </a:t>
+              <a:t>библиотеке</a:t>
+            </a:r>
+          </a:p>
+          <a:p>
+            <a:r>
+              <a:rPr lang="sr-Cyrl-RS" dirty="0"/>
+              <a:t>Користи се симетрична енкрипција – </a:t>
             </a:r>
             <a:r>
               <a:rPr lang="en-US" i="1" dirty="0"/>
-              <a:t>MySQL</a:t>
+              <a:t>AES</a:t>
             </a:r>
             <a:r>
               <a:rPr lang="sr-Cyrl-RS" i="1" dirty="0"/>
               <a:t> </a:t>
             </a:r>
             <a:r>
-              <a:rPr lang="en-US" i="1" dirty="0"/>
-              <a:t>C API</a:t>
-            </a:r>
-            <a:r>
-              <a:rPr lang="sr-Cyrl-RS" dirty="0"/>
-              <a:t> за управљање</a:t>
-            </a:r>
-          </a:p>
-          <a:p>
-            <a:r>
-              <a:rPr lang="sr-Cyrl-RS" dirty="0"/>
-              <a:t>Администраторски креденцијали</a:t>
-            </a:r>
-          </a:p>
-          <a:p>
-            <a:r>
-              <a:rPr lang="sr-Cyrl-RS" dirty="0"/>
-              <a:t>Захтев који се шаље је у форми команде коју администратор може унети преко терминала</a:t>
-            </a:r>
-          </a:p>
-          <a:p>
-            <a:r>
-              <a:rPr lang="sr-Cyrl-RS" dirty="0"/>
-              <a:t>Пријава – читање са базе на основу упита</a:t>
-            </a:r>
-          </a:p>
-          <a:p>
-            <a:r>
-              <a:rPr lang="sr-Cyrl-RS" dirty="0"/>
-              <a:t>Регистрација – читање са базе на основу упита + унос нових података</a:t>
-            </a:r>
-            <a:endParaRPr lang="en-US" dirty="0"/>
-          </a:p>
-        </p:txBody>
-      </p:sp>
-    </p:spTree>
-    <p:extLst>
-      <p:ext uri="{BB962C8B-B14F-4D97-AF65-F5344CB8AC3E}">
-        <p14:creationId xmlns:p14="http://schemas.microsoft.com/office/powerpoint/2010/main" val="1617124522"/>
-      </p:ext>
-    </p:extLst>
-  </p:cSld>
-  <p:clrMapOvr>
-    <a:masterClrMapping/>
-  </p:clrMapOvr>
-</p:sld>
-</file>
-
-<file path=ppt/slides/slide22.xml><?xml version="1.0" encoding="utf-8"?>
-<p:sld xmlns:a="http://schemas.openxmlformats.org/drawingml/2006/main" xmlns:r="http://schemas.openxmlformats.org/officeDocument/2006/relationships" xmlns:p="http://schemas.openxmlformats.org/presentationml/2006/main">
-  <p:cSld>
-    <p:spTree>
-      <p:nvGrpSpPr>
-        <p:cNvPr id="1" name=""/>
-        <p:cNvGrpSpPr/>
-        <p:nvPr/>
-      </p:nvGrpSpPr>
-      <p:grpSpPr>
-        <a:xfrm>
-          <a:off x="0" y="0"/>
-          <a:ext cx="0" cy="0"/>
-          <a:chOff x="0" y="0"/>
-          <a:chExt cx="0" cy="0"/>
-        </a:xfrm>
-      </p:grpSpPr>
-      <p:sp>
-        <p:nvSpPr>
-          <p:cNvPr id="2" name="Title 1">
-            <a:extLst>
-              <a:ext uri="{FF2B5EF4-FFF2-40B4-BE49-F238E27FC236}">
-                <a16:creationId xmlns:a16="http://schemas.microsoft.com/office/drawing/2014/main" id="{7E156979-D1B6-479E-A38E-A2566E693406}"/>
-              </a:ext>
-            </a:extLst>
-          </p:cNvPr>
-          <p:cNvSpPr>
-            <a:spLocks noGrp="1"/>
-          </p:cNvSpPr>
-          <p:nvPr>
-            <p:ph type="title"/>
-          </p:nvPr>
-        </p:nvSpPr>
-        <p:spPr>
-          <a:xfrm>
-            <a:off x="1617476" y="312938"/>
-            <a:ext cx="8387658" cy="1032030"/>
-          </a:xfrm>
-        </p:spPr>
-        <p:txBody>
-          <a:bodyPr>
-            <a:normAutofit/>
-          </a:bodyPr>
-          <a:lstStyle/>
-          <a:p>
-            <a:pPr algn="l"/>
-            <a:r>
-              <a:rPr lang="sr-Cyrl-RS" dirty="0"/>
-              <a:t>Криптовање порука</a:t>
-            </a:r>
-            <a:br>
-              <a:rPr lang="sr-Cyrl-RS" dirty="0"/>
-            </a:br>
-            <a:r>
-              <a:rPr kumimoji="0" lang="sr-Cyrl-RS" sz="2000" b="0" i="1" u="none" strike="noStrike" kern="1200" cap="none" spc="0" normalizeH="0" baseline="0" noProof="0" dirty="0">
-                <a:ln w="3175" cmpd="sng">
-                  <a:noFill/>
-                </a:ln>
-                <a:solidFill>
-                  <a:prstClr val="black"/>
-                </a:solidFill>
-                <a:effectLst/>
-                <a:uLnTx/>
-                <a:uFillTx/>
-                <a:latin typeface="Corbel" panose="020B0503020204020204"/>
-                <a:ea typeface="+mj-ea"/>
-                <a:cs typeface="+mj-cs"/>
-              </a:rPr>
-              <a:t>Мрежни менаџер</a:t>
-            </a:r>
-            <a:endParaRPr lang="en-US" dirty="0"/>
-          </a:p>
-        </p:txBody>
-      </p:sp>
-      <p:sp>
-        <p:nvSpPr>
-          <p:cNvPr id="3" name="Content Placeholder 2">
-            <a:extLst>
-              <a:ext uri="{FF2B5EF4-FFF2-40B4-BE49-F238E27FC236}">
-                <a16:creationId xmlns:a16="http://schemas.microsoft.com/office/drawing/2014/main" id="{B926073A-16BE-4E3A-B0E0-F005707F5EC4}"/>
-              </a:ext>
-            </a:extLst>
-          </p:cNvPr>
-          <p:cNvSpPr>
-            <a:spLocks noGrp="1"/>
-          </p:cNvSpPr>
-          <p:nvPr>
-            <p:ph idx="1"/>
-          </p:nvPr>
-        </p:nvSpPr>
-        <p:spPr>
-          <a:xfrm>
-            <a:off x="1617476" y="1531399"/>
-            <a:ext cx="10402889" cy="4350057"/>
-          </a:xfrm>
-        </p:spPr>
-        <p:txBody>
-          <a:bodyPr>
-            <a:normAutofit/>
-          </a:bodyPr>
-          <a:lstStyle/>
-          <a:p>
-            <a:r>
-              <a:rPr lang="sr-Cyrl-RS" dirty="0"/>
-              <a:t>Извршава се уз помоћ </a:t>
-            </a:r>
-            <a:r>
-              <a:rPr lang="en-US" i="1" dirty="0"/>
-              <a:t>Crypto++ </a:t>
-            </a:r>
-            <a:r>
-              <a:rPr lang="sr-Cyrl-RS" dirty="0"/>
-              <a:t>библиотеке</a:t>
-            </a:r>
-          </a:p>
-          <a:p>
-            <a:r>
-              <a:rPr lang="sr-Cyrl-RS" dirty="0"/>
-              <a:t>Користи се симетрична енкрипција – </a:t>
-            </a:r>
-            <a:r>
-              <a:rPr lang="en-US" i="1" dirty="0"/>
-              <a:t>AES</a:t>
-            </a:r>
-            <a:r>
-              <a:rPr lang="sr-Cyrl-RS" i="1" dirty="0"/>
-              <a:t> </a:t>
-            </a:r>
-            <a:r>
               <a:rPr lang="sr-Cyrl-RS" dirty="0"/>
               <a:t>– </a:t>
             </a:r>
             <a:r>
               <a:rPr lang="en-US" i="1" dirty="0"/>
-              <a:t>Advanced Encryption System</a:t>
+              <a:t>Advanced Encryption Standard</a:t>
             </a:r>
             <a:endParaRPr lang="en-US" dirty="0"/>
           </a:p>
@@ -26910,7 +26775,7 @@
 </p:sld>
 </file>
 
-<file path=ppt/slides/slide23.xml><?xml version="1.0" encoding="utf-8"?>
+<file path=ppt/slides/slide22.xml><?xml version="1.0" encoding="utf-8"?>
 <p:sld xmlns:a="http://schemas.openxmlformats.org/drawingml/2006/main" xmlns:r="http://schemas.openxmlformats.org/officeDocument/2006/relationships" xmlns:p="http://schemas.openxmlformats.org/presentationml/2006/main">
   <p:cSld>
     <p:spTree>
@@ -27020,6 +26885,139 @@
 </p:sld>
 </file>
 
+<file path=ppt/slides/slide23.xml><?xml version="1.0" encoding="utf-8"?>
+<p:sld xmlns:a="http://schemas.openxmlformats.org/drawingml/2006/main" xmlns:r="http://schemas.openxmlformats.org/officeDocument/2006/relationships" xmlns:p="http://schemas.openxmlformats.org/presentationml/2006/main">
+  <p:cSld>
+    <p:spTree>
+      <p:nvGrpSpPr>
+        <p:cNvPr id="1" name=""/>
+        <p:cNvGrpSpPr/>
+        <p:nvPr/>
+      </p:nvGrpSpPr>
+      <p:grpSpPr>
+        <a:xfrm>
+          <a:off x="0" y="0"/>
+          <a:ext cx="0" cy="0"/>
+          <a:chOff x="0" y="0"/>
+          <a:chExt cx="0" cy="0"/>
+        </a:xfrm>
+      </p:grpSpPr>
+      <p:sp>
+        <p:nvSpPr>
+          <p:cNvPr id="2" name="Title 1">
+            <a:extLst>
+              <a:ext uri="{FF2B5EF4-FFF2-40B4-BE49-F238E27FC236}">
+                <a16:creationId xmlns:a16="http://schemas.microsoft.com/office/drawing/2014/main" id="{E2E57030-59F4-4AC2-A837-3D6B5C17DBD8}"/>
+              </a:ext>
+            </a:extLst>
+          </p:cNvPr>
+          <p:cNvSpPr>
+            <a:spLocks noGrp="1"/>
+          </p:cNvSpPr>
+          <p:nvPr>
+            <p:ph type="title"/>
+          </p:nvPr>
+        </p:nvSpPr>
+        <p:spPr>
+          <a:xfrm>
+            <a:off x="1489202" y="2769833"/>
+            <a:ext cx="10335853" cy="738042"/>
+          </a:xfrm>
+        </p:spPr>
+        <p:txBody>
+          <a:bodyPr>
+            <a:normAutofit/>
+          </a:bodyPr>
+          <a:lstStyle/>
+          <a:p>
+            <a:pPr algn="l"/>
+            <a:r>
+              <a:rPr lang="sr-Cyrl-RS" dirty="0"/>
+              <a:t>Програмско решење клијентске апликације</a:t>
+            </a:r>
+            <a:endParaRPr lang="en-US" dirty="0"/>
+          </a:p>
+        </p:txBody>
+      </p:sp>
+      <p:sp>
+        <p:nvSpPr>
+          <p:cNvPr id="3" name="Text Placeholder 2">
+            <a:extLst>
+              <a:ext uri="{FF2B5EF4-FFF2-40B4-BE49-F238E27FC236}">
+                <a16:creationId xmlns:a16="http://schemas.microsoft.com/office/drawing/2014/main" id="{50B82528-4326-47FD-8257-4AED300ED99B}"/>
+              </a:ext>
+            </a:extLst>
+          </p:cNvPr>
+          <p:cNvSpPr>
+            <a:spLocks noGrp="1"/>
+          </p:cNvSpPr>
+          <p:nvPr>
+            <p:ph type="body" idx="1"/>
+          </p:nvPr>
+        </p:nvSpPr>
+        <p:spPr>
+          <a:xfrm>
+            <a:off x="1489202" y="3604334"/>
+            <a:ext cx="9634517" cy="1447060"/>
+          </a:xfrm>
+        </p:spPr>
+        <p:txBody>
+          <a:bodyPr/>
+          <a:lstStyle/>
+          <a:p>
+            <a:pPr algn="l"/>
+            <a:r>
+              <a:rPr lang="en-US" i="1" dirty="0"/>
+              <a:t>RTSP</a:t>
+            </a:r>
+            <a:r>
+              <a:rPr lang="sr-Cyrl-RS" i="1" dirty="0"/>
+              <a:t> </a:t>
+            </a:r>
+            <a:r>
+              <a:rPr lang="sr-Cyrl-RS" dirty="0"/>
+              <a:t>клијент</a:t>
+            </a:r>
+            <a:endParaRPr lang="sr-Cyrl-RS" i="1" dirty="0"/>
+          </a:p>
+          <a:p>
+            <a:pPr algn="l"/>
+            <a:r>
+              <a:rPr lang="en-US" i="1" dirty="0"/>
+              <a:t>RTP</a:t>
+            </a:r>
+            <a:r>
+              <a:rPr lang="sr-Cyrl-RS" i="1" dirty="0"/>
+              <a:t> </a:t>
+            </a:r>
+            <a:r>
+              <a:rPr lang="sr-Cyrl-RS" dirty="0"/>
+              <a:t>клијент</a:t>
+            </a:r>
+          </a:p>
+          <a:p>
+            <a:pPr algn="l"/>
+            <a:r>
+              <a:rPr lang="sr-Cyrl-RS" dirty="0"/>
+              <a:t>Мрежни корисник</a:t>
+            </a:r>
+            <a:endParaRPr lang="en-US" dirty="0"/>
+          </a:p>
+        </p:txBody>
+      </p:sp>
+    </p:spTree>
+    <p:extLst>
+      <p:ext uri="{BB962C8B-B14F-4D97-AF65-F5344CB8AC3E}">
+        <p14:creationId xmlns:p14="http://schemas.microsoft.com/office/powerpoint/2010/main" val="3795206433"/>
+      </p:ext>
+    </p:extLst>
+  </p:cSld>
+  <p:clrMapOvr>
+    <a:masterClrMapping/>
+  </p:clrMapOvr>
+</p:sld>
+</file>
+
 <file path=ppt/slides/slide24.xml><?xml version="1.0" encoding="utf-8"?>
 <p:sld xmlns:a="http://schemas.openxmlformats.org/drawingml/2006/main" xmlns:r="http://schemas.openxmlformats.org/officeDocument/2006/relationships" xmlns:p="http://schemas.openxmlformats.org/presentationml/2006/main">
   <p:cSld>
@@ -27042,7 +27040,7 @@
           <p:cNvPr id="2" name="Title 1">
             <a:extLst>
               <a:ext uri="{FF2B5EF4-FFF2-40B4-BE49-F238E27FC236}">
-                <a16:creationId xmlns:a16="http://schemas.microsoft.com/office/drawing/2014/main" id="{E2E57030-59F4-4AC2-A837-3D6B5C17DBD8}"/>
+                <a16:creationId xmlns:a16="http://schemas.microsoft.com/office/drawing/2014/main" id="{7E156979-D1B6-479E-A38E-A2566E693406}"/>
               </a:ext>
             </a:extLst>
           </p:cNvPr>
@@ -27055,8 +27053,8 @@
         </p:nvSpPr>
         <p:spPr>
           <a:xfrm>
-            <a:off x="1489202" y="2769833"/>
-            <a:ext cx="10335853" cy="738042"/>
+            <a:off x="1617476" y="312938"/>
+            <a:ext cx="8387658" cy="1032030"/>
           </a:xfrm>
         </p:spPr>
         <p:txBody>
@@ -27067,8 +27065,16 @@
           <a:p>
             <a:pPr algn="l"/>
             <a:r>
+              <a:rPr lang="en-US" i="1" dirty="0"/>
+              <a:t>RTSP</a:t>
+            </a:r>
+            <a:r>
+              <a:rPr lang="en-US" dirty="0"/>
+              <a:t> </a:t>
+            </a:r>
+            <a:r>
               <a:rPr lang="sr-Cyrl-RS" dirty="0"/>
-              <a:t>Програмско решење клијентске апликације</a:t>
+              <a:t>клијент</a:t>
             </a:r>
             <a:endParaRPr lang="en-US" dirty="0"/>
           </a:p>
@@ -27076,10 +27082,10 @@
       </p:sp>
       <p:sp>
         <p:nvSpPr>
-          <p:cNvPr id="3" name="Text Placeholder 2">
+          <p:cNvPr id="3" name="Content Placeholder 2">
             <a:extLst>
               <a:ext uri="{FF2B5EF4-FFF2-40B4-BE49-F238E27FC236}">
-                <a16:creationId xmlns:a16="http://schemas.microsoft.com/office/drawing/2014/main" id="{50B82528-4326-47FD-8257-4AED300ED99B}"/>
+                <a16:creationId xmlns:a16="http://schemas.microsoft.com/office/drawing/2014/main" id="{B926073A-16BE-4E3A-B0E0-F005707F5EC4}"/>
               </a:ext>
             </a:extLst>
           </p:cNvPr>
@@ -27087,23 +27093,34 @@
             <a:spLocks noGrp="1"/>
           </p:cNvSpPr>
           <p:nvPr>
-            <p:ph type="body" idx="1"/>
+            <p:ph idx="1"/>
           </p:nvPr>
         </p:nvSpPr>
         <p:spPr>
           <a:xfrm>
-            <a:off x="1489202" y="3604334"/>
-            <a:ext cx="9634517" cy="1447060"/>
+            <a:off x="1617476" y="1531399"/>
+            <a:ext cx="10402889" cy="4350057"/>
           </a:xfrm>
         </p:spPr>
         <p:txBody>
-          <a:bodyPr/>
+          <a:bodyPr>
+            <a:normAutofit/>
+          </a:bodyPr>
           <a:lstStyle/>
           <a:p>
-            <a:pPr algn="l"/>
+            <a:r>
+              <a:rPr lang="sr-Cyrl-RS" dirty="0"/>
+              <a:t>Задужен за комуникацију са сервером и одабир преноса</a:t>
+            </a:r>
+          </a:p>
+          <a:p>
+            <a:r>
+              <a:rPr lang="sr-Cyrl-RS" dirty="0"/>
+              <a:t>Припрема терен за </a:t>
+            </a:r>
             <a:r>
               <a:rPr lang="en-US" i="1" dirty="0"/>
-              <a:t>RTSP</a:t>
+              <a:t>RTP</a:t>
             </a:r>
             <a:r>
               <a:rPr lang="sr-Cyrl-RS" i="1" dirty="0"/>
@@ -27111,39 +27128,84 @@
             </a:r>
             <a:r>
               <a:rPr lang="sr-Cyrl-RS" dirty="0"/>
-              <a:t>клијент</a:t>
-            </a:r>
-            <a:endParaRPr lang="sr-Cyrl-RS" i="1" dirty="0"/>
-          </a:p>
-          <a:p>
-            <a:pPr algn="l"/>
-            <a:r>
-              <a:rPr lang="en-US" i="1" dirty="0"/>
-              <a:t>RTP</a:t>
-            </a:r>
-            <a:r>
-              <a:rPr lang="sr-Cyrl-RS" i="1" dirty="0"/>
+              <a:t>клијента</a:t>
+            </a:r>
+          </a:p>
+          <a:p>
+            <a:r>
+              <a:rPr lang="sr-Cyrl-RS" dirty="0"/>
+              <a:t>Започиње рад двоструким кликом на један од понуђених преноса</a:t>
+            </a:r>
+          </a:p>
+          <a:p>
+            <a:r>
+              <a:rPr lang="sr-Cyrl-RS" dirty="0"/>
+              <a:t>Захтеви које шаље: </a:t>
+            </a:r>
+          </a:p>
+          <a:p>
+            <a:pPr lvl="1"/>
+            <a:r>
+              <a:rPr lang="en-US" sz="2400" i="1" dirty="0"/>
+              <a:t>Options</a:t>
+            </a:r>
+            <a:r>
+              <a:rPr lang="en-US" sz="2400" dirty="0"/>
+              <a:t>, </a:t>
+            </a:r>
+            <a:r>
+              <a:rPr lang="en-US" sz="2400" i="1" dirty="0"/>
+              <a:t>Describe, Setup </a:t>
+            </a:r>
+            <a:r>
+              <a:rPr lang="sr-Cyrl-RS" sz="2400" dirty="0"/>
+              <a:t>и</a:t>
+            </a:r>
+            <a:r>
+              <a:rPr lang="en-US" sz="2400" dirty="0"/>
               <a:t> </a:t>
             </a:r>
             <a:r>
+              <a:rPr lang="en-US" sz="2400" i="1" dirty="0"/>
+              <a:t>Play</a:t>
+            </a:r>
+            <a:r>
+              <a:rPr lang="sr-Cyrl-RS" sz="2400" i="1" dirty="0"/>
+              <a:t> </a:t>
+            </a:r>
+            <a:r>
+              <a:rPr lang="sr-Cyrl-RS" sz="2400" dirty="0"/>
+              <a:t>за успоставу видео преноса</a:t>
+            </a:r>
+          </a:p>
+          <a:p>
+            <a:pPr lvl="1"/>
+            <a:r>
+              <a:rPr lang="en-US" sz="2400" i="1" dirty="0"/>
+              <a:t>Teardown</a:t>
+            </a:r>
+            <a:r>
+              <a:rPr lang="en-US" sz="2400" dirty="0"/>
+              <a:t> </a:t>
+            </a:r>
+            <a:r>
+              <a:rPr lang="sr-Cyrl-RS" sz="2400" dirty="0"/>
+              <a:t>за прекид видео преноса</a:t>
+            </a:r>
+            <a:endParaRPr lang="sr-Cyrl-RS" sz="2400" i="1" dirty="0"/>
+          </a:p>
+          <a:p>
+            <a:r>
               <a:rPr lang="sr-Cyrl-RS" dirty="0"/>
-              <a:t>клијент</a:t>
-            </a:r>
-          </a:p>
-          <a:p>
-            <a:pPr algn="l"/>
-            <a:r>
-              <a:rPr lang="sr-Cyrl-RS" dirty="0"/>
-              <a:t>Мрежни корисник</a:t>
-            </a:r>
-            <a:endParaRPr lang="en-US" dirty="0"/>
+              <a:t>Након потврдног одговора за послате захтеве поседује све информације неопходне за приказ видео преноса</a:t>
+            </a:r>
           </a:p>
         </p:txBody>
       </p:sp>
     </p:spTree>
     <p:extLst>
       <p:ext uri="{BB962C8B-B14F-4D97-AF65-F5344CB8AC3E}">
-        <p14:creationId xmlns:p14="http://schemas.microsoft.com/office/powerpoint/2010/main" val="3795206433"/>
+        <p14:creationId xmlns:p14="http://schemas.microsoft.com/office/powerpoint/2010/main" val="2523666908"/>
       </p:ext>
     </p:extLst>
   </p:cSld>
@@ -27201,203 +27263,6 @@
             <a:pPr algn="l"/>
             <a:r>
               <a:rPr lang="en-US" i="1" dirty="0"/>
-              <a:t>RTSP</a:t>
-            </a:r>
-            <a:r>
-              <a:rPr lang="en-US" dirty="0"/>
-              <a:t> </a:t>
-            </a:r>
-            <a:r>
-              <a:rPr lang="sr-Cyrl-RS" dirty="0"/>
-              <a:t>клијент</a:t>
-            </a:r>
-            <a:endParaRPr lang="en-US" dirty="0"/>
-          </a:p>
-        </p:txBody>
-      </p:sp>
-      <p:sp>
-        <p:nvSpPr>
-          <p:cNvPr id="3" name="Content Placeholder 2">
-            <a:extLst>
-              <a:ext uri="{FF2B5EF4-FFF2-40B4-BE49-F238E27FC236}">
-                <a16:creationId xmlns:a16="http://schemas.microsoft.com/office/drawing/2014/main" id="{B926073A-16BE-4E3A-B0E0-F005707F5EC4}"/>
-              </a:ext>
-            </a:extLst>
-          </p:cNvPr>
-          <p:cNvSpPr>
-            <a:spLocks noGrp="1"/>
-          </p:cNvSpPr>
-          <p:nvPr>
-            <p:ph idx="1"/>
-          </p:nvPr>
-        </p:nvSpPr>
-        <p:spPr>
-          <a:xfrm>
-            <a:off x="1617476" y="1531399"/>
-            <a:ext cx="10402889" cy="4350057"/>
-          </a:xfrm>
-        </p:spPr>
-        <p:txBody>
-          <a:bodyPr>
-            <a:normAutofit/>
-          </a:bodyPr>
-          <a:lstStyle/>
-          <a:p>
-            <a:r>
-              <a:rPr lang="sr-Cyrl-RS" dirty="0"/>
-              <a:t>Задужен за комуникацију са сервером и одабир преноса</a:t>
-            </a:r>
-          </a:p>
-          <a:p>
-            <a:r>
-              <a:rPr lang="sr-Cyrl-RS" dirty="0"/>
-              <a:t>Припрема терен за </a:t>
-            </a:r>
-            <a:r>
-              <a:rPr lang="en-US" i="1" dirty="0"/>
-              <a:t>RTP</a:t>
-            </a:r>
-            <a:r>
-              <a:rPr lang="sr-Cyrl-RS" i="1" dirty="0"/>
-              <a:t> </a:t>
-            </a:r>
-            <a:r>
-              <a:rPr lang="sr-Cyrl-RS" dirty="0"/>
-              <a:t>клијента</a:t>
-            </a:r>
-          </a:p>
-          <a:p>
-            <a:r>
-              <a:rPr lang="sr-Cyrl-RS" dirty="0"/>
-              <a:t>Започиње рад двоструким кликом на један од понуђених преноса</a:t>
-            </a:r>
-          </a:p>
-          <a:p>
-            <a:r>
-              <a:rPr lang="sr-Cyrl-RS" dirty="0"/>
-              <a:t>Захтеви које шаље: </a:t>
-            </a:r>
-          </a:p>
-          <a:p>
-            <a:pPr lvl="1"/>
-            <a:r>
-              <a:rPr lang="en-US" sz="2400" i="1" dirty="0"/>
-              <a:t>Options</a:t>
-            </a:r>
-            <a:r>
-              <a:rPr lang="en-US" sz="2400" dirty="0"/>
-              <a:t>, </a:t>
-            </a:r>
-            <a:r>
-              <a:rPr lang="en-US" sz="2400" i="1" dirty="0"/>
-              <a:t>Describe, Setup </a:t>
-            </a:r>
-            <a:r>
-              <a:rPr lang="sr-Cyrl-RS" sz="2400" dirty="0"/>
-              <a:t>и</a:t>
-            </a:r>
-            <a:r>
-              <a:rPr lang="en-US" sz="2400" dirty="0"/>
-              <a:t> </a:t>
-            </a:r>
-            <a:r>
-              <a:rPr lang="en-US" sz="2400" i="1" dirty="0"/>
-              <a:t>Play</a:t>
-            </a:r>
-            <a:r>
-              <a:rPr lang="sr-Cyrl-RS" sz="2400" i="1" dirty="0"/>
-              <a:t> </a:t>
-            </a:r>
-            <a:r>
-              <a:rPr lang="sr-Cyrl-RS" sz="2400" dirty="0"/>
-              <a:t>за успоставу видео преноса</a:t>
-            </a:r>
-          </a:p>
-          <a:p>
-            <a:pPr lvl="1"/>
-            <a:r>
-              <a:rPr lang="en-US" sz="2400" i="1" dirty="0"/>
-              <a:t>Teardown</a:t>
-            </a:r>
-            <a:r>
-              <a:rPr lang="en-US" sz="2400" dirty="0"/>
-              <a:t> </a:t>
-            </a:r>
-            <a:r>
-              <a:rPr lang="sr-Cyrl-RS" sz="2400" dirty="0"/>
-              <a:t>за прекид видео преноса</a:t>
-            </a:r>
-            <a:endParaRPr lang="sr-Cyrl-RS" sz="2400" i="1" dirty="0"/>
-          </a:p>
-          <a:p>
-            <a:r>
-              <a:rPr lang="sr-Cyrl-RS" dirty="0"/>
-              <a:t>Након потврдног одговора за послате захтеве поседује све информације неопходне за приказ видео преноса</a:t>
-            </a:r>
-          </a:p>
-        </p:txBody>
-      </p:sp>
-    </p:spTree>
-    <p:extLst>
-      <p:ext uri="{BB962C8B-B14F-4D97-AF65-F5344CB8AC3E}">
-        <p14:creationId xmlns:p14="http://schemas.microsoft.com/office/powerpoint/2010/main" val="2523666908"/>
-      </p:ext>
-    </p:extLst>
-  </p:cSld>
-  <p:clrMapOvr>
-    <a:masterClrMapping/>
-  </p:clrMapOvr>
-</p:sld>
-</file>
-
-<file path=ppt/slides/slide26.xml><?xml version="1.0" encoding="utf-8"?>
-<p:sld xmlns:a="http://schemas.openxmlformats.org/drawingml/2006/main" xmlns:r="http://schemas.openxmlformats.org/officeDocument/2006/relationships" xmlns:p="http://schemas.openxmlformats.org/presentationml/2006/main">
-  <p:cSld>
-    <p:spTree>
-      <p:nvGrpSpPr>
-        <p:cNvPr id="1" name=""/>
-        <p:cNvGrpSpPr/>
-        <p:nvPr/>
-      </p:nvGrpSpPr>
-      <p:grpSpPr>
-        <a:xfrm>
-          <a:off x="0" y="0"/>
-          <a:ext cx="0" cy="0"/>
-          <a:chOff x="0" y="0"/>
-          <a:chExt cx="0" cy="0"/>
-        </a:xfrm>
-      </p:grpSpPr>
-      <p:sp>
-        <p:nvSpPr>
-          <p:cNvPr id="2" name="Title 1">
-            <a:extLst>
-              <a:ext uri="{FF2B5EF4-FFF2-40B4-BE49-F238E27FC236}">
-                <a16:creationId xmlns:a16="http://schemas.microsoft.com/office/drawing/2014/main" id="{7E156979-D1B6-479E-A38E-A2566E693406}"/>
-              </a:ext>
-            </a:extLst>
-          </p:cNvPr>
-          <p:cNvSpPr>
-            <a:spLocks noGrp="1"/>
-          </p:cNvSpPr>
-          <p:nvPr>
-            <p:ph type="title"/>
-          </p:nvPr>
-        </p:nvSpPr>
-        <p:spPr>
-          <a:xfrm>
-            <a:off x="1617476" y="312938"/>
-            <a:ext cx="8387658" cy="1032030"/>
-          </a:xfrm>
-        </p:spPr>
-        <p:txBody>
-          <a:bodyPr>
-            <a:normAutofit/>
-          </a:bodyPr>
-          <a:lstStyle/>
-          <a:p>
-            <a:pPr algn="l"/>
-            <a:r>
-              <a:rPr lang="en-US" i="1" dirty="0"/>
               <a:t>RTP</a:t>
             </a:r>
             <a:r>
@@ -27522,7 +27387,7 @@
 </p:sld>
 </file>
 
-<file path=ppt/slides/slide27.xml><?xml version="1.0" encoding="utf-8"?>
+<file path=ppt/slides/slide26.xml><?xml version="1.0" encoding="utf-8"?>
 <p:sld xmlns:a="http://schemas.openxmlformats.org/drawingml/2006/main" xmlns:r="http://schemas.openxmlformats.org/officeDocument/2006/relationships" xmlns:p="http://schemas.openxmlformats.org/presentationml/2006/main">
   <p:cSld>
     <p:spTree>
@@ -27640,7 +27505,7 @@
 </p:sld>
 </file>
 
-<file path=ppt/slides/slide28.xml><?xml version="1.0" encoding="utf-8"?>
+<file path=ppt/slides/slide27.xml><?xml version="1.0" encoding="utf-8"?>
 <p:sld xmlns:a="http://schemas.openxmlformats.org/drawingml/2006/main" xmlns:r="http://schemas.openxmlformats.org/officeDocument/2006/relationships" xmlns:p="http://schemas.openxmlformats.org/presentationml/2006/main">
   <p:cSld>
     <p:spTree>
@@ -27724,7 +27589,7 @@
           <a:p>
             <a:r>
               <a:rPr lang="sr-Cyrl-RS" dirty="0"/>
-              <a:t>Модул који први започиње са радом у оквиру </a:t>
+              <a:t>Модул који први започиње са радом у оквиру клијентске апликације</a:t>
             </a:r>
           </a:p>
           <a:p>
@@ -27790,7 +27655,7 @@
 </p:sld>
 </file>
 
-<file path=ppt/slides/slide29.xml><?xml version="1.0" encoding="utf-8"?>
+<file path=ppt/slides/slide28.xml><?xml version="1.0" encoding="utf-8"?>
 <p:sld xmlns:a="http://schemas.openxmlformats.org/drawingml/2006/main" xmlns:r="http://schemas.openxmlformats.org/officeDocument/2006/relationships" xmlns:p="http://schemas.openxmlformats.org/presentationml/2006/main">
   <p:cSld>
     <p:spTree>
@@ -27900,6 +27765,213 @@
 </p:sld>
 </file>
 
+<file path=ppt/slides/slide29.xml><?xml version="1.0" encoding="utf-8"?>
+<p:sld xmlns:a="http://schemas.openxmlformats.org/drawingml/2006/main" xmlns:r="http://schemas.openxmlformats.org/officeDocument/2006/relationships" xmlns:p="http://schemas.openxmlformats.org/presentationml/2006/main">
+  <p:cSld>
+    <p:spTree>
+      <p:nvGrpSpPr>
+        <p:cNvPr id="1" name=""/>
+        <p:cNvGrpSpPr/>
+        <p:nvPr/>
+      </p:nvGrpSpPr>
+      <p:grpSpPr>
+        <a:xfrm>
+          <a:off x="0" y="0"/>
+          <a:ext cx="0" cy="0"/>
+          <a:chOff x="0" y="0"/>
+          <a:chExt cx="0" cy="0"/>
+        </a:xfrm>
+      </p:grpSpPr>
+      <p:sp>
+        <p:nvSpPr>
+          <p:cNvPr id="2" name="Title 1">
+            <a:extLst>
+              <a:ext uri="{FF2B5EF4-FFF2-40B4-BE49-F238E27FC236}">
+                <a16:creationId xmlns:a16="http://schemas.microsoft.com/office/drawing/2014/main" id="{7E156979-D1B6-479E-A38E-A2566E693406}"/>
+              </a:ext>
+            </a:extLst>
+          </p:cNvPr>
+          <p:cNvSpPr>
+            <a:spLocks noGrp="1"/>
+          </p:cNvSpPr>
+          <p:nvPr>
+            <p:ph type="title"/>
+          </p:nvPr>
+        </p:nvSpPr>
+        <p:spPr>
+          <a:xfrm>
+            <a:off x="1617476" y="312938"/>
+            <a:ext cx="8387658" cy="1032030"/>
+          </a:xfrm>
+        </p:spPr>
+        <p:txBody>
+          <a:bodyPr>
+            <a:normAutofit/>
+          </a:bodyPr>
+          <a:lstStyle/>
+          <a:p>
+            <a:pPr algn="l"/>
+            <a:r>
+              <a:rPr lang="sr-Cyrl-RS" dirty="0"/>
+              <a:t>Закључак</a:t>
+            </a:r>
+            <a:endParaRPr lang="en-US" dirty="0"/>
+          </a:p>
+        </p:txBody>
+      </p:sp>
+      <p:sp>
+        <p:nvSpPr>
+          <p:cNvPr id="3" name="Content Placeholder 2">
+            <a:extLst>
+              <a:ext uri="{FF2B5EF4-FFF2-40B4-BE49-F238E27FC236}">
+                <a16:creationId xmlns:a16="http://schemas.microsoft.com/office/drawing/2014/main" id="{B926073A-16BE-4E3A-B0E0-F005707F5EC4}"/>
+              </a:ext>
+            </a:extLst>
+          </p:cNvPr>
+          <p:cNvSpPr>
+            <a:spLocks noGrp="1"/>
+          </p:cNvSpPr>
+          <p:nvPr>
+            <p:ph idx="1"/>
+          </p:nvPr>
+        </p:nvSpPr>
+        <p:spPr>
+          <a:xfrm>
+            <a:off x="1216240" y="1167415"/>
+            <a:ext cx="10839635" cy="4691847"/>
+          </a:xfrm>
+        </p:spPr>
+        <p:txBody>
+          <a:bodyPr>
+            <a:normAutofit/>
+          </a:bodyPr>
+          <a:lstStyle/>
+          <a:p>
+            <a:r>
+              <a:rPr lang="sr-Cyrl-RS" dirty="0"/>
+              <a:t>Коначно тестирање показало је да су сви модули система успешно интегрисани и успешно обављају захтеване функционалности</a:t>
+            </a:r>
+          </a:p>
+          <a:p>
+            <a:r>
+              <a:rPr lang="sr-Cyrl-RS" dirty="0"/>
+              <a:t>Предлози за побољшање система:</a:t>
+            </a:r>
+          </a:p>
+          <a:p>
+            <a:pPr lvl="1"/>
+            <a:r>
+              <a:rPr lang="sr-Cyrl-RS" dirty="0"/>
+              <a:t>Подржати паузирање </a:t>
+            </a:r>
+            <a:r>
+              <a:rPr lang="en-US" i="1" dirty="0"/>
+              <a:t>On-Demand</a:t>
+            </a:r>
+            <a:r>
+              <a:rPr lang="sr-Cyrl-RS" i="1" dirty="0"/>
+              <a:t> </a:t>
+            </a:r>
+            <a:r>
+              <a:rPr lang="sr-Cyrl-RS" dirty="0"/>
+              <a:t>преноса и пуштање насумичних делова снимка</a:t>
+            </a:r>
+          </a:p>
+          <a:p>
+            <a:pPr lvl="1"/>
+            <a:r>
+              <a:rPr lang="sr-Cyrl-RS" dirty="0"/>
+              <a:t>Раздвојити модуле серверске апликације у више нодова:</a:t>
+            </a:r>
+          </a:p>
+          <a:p>
+            <a:pPr marL="1371600" lvl="2" indent="-457200">
+              <a:buFont typeface="+mj-lt"/>
+              <a:buAutoNum type="arabicPeriod"/>
+            </a:pPr>
+            <a:r>
+              <a:rPr lang="sr-Cyrl-RS" dirty="0"/>
+              <a:t>Апликација која пласира живи пренос и врши видео записивање</a:t>
+            </a:r>
+          </a:p>
+          <a:p>
+            <a:pPr marL="1371600" lvl="2" indent="-457200">
+              <a:buFont typeface="+mj-lt"/>
+              <a:buAutoNum type="arabicPeriod"/>
+            </a:pPr>
+            <a:r>
+              <a:rPr lang="sr-Cyrl-RS" dirty="0"/>
+              <a:t>Апликација која је задужена за </a:t>
+            </a:r>
+            <a:r>
+              <a:rPr lang="en-US" i="1" dirty="0"/>
+              <a:t>On-Demand</a:t>
+            </a:r>
+            <a:r>
+              <a:rPr lang="sr-Cyrl-RS" i="1" dirty="0"/>
+              <a:t> </a:t>
+            </a:r>
+            <a:r>
+              <a:rPr lang="sr-Cyrl-RS" dirty="0"/>
+              <a:t>пренос </a:t>
+            </a:r>
+          </a:p>
+          <a:p>
+            <a:pPr marL="1371600" lvl="2" indent="-457200">
+              <a:buFont typeface="+mj-lt"/>
+              <a:buAutoNum type="arabicPeriod"/>
+            </a:pPr>
+            <a:r>
+              <a:rPr lang="sr-Cyrl-RS" dirty="0"/>
+              <a:t>Апликација која је задужена за евиденцију корисника, управљање базом и преусмеравање на видео пренос</a:t>
+            </a:r>
+          </a:p>
+          <a:p>
+            <a:pPr lvl="1"/>
+            <a:r>
+              <a:rPr lang="sr-Cyrl-RS" dirty="0"/>
+              <a:t>Имплементирати </a:t>
+            </a:r>
+            <a:r>
+              <a:rPr lang="en-US" i="1" dirty="0"/>
+              <a:t>Watchdog</a:t>
+            </a:r>
+            <a:r>
+              <a:rPr lang="sr-Cyrl-RS" dirty="0"/>
+              <a:t> сервис, који би поновно покретао неактивне делове систем</a:t>
+            </a:r>
+          </a:p>
+          <a:p>
+            <a:pPr lvl="1"/>
+            <a:r>
+              <a:rPr lang="en-US" i="1" dirty="0"/>
+              <a:t>Web</a:t>
+            </a:r>
+            <a:r>
+              <a:rPr lang="sr-Cyrl-RS" i="1" dirty="0"/>
+              <a:t> </a:t>
+            </a:r>
+            <a:r>
+              <a:rPr lang="sr-Cyrl-RS" dirty="0"/>
+              <a:t>подршка</a:t>
+            </a:r>
+            <a:endParaRPr lang="sr-Cyrl-RS" i="1" dirty="0"/>
+          </a:p>
+        </p:txBody>
+      </p:sp>
+    </p:spTree>
+    <p:extLst>
+      <p:ext uri="{BB962C8B-B14F-4D97-AF65-F5344CB8AC3E}">
+        <p14:creationId xmlns:p14="http://schemas.microsoft.com/office/powerpoint/2010/main" val="2565390846"/>
+      </p:ext>
+    </p:extLst>
+  </p:cSld>
+  <p:clrMapOvr>
+    <a:masterClrMapping/>
+  </p:clrMapOvr>
+</p:sld>
+</file>
+
 <file path=ppt/slides/slide3.xml><?xml version="1.0" encoding="utf-8"?>
 <p:sld xmlns:a="http://schemas.openxmlformats.org/drawingml/2006/main" xmlns:r="http://schemas.openxmlformats.org/officeDocument/2006/relationships" xmlns:p="http://schemas.openxmlformats.org/presentationml/2006/main">
   <p:cSld>
@@ -27922,7 +27994,7 @@
           <p:cNvPr id="2" name="Title 1">
             <a:extLst>
               <a:ext uri="{FF2B5EF4-FFF2-40B4-BE49-F238E27FC236}">
-                <a16:creationId xmlns:a16="http://schemas.microsoft.com/office/drawing/2014/main" id="{7E156979-D1B6-479E-A38E-A2566E693406}"/>
+                <a16:creationId xmlns:a16="http://schemas.microsoft.com/office/drawing/2014/main" id="{E2E57030-59F4-4AC2-A837-3D6B5C17DBD8}"/>
               </a:ext>
             </a:extLst>
           </p:cNvPr>
@@ -27935,28 +28007,18 @@
         </p:nvSpPr>
         <p:spPr>
           <a:xfrm>
-            <a:off x="1617476" y="312938"/>
-            <a:ext cx="3496062" cy="850037"/>
+            <a:off x="1489203" y="2769833"/>
+            <a:ext cx="9634517" cy="738042"/>
           </a:xfrm>
         </p:spPr>
         <p:txBody>
-          <a:bodyPr>
-            <a:normAutofit/>
-          </a:bodyPr>
+          <a:bodyPr/>
           <a:lstStyle/>
           <a:p>
             <a:pPr algn="l"/>
             <a:r>
-              <a:rPr lang="en-US" i="1" dirty="0"/>
-              <a:t>RTSP</a:t>
-            </a:r>
-            <a:r>
-              <a:rPr lang="en-US" dirty="0"/>
-              <a:t> </a:t>
-            </a:r>
-            <a:r>
               <a:rPr lang="sr-Cyrl-RS" dirty="0"/>
-              <a:t>протокол</a:t>
+              <a:t>Концепт решења </a:t>
             </a:r>
             <a:endParaRPr lang="en-US" dirty="0"/>
           </a:p>
@@ -27964,10 +28026,10 @@
       </p:sp>
       <p:sp>
         <p:nvSpPr>
-          <p:cNvPr id="3" name="Content Placeholder 2">
+          <p:cNvPr id="3" name="Text Placeholder 2">
             <a:extLst>
               <a:ext uri="{FF2B5EF4-FFF2-40B4-BE49-F238E27FC236}">
-                <a16:creationId xmlns:a16="http://schemas.microsoft.com/office/drawing/2014/main" id="{B926073A-16BE-4E3A-B0E0-F005707F5EC4}"/>
+                <a16:creationId xmlns:a16="http://schemas.microsoft.com/office/drawing/2014/main" id="{50B82528-4326-47FD-8257-4AED300ED99B}"/>
               </a:ext>
             </a:extLst>
           </p:cNvPr>
@@ -27975,91 +28037,39 @@
             <a:spLocks noGrp="1"/>
           </p:cNvSpPr>
           <p:nvPr>
-            <p:ph idx="1"/>
+            <p:ph type="body" idx="1"/>
           </p:nvPr>
         </p:nvSpPr>
         <p:spPr>
           <a:xfrm>
-            <a:off x="1617476" y="1162975"/>
-            <a:ext cx="10402889" cy="2106227"/>
+            <a:off x="1489202" y="3604334"/>
+            <a:ext cx="9634517" cy="958788"/>
           </a:xfrm>
         </p:spPr>
         <p:txBody>
-          <a:bodyPr>
-            <a:normAutofit/>
-          </a:bodyPr>
+          <a:bodyPr/>
           <a:lstStyle/>
           <a:p>
+            <a:pPr algn="l"/>
             <a:r>
               <a:rPr lang="en-US" i="1" dirty="0"/>
-              <a:t>Real-Time Streaming Protocol</a:t>
-            </a:r>
-          </a:p>
-          <a:p>
+              <a:t>Socket wrapper</a:t>
+            </a:r>
+          </a:p>
+          <a:p>
+            <a:pPr algn="l"/>
             <a:r>
               <a:rPr lang="sr-Cyrl-RS" dirty="0"/>
-              <a:t>Намењен је за контролу преноса аудио и/или видео садржаја</a:t>
-            </a:r>
-          </a:p>
-          <a:p>
-            <a:r>
-              <a:rPr lang="sr-Cyrl-RS" dirty="0"/>
-              <a:t>Остварује и контролише један или више преноса</a:t>
-            </a:r>
-          </a:p>
-          <a:p>
-            <a:r>
-              <a:rPr lang="sr-Cyrl-RS" dirty="0"/>
-              <a:t>Усмерава кориснике ка жељеном преносу</a:t>
-            </a:r>
-          </a:p>
-        </p:txBody>
-      </p:sp>
-      <p:pic>
-        <p:nvPicPr>
-          <p:cNvPr id="5" name="Picture 4">
-            <a:extLst>
-              <a:ext uri="{FF2B5EF4-FFF2-40B4-BE49-F238E27FC236}">
-                <a16:creationId xmlns:a16="http://schemas.microsoft.com/office/drawing/2014/main" id="{86C7D49D-C5AC-4D07-B19E-E6897DBA15CD}"/>
-              </a:ext>
-            </a:extLst>
-          </p:cNvPr>
-          <p:cNvPicPr>
-            <a:picLocks noChangeAspect="1"/>
-          </p:cNvPicPr>
-          <p:nvPr/>
-        </p:nvPicPr>
-        <p:blipFill>
-          <a:blip r:embed="rId2">
-            <a:extLst>
-              <a:ext uri="{28A0092B-C50C-407E-A947-70E740481C1C}">
-                <a14:useLocalDpi xmlns:a14="http://schemas.microsoft.com/office/drawing/2010/main" val="0"/>
-              </a:ext>
-            </a:extLst>
-          </a:blip>
-          <a:srcRect/>
-          <a:stretch>
-            <a:fillRect/>
-          </a:stretch>
-        </p:blipFill>
-        <p:spPr bwMode="auto">
-          <a:xfrm>
-            <a:off x="4536440" y="3269202"/>
-            <a:ext cx="3119120" cy="3246755"/>
-          </a:xfrm>
-          <a:prstGeom prst="rect">
-            <a:avLst/>
-          </a:prstGeom>
-          <a:noFill/>
-          <a:ln>
-            <a:noFill/>
-          </a:ln>
-        </p:spPr>
-      </p:pic>
+              <a:t>Архитектура и функционалност апликација</a:t>
+            </a:r>
+            <a:endParaRPr lang="en-US" dirty="0"/>
+          </a:p>
+        </p:txBody>
+      </p:sp>
     </p:spTree>
     <p:extLst>
       <p:ext uri="{BB962C8B-B14F-4D97-AF65-F5344CB8AC3E}">
-        <p14:creationId xmlns:p14="http://schemas.microsoft.com/office/powerpoint/2010/main" val="4142324940"/>
+        <p14:creationId xmlns:p14="http://schemas.microsoft.com/office/powerpoint/2010/main" val="3441468199"/>
       </p:ext>
     </p:extLst>
   </p:cSld>
@@ -28070,213 +28080,6 @@
 </file>
 
 <file path=ppt/slides/slide30.xml><?xml version="1.0" encoding="utf-8"?>
-<p:sld xmlns:a="http://schemas.openxmlformats.org/drawingml/2006/main" xmlns:r="http://schemas.openxmlformats.org/officeDocument/2006/relationships" xmlns:p="http://schemas.openxmlformats.org/presentationml/2006/main">
-  <p:cSld>
-    <p:spTree>
-      <p:nvGrpSpPr>
-        <p:cNvPr id="1" name=""/>
-        <p:cNvGrpSpPr/>
-        <p:nvPr/>
-      </p:nvGrpSpPr>
-      <p:grpSpPr>
-        <a:xfrm>
-          <a:off x="0" y="0"/>
-          <a:ext cx="0" cy="0"/>
-          <a:chOff x="0" y="0"/>
-          <a:chExt cx="0" cy="0"/>
-        </a:xfrm>
-      </p:grpSpPr>
-      <p:sp>
-        <p:nvSpPr>
-          <p:cNvPr id="2" name="Title 1">
-            <a:extLst>
-              <a:ext uri="{FF2B5EF4-FFF2-40B4-BE49-F238E27FC236}">
-                <a16:creationId xmlns:a16="http://schemas.microsoft.com/office/drawing/2014/main" id="{7E156979-D1B6-479E-A38E-A2566E693406}"/>
-              </a:ext>
-            </a:extLst>
-          </p:cNvPr>
-          <p:cNvSpPr>
-            <a:spLocks noGrp="1"/>
-          </p:cNvSpPr>
-          <p:nvPr>
-            <p:ph type="title"/>
-          </p:nvPr>
-        </p:nvSpPr>
-        <p:spPr>
-          <a:xfrm>
-            <a:off x="1617476" y="312938"/>
-            <a:ext cx="8387658" cy="1032030"/>
-          </a:xfrm>
-        </p:spPr>
-        <p:txBody>
-          <a:bodyPr>
-            <a:normAutofit/>
-          </a:bodyPr>
-          <a:lstStyle/>
-          <a:p>
-            <a:pPr algn="l"/>
-            <a:r>
-              <a:rPr lang="sr-Cyrl-RS" dirty="0"/>
-              <a:t>Закључак</a:t>
-            </a:r>
-            <a:endParaRPr lang="en-US" dirty="0"/>
-          </a:p>
-        </p:txBody>
-      </p:sp>
-      <p:sp>
-        <p:nvSpPr>
-          <p:cNvPr id="3" name="Content Placeholder 2">
-            <a:extLst>
-              <a:ext uri="{FF2B5EF4-FFF2-40B4-BE49-F238E27FC236}">
-                <a16:creationId xmlns:a16="http://schemas.microsoft.com/office/drawing/2014/main" id="{B926073A-16BE-4E3A-B0E0-F005707F5EC4}"/>
-              </a:ext>
-            </a:extLst>
-          </p:cNvPr>
-          <p:cNvSpPr>
-            <a:spLocks noGrp="1"/>
-          </p:cNvSpPr>
-          <p:nvPr>
-            <p:ph idx="1"/>
-          </p:nvPr>
-        </p:nvSpPr>
-        <p:spPr>
-          <a:xfrm>
-            <a:off x="1216240" y="1167415"/>
-            <a:ext cx="10839635" cy="4691847"/>
-          </a:xfrm>
-        </p:spPr>
-        <p:txBody>
-          <a:bodyPr>
-            <a:normAutofit/>
-          </a:bodyPr>
-          <a:lstStyle/>
-          <a:p>
-            <a:r>
-              <a:rPr lang="sr-Cyrl-RS" dirty="0"/>
-              <a:t>Коначно тестирање показало је да су сви модули система успешно интегрисани и успешно обављају захтеване функционалности</a:t>
-            </a:r>
-          </a:p>
-          <a:p>
-            <a:r>
-              <a:rPr lang="sr-Cyrl-RS" dirty="0"/>
-              <a:t>Предлози за побољшање система:</a:t>
-            </a:r>
-          </a:p>
-          <a:p>
-            <a:pPr lvl="1"/>
-            <a:r>
-              <a:rPr lang="sr-Cyrl-RS" dirty="0"/>
-              <a:t>Подржати паузирање </a:t>
-            </a:r>
-            <a:r>
-              <a:rPr lang="en-US" i="1" dirty="0"/>
-              <a:t>On-Demand</a:t>
-            </a:r>
-            <a:r>
-              <a:rPr lang="sr-Cyrl-RS" i="1" dirty="0"/>
-              <a:t> </a:t>
-            </a:r>
-            <a:r>
-              <a:rPr lang="sr-Cyrl-RS" dirty="0"/>
-              <a:t>преноса и пуштање насумичних делова снимка</a:t>
-            </a:r>
-          </a:p>
-          <a:p>
-            <a:pPr lvl="1"/>
-            <a:r>
-              <a:rPr lang="sr-Cyrl-RS" dirty="0"/>
-              <a:t>Раздвојити модуле серверске апликације у више нодова:</a:t>
-            </a:r>
-          </a:p>
-          <a:p>
-            <a:pPr marL="1371600" lvl="2" indent="-457200">
-              <a:buFont typeface="+mj-lt"/>
-              <a:buAutoNum type="arabicPeriod"/>
-            </a:pPr>
-            <a:r>
-              <a:rPr lang="sr-Cyrl-RS" dirty="0"/>
-              <a:t>Апликација која пласира живи пренос и врши видео записивање</a:t>
-            </a:r>
-          </a:p>
-          <a:p>
-            <a:pPr marL="1371600" lvl="2" indent="-457200">
-              <a:buFont typeface="+mj-lt"/>
-              <a:buAutoNum type="arabicPeriod"/>
-            </a:pPr>
-            <a:r>
-              <a:rPr lang="sr-Cyrl-RS" dirty="0"/>
-              <a:t>Апликација која је задужена за </a:t>
-            </a:r>
-            <a:r>
-              <a:rPr lang="en-US" i="1" dirty="0"/>
-              <a:t>On-Demand</a:t>
-            </a:r>
-            <a:r>
-              <a:rPr lang="sr-Cyrl-RS" i="1" dirty="0"/>
-              <a:t> </a:t>
-            </a:r>
-            <a:r>
-              <a:rPr lang="sr-Cyrl-RS" dirty="0"/>
-              <a:t>пренос </a:t>
-            </a:r>
-          </a:p>
-          <a:p>
-            <a:pPr marL="1371600" lvl="2" indent="-457200">
-              <a:buFont typeface="+mj-lt"/>
-              <a:buAutoNum type="arabicPeriod"/>
-            </a:pPr>
-            <a:r>
-              <a:rPr lang="sr-Cyrl-RS" dirty="0"/>
-              <a:t>Апликација која је задужена за евиденцију корисника, управљање базом и преусмеравање на видео пренос</a:t>
-            </a:r>
-          </a:p>
-          <a:p>
-            <a:pPr lvl="1"/>
-            <a:r>
-              <a:rPr lang="sr-Cyrl-RS" dirty="0"/>
-              <a:t>Имплементирати </a:t>
-            </a:r>
-            <a:r>
-              <a:rPr lang="en-US" i="1" dirty="0"/>
-              <a:t>Watchdog</a:t>
-            </a:r>
-            <a:r>
-              <a:rPr lang="sr-Cyrl-RS" dirty="0"/>
-              <a:t> сервис, који би поновно покретао неактивне делове систем</a:t>
-            </a:r>
-          </a:p>
-          <a:p>
-            <a:pPr lvl="1"/>
-            <a:r>
-              <a:rPr lang="en-US" i="1" dirty="0"/>
-              <a:t>Web</a:t>
-            </a:r>
-            <a:r>
-              <a:rPr lang="sr-Cyrl-RS" i="1" dirty="0"/>
-              <a:t> </a:t>
-            </a:r>
-            <a:r>
-              <a:rPr lang="sr-Cyrl-RS" dirty="0"/>
-              <a:t>подршка</a:t>
-            </a:r>
-            <a:endParaRPr lang="sr-Cyrl-RS" i="1" dirty="0"/>
-          </a:p>
-        </p:txBody>
-      </p:sp>
-    </p:spTree>
-    <p:extLst>
-      <p:ext uri="{BB962C8B-B14F-4D97-AF65-F5344CB8AC3E}">
-        <p14:creationId xmlns:p14="http://schemas.microsoft.com/office/powerpoint/2010/main" val="2565390846"/>
-      </p:ext>
-    </p:extLst>
-  </p:cSld>
-  <p:clrMapOvr>
-    <a:masterClrMapping/>
-  </p:clrMapOvr>
-</p:sld>
-</file>
-
-<file path=ppt/slides/slide31.xml><?xml version="1.0" encoding="utf-8"?>
 <p:sld xmlns:a="http://schemas.openxmlformats.org/drawingml/2006/main" xmlns:r="http://schemas.openxmlformats.org/officeDocument/2006/relationships" xmlns:p="http://schemas.openxmlformats.org/presentationml/2006/main">
   <p:cSld>
     <p:spTree>
@@ -28391,17 +28194,8 @@
             <a:pPr algn="l"/>
             <a:r>
               <a:rPr lang="en-US" i="1" dirty="0"/>
-              <a:t>RTP</a:t>
-            </a:r>
-            <a:r>
-              <a:rPr lang="en-US" dirty="0"/>
-              <a:t> </a:t>
-            </a:r>
-            <a:r>
-              <a:rPr lang="sr-Cyrl-RS" dirty="0"/>
-              <a:t>протокол</a:t>
-            </a:r>
-            <a:endParaRPr lang="en-US" dirty="0"/>
+              <a:t>Socket wrapper</a:t>
+            </a:r>
           </a:p>
         </p:txBody>
       </p:sp>
@@ -28424,7 +28218,7 @@
         <p:spPr>
           <a:xfrm>
             <a:off x="1617476" y="1162975"/>
-            <a:ext cx="10402889" cy="1651246"/>
+            <a:ext cx="10402889" cy="4350057"/>
           </a:xfrm>
         </p:spPr>
         <p:txBody>
@@ -28434,301 +28228,172 @@
           <a:lstStyle/>
           <a:p>
             <a:r>
+              <a:rPr lang="en-US" dirty="0"/>
+              <a:t>Windows                   Winsock</a:t>
+            </a:r>
+          </a:p>
+          <a:p>
+            <a:r>
+              <a:rPr lang="en-US" dirty="0"/>
+              <a:t>Linux                           Sys/Socket</a:t>
+            </a:r>
+          </a:p>
+          <a:p>
+            <a:r>
+              <a:rPr lang="sr-Cyrl-RS" dirty="0"/>
+              <a:t>Коришћење оваквог интерфејса у већим пројектима није комфорно</a:t>
+            </a:r>
+          </a:p>
+          <a:p>
+            <a:r>
+              <a:rPr lang="sr-Cyrl-RS" dirty="0"/>
+              <a:t>Структуре и функције које се користе из </a:t>
+            </a:r>
+            <a:r>
               <a:rPr lang="en-US" i="1" dirty="0"/>
-              <a:t>Real-time Transport Protocol</a:t>
-            </a:r>
-          </a:p>
-          <a:p>
+              <a:t>Socket API</a:t>
+            </a:r>
+            <a:r>
+              <a:rPr lang="sr-Cyrl-RS" i="1" dirty="0"/>
+              <a:t> </a:t>
+            </a:r>
             <a:r>
               <a:rPr lang="sr-Cyrl-RS" dirty="0"/>
-              <a:t>Намењен је за  реализацију преноса аудио и/или видео садржаја</a:t>
-            </a:r>
-            <a:endParaRPr lang="en-US" dirty="0"/>
+              <a:t>запаковане су у класе чије коришћење је доста комфорније, а код робуснији</a:t>
+            </a:r>
           </a:p>
           <a:p>
             <a:r>
               <a:rPr lang="sr-Cyrl-RS" dirty="0"/>
-              <a:t>Подржава </a:t>
+              <a:t>3 пара класа</a:t>
+            </a:r>
+            <a:r>
+              <a:rPr lang="en-US" dirty="0"/>
+              <a:t>: </a:t>
             </a:r>
             <a:r>
               <a:rPr lang="en-US" i="1" dirty="0"/>
-              <a:t>multicast </a:t>
+              <a:t>TCP</a:t>
             </a:r>
             <a:r>
               <a:rPr lang="sr-Cyrl-RS" dirty="0"/>
-              <a:t>и </a:t>
+              <a:t>, </a:t>
             </a:r>
             <a:r>
               <a:rPr lang="en-US" i="1" dirty="0"/>
-              <a:t>unicast</a:t>
-            </a:r>
-            <a:r>
-              <a:rPr lang="en-US" dirty="0"/>
+              <a:t>Unicast </a:t>
+            </a:r>
+            <a:r>
+              <a:rPr lang="sr-Cyrl-RS" dirty="0"/>
+              <a:t>и</a:t>
+            </a:r>
+            <a:r>
+              <a:rPr lang="sr-Cyrl-RS" i="1" dirty="0"/>
               <a:t> </a:t>
             </a:r>
             <a:r>
+              <a:rPr lang="en-US" i="1" dirty="0"/>
+              <a:t>Multicast UDP</a:t>
+            </a:r>
+            <a:endParaRPr lang="sr-Cyrl-RS" i="1" dirty="0"/>
+          </a:p>
+          <a:p>
+            <a:r>
               <a:rPr lang="sr-Cyrl-RS" dirty="0"/>
-              <a:t>пренос</a:t>
-            </a:r>
-          </a:p>
-        </p:txBody>
-      </p:sp>
-      <p:pic>
-        <p:nvPicPr>
-          <p:cNvPr id="6" name="Picture 5">
+              <a:t>Постоје и апстрактне класе које се могу извести за специфичне потребе модула у оквиру пројекта</a:t>
+            </a:r>
+          </a:p>
+        </p:txBody>
+      </p:sp>
+      <p:sp>
+        <p:nvSpPr>
+          <p:cNvPr id="4" name="Arrow: Right 3">
             <a:extLst>
               <a:ext uri="{FF2B5EF4-FFF2-40B4-BE49-F238E27FC236}">
-                <a16:creationId xmlns:a16="http://schemas.microsoft.com/office/drawing/2014/main" id="{62858324-5FE0-4D94-B0FC-2FA94F73AEDC}"/>
+                <a16:creationId xmlns:a16="http://schemas.microsoft.com/office/drawing/2014/main" id="{17881D75-5988-4A6E-B23C-5AF2007419F3}"/>
               </a:ext>
             </a:extLst>
           </p:cNvPr>
-          <p:cNvPicPr>
-            <a:picLocks noChangeAspect="1"/>
-          </p:cNvPicPr>
+          <p:cNvSpPr/>
           <p:nvPr/>
-        </p:nvPicPr>
-        <p:blipFill>
-          <a:blip r:embed="rId2">
-            <a:extLst>
-              <a:ext uri="{28A0092B-C50C-407E-A947-70E740481C1C}">
-                <a14:useLocalDpi xmlns:a14="http://schemas.microsoft.com/office/drawing/2010/main" val="0"/>
-              </a:ext>
-            </a:extLst>
-          </a:blip>
-          <a:srcRect/>
-          <a:stretch>
-            <a:fillRect/>
-          </a:stretch>
-        </p:blipFill>
-        <p:spPr bwMode="auto">
+        </p:nvSpPr>
+        <p:spPr>
           <a:xfrm>
-            <a:off x="4611111" y="2996690"/>
-            <a:ext cx="2969778" cy="3388573"/>
+            <a:off x="3383261" y="1500326"/>
+            <a:ext cx="727099" cy="355108"/>
           </a:xfrm>
-          <a:prstGeom prst="rect">
+          <a:prstGeom prst="rightArrow">
             <a:avLst/>
           </a:prstGeom>
-          <a:noFill/>
-          <a:ln>
-            <a:noFill/>
-          </a:ln>
         </p:spPr>
-      </p:pic>
-    </p:spTree>
-    <p:extLst>
-      <p:ext uri="{BB962C8B-B14F-4D97-AF65-F5344CB8AC3E}">
-        <p14:creationId xmlns:p14="http://schemas.microsoft.com/office/powerpoint/2010/main" val="4192551969"/>
-      </p:ext>
-    </p:extLst>
-  </p:cSld>
-  <p:clrMapOvr>
-    <a:masterClrMapping/>
-  </p:clrMapOvr>
-</p:sld>
-</file>
-
-<file path=ppt/slides/slide5.xml><?xml version="1.0" encoding="utf-8"?>
-<p:sld xmlns:a="http://schemas.openxmlformats.org/drawingml/2006/main" xmlns:r="http://schemas.openxmlformats.org/officeDocument/2006/relationships" xmlns:p="http://schemas.openxmlformats.org/presentationml/2006/main">
-  <p:cSld>
-    <p:spTree>
-      <p:nvGrpSpPr>
-        <p:cNvPr id="1" name=""/>
-        <p:cNvGrpSpPr/>
-        <p:nvPr/>
-      </p:nvGrpSpPr>
-      <p:grpSpPr>
-        <a:xfrm>
-          <a:off x="0" y="0"/>
-          <a:ext cx="0" cy="0"/>
-          <a:chOff x="0" y="0"/>
-          <a:chExt cx="0" cy="0"/>
-        </a:xfrm>
-      </p:grpSpPr>
-      <p:sp>
-        <p:nvSpPr>
-          <p:cNvPr id="2" name="Title 1">
+        <p:style>
+          <a:lnRef idx="2">
+            <a:schemeClr val="accent1">
+              <a:shade val="50000"/>
+            </a:schemeClr>
+          </a:lnRef>
+          <a:fillRef idx="1">
+            <a:schemeClr val="accent1"/>
+          </a:fillRef>
+          <a:effectRef idx="0">
+            <a:schemeClr val="accent1"/>
+          </a:effectRef>
+          <a:fontRef idx="minor">
+            <a:schemeClr val="lt1"/>
+          </a:fontRef>
+        </p:style>
+        <p:txBody>
+          <a:bodyPr rtlCol="0" anchor="ctr"/>
+          <a:lstStyle/>
+          <a:p>
+            <a:pPr algn="ctr"/>
+            <a:endParaRPr lang="en-US"/>
+          </a:p>
+        </p:txBody>
+      </p:sp>
+      <p:sp>
+        <p:nvSpPr>
+          <p:cNvPr id="5" name="Arrow: Right 4">
             <a:extLst>
               <a:ext uri="{FF2B5EF4-FFF2-40B4-BE49-F238E27FC236}">
-                <a16:creationId xmlns:a16="http://schemas.microsoft.com/office/drawing/2014/main" id="{7E156979-D1B6-479E-A38E-A2566E693406}"/>
+                <a16:creationId xmlns:a16="http://schemas.microsoft.com/office/drawing/2014/main" id="{90830FB2-E835-4795-8CAD-045536B74A85}"/>
               </a:ext>
             </a:extLst>
           </p:cNvPr>
-          <p:cNvSpPr>
-            <a:spLocks noGrp="1"/>
-          </p:cNvSpPr>
-          <p:nvPr>
-            <p:ph type="title"/>
-          </p:nvPr>
+          <p:cNvSpPr/>
+          <p:nvPr/>
         </p:nvSpPr>
         <p:spPr>
           <a:xfrm>
-            <a:off x="1617476" y="312938"/>
-            <a:ext cx="3496062" cy="850037"/>
+            <a:off x="3383261" y="2057401"/>
+            <a:ext cx="727099" cy="355108"/>
           </a:xfrm>
+          <a:prstGeom prst="rightArrow">
+            <a:avLst/>
+          </a:prstGeom>
         </p:spPr>
-        <p:txBody>
-          <a:bodyPr>
-            <a:normAutofit/>
-          </a:bodyPr>
+        <p:style>
+          <a:lnRef idx="2">
+            <a:schemeClr val="accent1">
+              <a:shade val="50000"/>
+            </a:schemeClr>
+          </a:lnRef>
+          <a:fillRef idx="1">
+            <a:schemeClr val="accent1"/>
+          </a:fillRef>
+          <a:effectRef idx="0">
+            <a:schemeClr val="accent1"/>
+          </a:effectRef>
+          <a:fontRef idx="minor">
+            <a:schemeClr val="lt1"/>
+          </a:fontRef>
+        </p:style>
+        <p:txBody>
+          <a:bodyPr rtlCol="0" anchor="ctr"/>
           <a:lstStyle/>
           <a:p>
-            <a:pPr algn="l"/>
-            <a:r>
-              <a:rPr lang="en-US" i="1" dirty="0"/>
-              <a:t>Socket wrapper</a:t>
-            </a:r>
-          </a:p>
-        </p:txBody>
-      </p:sp>
-      <p:sp>
-        <p:nvSpPr>
-          <p:cNvPr id="3" name="Content Placeholder 2">
-            <a:extLst>
-              <a:ext uri="{FF2B5EF4-FFF2-40B4-BE49-F238E27FC236}">
-                <a16:creationId xmlns:a16="http://schemas.microsoft.com/office/drawing/2014/main" id="{B926073A-16BE-4E3A-B0E0-F005707F5EC4}"/>
-              </a:ext>
-            </a:extLst>
-          </p:cNvPr>
-          <p:cNvSpPr>
-            <a:spLocks noGrp="1"/>
-          </p:cNvSpPr>
-          <p:nvPr>
-            <p:ph idx="1"/>
-          </p:nvPr>
-        </p:nvSpPr>
-        <p:spPr>
-          <a:xfrm>
-            <a:off x="1617476" y="1162975"/>
-            <a:ext cx="10402889" cy="4350057"/>
-          </a:xfrm>
-        </p:spPr>
-        <p:txBody>
-          <a:bodyPr>
-            <a:normAutofit/>
-          </a:bodyPr>
-          <a:lstStyle/>
-          <a:p>
-            <a:r>
-              <a:rPr lang="sr-Cyrl-RS" dirty="0"/>
-              <a:t>За реализацију комуникације између серверске и клијентске стране коришћен је </a:t>
-            </a:r>
-            <a:r>
-              <a:rPr lang="en-US" i="1" dirty="0"/>
-              <a:t>Socket API</a:t>
-            </a:r>
-            <a:r>
-              <a:rPr lang="en-US" dirty="0"/>
-              <a:t> (</a:t>
-            </a:r>
-            <a:r>
-              <a:rPr lang="en-US" i="1" dirty="0"/>
-              <a:t>Winsock</a:t>
-            </a:r>
-            <a:r>
-              <a:rPr lang="en-US" dirty="0"/>
-              <a:t> -</a:t>
-            </a:r>
-            <a:r>
-              <a:rPr lang="sr-Cyrl-RS" dirty="0"/>
-              <a:t> </a:t>
-            </a:r>
-            <a:r>
-              <a:rPr lang="en-US" i="1" dirty="0"/>
-              <a:t>Windows</a:t>
-            </a:r>
-            <a:r>
-              <a:rPr lang="en-US" dirty="0"/>
-              <a:t> </a:t>
-            </a:r>
-            <a:r>
-              <a:rPr lang="sr-Cyrl-RS" dirty="0"/>
-              <a:t>, </a:t>
-            </a:r>
-            <a:r>
-              <a:rPr lang="en-US" i="1" dirty="0"/>
-              <a:t>Sys/Socket</a:t>
-            </a:r>
-            <a:r>
-              <a:rPr lang="sr-Cyrl-RS" dirty="0"/>
-              <a:t> </a:t>
-            </a:r>
-            <a:r>
-              <a:rPr lang="en-US" dirty="0"/>
-              <a:t>-</a:t>
-            </a:r>
-            <a:r>
-              <a:rPr lang="sr-Cyrl-RS" dirty="0"/>
-              <a:t> </a:t>
-            </a:r>
-            <a:r>
-              <a:rPr lang="en-US" i="1" dirty="0"/>
-              <a:t>Linux</a:t>
-            </a:r>
-            <a:r>
-              <a:rPr lang="en-US" dirty="0"/>
-              <a:t>)</a:t>
-            </a:r>
-          </a:p>
-          <a:p>
-            <a:r>
-              <a:rPr lang="sr-Cyrl-RS" dirty="0"/>
-              <a:t>Коришћење оваквог интерфејса у већим пројектима није комфорно</a:t>
-            </a:r>
-          </a:p>
-          <a:p>
-            <a:r>
-              <a:rPr lang="sr-Cyrl-RS" dirty="0"/>
-              <a:t>Структуре и функције које се користе из </a:t>
-            </a:r>
-            <a:r>
-              <a:rPr lang="en-US" i="1" dirty="0"/>
-              <a:t>Socket API</a:t>
-            </a:r>
-            <a:r>
-              <a:rPr lang="sr-Cyrl-RS" i="1" dirty="0"/>
-              <a:t> </a:t>
-            </a:r>
-            <a:r>
-              <a:rPr lang="sr-Cyrl-RS" dirty="0"/>
-              <a:t>запаковане су у класе чије коришћење је доста комфорније, а код робуснији</a:t>
-            </a:r>
-          </a:p>
-          <a:p>
-            <a:r>
-              <a:rPr lang="sr-Cyrl-RS" dirty="0"/>
-              <a:t>Интерфејс се састоји од 3 пара класа које је могуће инстанцирати - пар представљају клијент и сервер - покривају </a:t>
-            </a:r>
-            <a:r>
-              <a:rPr lang="en-US" i="1" dirty="0"/>
-              <a:t>TCP</a:t>
-            </a:r>
-            <a:r>
-              <a:rPr lang="sr-Cyrl-RS" dirty="0"/>
-              <a:t>, </a:t>
-            </a:r>
-            <a:r>
-              <a:rPr lang="en-US" i="1" dirty="0"/>
-              <a:t>Unicast </a:t>
-            </a:r>
-            <a:r>
-              <a:rPr lang="sr-Cyrl-RS" dirty="0"/>
-              <a:t>и</a:t>
-            </a:r>
-            <a:r>
-              <a:rPr lang="sr-Cyrl-RS" i="1" dirty="0"/>
-              <a:t> </a:t>
-            </a:r>
-            <a:r>
-              <a:rPr lang="en-US" i="1" dirty="0"/>
-              <a:t>Multicast UDP</a:t>
-            </a:r>
-            <a:endParaRPr lang="sr-Cyrl-RS" i="1" dirty="0"/>
-          </a:p>
-          <a:p>
-            <a:r>
-              <a:rPr lang="sr-Cyrl-RS" dirty="0"/>
-              <a:t>Постоје и апстрактне класе које се могу извести за специфичне потребе модула у оквиру пројекта</a:t>
-            </a:r>
+            <a:pPr algn="ctr"/>
+            <a:endParaRPr lang="en-US"/>
           </a:p>
         </p:txBody>
       </p:sp>
@@ -28745,7 +28410,7 @@
 </p:sld>
 </file>
 
-<file path=ppt/slides/slide6.xml><?xml version="1.0" encoding="utf-8"?>
+<file path=ppt/slides/slide5.xml><?xml version="1.0" encoding="utf-8"?>
 <p:sld xmlns:a="http://schemas.openxmlformats.org/drawingml/2006/main" xmlns:r="http://schemas.openxmlformats.org/officeDocument/2006/relationships" xmlns:p="http://schemas.openxmlformats.org/presentationml/2006/main">
   <p:cSld>
     <p:spTree>
@@ -28854,7 +28519,7 @@
 </p:sld>
 </file>
 
-<file path=ppt/slides/slide7.xml><?xml version="1.0" encoding="utf-8"?>
+<file path=ppt/slides/slide6.xml><?xml version="1.0" encoding="utf-8"?>
 <p:sld xmlns:a="http://schemas.openxmlformats.org/drawingml/2006/main" xmlns:r="http://schemas.openxmlformats.org/officeDocument/2006/relationships" xmlns:p="http://schemas.openxmlformats.org/presentationml/2006/main">
   <p:cSld>
     <p:spTree>
@@ -29066,7 +28731,7 @@
 </p:sld>
 </file>
 
-<file path=ppt/slides/slide8.xml><?xml version="1.0" encoding="utf-8"?>
+<file path=ppt/slides/slide7.xml><?xml version="1.0" encoding="utf-8"?>
 <p:sld xmlns:a="http://schemas.openxmlformats.org/drawingml/2006/main" xmlns:r="http://schemas.openxmlformats.org/officeDocument/2006/relationships" xmlns:p="http://schemas.openxmlformats.org/presentationml/2006/main">
   <p:cSld>
     <p:spTree>
@@ -29176,7 +28841,7 @@
 </p:sld>
 </file>
 
-<file path=ppt/slides/slide9.xml><?xml version="1.0" encoding="utf-8"?>
+<file path=ppt/slides/slide8.xml><?xml version="1.0" encoding="utf-8"?>
 <p:sld xmlns:a="http://schemas.openxmlformats.org/drawingml/2006/main" xmlns:r="http://schemas.openxmlformats.org/officeDocument/2006/relationships" xmlns:p="http://schemas.openxmlformats.org/presentationml/2006/main">
   <p:cSld>
     <p:spTree>
@@ -30174,6 +29839,116 @@
     <p:extLst>
       <p:ext uri="{BB962C8B-B14F-4D97-AF65-F5344CB8AC3E}">
         <p14:creationId xmlns:p14="http://schemas.microsoft.com/office/powerpoint/2010/main" val="1333634417"/>
+      </p:ext>
+    </p:extLst>
+  </p:cSld>
+  <p:clrMapOvr>
+    <a:masterClrMapping/>
+  </p:clrMapOvr>
+</p:sld>
+</file>
+
+<file path=ppt/slides/slide9.xml><?xml version="1.0" encoding="utf-8"?>
+<p:sld xmlns:a="http://schemas.openxmlformats.org/drawingml/2006/main" xmlns:r="http://schemas.openxmlformats.org/officeDocument/2006/relationships" xmlns:p="http://schemas.openxmlformats.org/presentationml/2006/main">
+  <p:cSld>
+    <p:spTree>
+      <p:nvGrpSpPr>
+        <p:cNvPr id="1" name=""/>
+        <p:cNvGrpSpPr/>
+        <p:nvPr/>
+      </p:nvGrpSpPr>
+      <p:grpSpPr>
+        <a:xfrm>
+          <a:off x="0" y="0"/>
+          <a:ext cx="0" cy="0"/>
+          <a:chOff x="0" y="0"/>
+          <a:chExt cx="0" cy="0"/>
+        </a:xfrm>
+      </p:grpSpPr>
+      <p:sp>
+        <p:nvSpPr>
+          <p:cNvPr id="2" name="Title 1">
+            <a:extLst>
+              <a:ext uri="{FF2B5EF4-FFF2-40B4-BE49-F238E27FC236}">
+                <a16:creationId xmlns:a16="http://schemas.microsoft.com/office/drawing/2014/main" id="{7E156979-D1B6-479E-A38E-A2566E693406}"/>
+              </a:ext>
+            </a:extLst>
+          </p:cNvPr>
+          <p:cNvSpPr>
+            <a:spLocks noGrp="1"/>
+          </p:cNvSpPr>
+          <p:nvPr>
+            <p:ph type="title"/>
+          </p:nvPr>
+        </p:nvSpPr>
+        <p:spPr>
+          <a:xfrm>
+            <a:off x="1617476" y="312938"/>
+            <a:ext cx="6842943" cy="1258410"/>
+          </a:xfrm>
+        </p:spPr>
+        <p:txBody>
+          <a:bodyPr>
+            <a:normAutofit fontScale="90000"/>
+          </a:bodyPr>
+          <a:lstStyle/>
+          <a:p>
+            <a:pPr algn="l"/>
+            <a:r>
+              <a:rPr lang="sr-Cyrl-RS" dirty="0"/>
+              <a:t>Архитектура и функционалност клијентске апликације</a:t>
+            </a:r>
+            <a:endParaRPr lang="en-US" dirty="0"/>
+          </a:p>
+        </p:txBody>
+      </p:sp>
+      <p:pic>
+        <p:nvPicPr>
+          <p:cNvPr id="4" name="Content Placeholder 3">
+            <a:extLst>
+              <a:ext uri="{FF2B5EF4-FFF2-40B4-BE49-F238E27FC236}">
+                <a16:creationId xmlns:a16="http://schemas.microsoft.com/office/drawing/2014/main" id="{EB4D9B77-6A5B-4FD2-856F-19DE1C6A8A3C}"/>
+              </a:ext>
+            </a:extLst>
+          </p:cNvPr>
+          <p:cNvPicPr>
+            <a:picLocks noGrp="1" noChangeAspect="1"/>
+          </p:cNvPicPr>
+          <p:nvPr>
+            <p:ph idx="1"/>
+          </p:nvPr>
+        </p:nvPicPr>
+        <p:blipFill>
+          <a:blip r:embed="rId2">
+            <a:extLst>
+              <a:ext uri="{28A0092B-C50C-407E-A947-70E740481C1C}">
+                <a14:useLocalDpi xmlns:a14="http://schemas.microsoft.com/office/drawing/2010/main" val="0"/>
+              </a:ext>
+            </a:extLst>
+          </a:blip>
+          <a:srcRect/>
+          <a:stretch>
+            <a:fillRect/>
+          </a:stretch>
+        </p:blipFill>
+        <p:spPr bwMode="auto">
+          <a:xfrm>
+            <a:off x="3139621" y="1571348"/>
+            <a:ext cx="5912758" cy="5184282"/>
+          </a:xfrm>
+          <a:prstGeom prst="rect">
+            <a:avLst/>
+          </a:prstGeom>
+          <a:noFill/>
+          <a:ln>
+            <a:noFill/>
+          </a:ln>
+        </p:spPr>
+      </p:pic>
+    </p:spTree>
+    <p:extLst>
+      <p:ext uri="{BB962C8B-B14F-4D97-AF65-F5344CB8AC3E}">
+        <p14:creationId xmlns:p14="http://schemas.microsoft.com/office/powerpoint/2010/main" val="2817887620"/>
       </p:ext>
     </p:extLst>
   </p:cSld>

</xml_diff>